<commit_message>
second version of fluid flow
</commit_message>
<xml_diff>
--- a/lectureNotes/figures/powerPointRawFigures.pptx
+++ b/lectureNotes/figures/powerPointRawFigures.pptx
@@ -19,6 +19,9 @@
     <p:sldId id="266" r:id="rId13"/>
     <p:sldId id="263" r:id="rId14"/>
     <p:sldId id="265" r:id="rId15"/>
+    <p:sldId id="270" r:id="rId16"/>
+    <p:sldId id="271" r:id="rId17"/>
+    <p:sldId id="272" r:id="rId18"/>
   </p:sldIdLst>
   <p:sldSz cx="3959225" cy="2339975"/>
   <p:notesSz cx="6858000" cy="9144000"/>
@@ -6677,18 +6680,52 @@
           <a:bodyPr/>
           <a:lstStyle/>
           <a:p>
-            <a:endParaRPr lang="en-GB"/>
+            <a:r>
+              <a:rPr lang="en-US" dirty="0" smtClean="0"/>
+              <a:t>Fluid flow</a:t>
+            </a:r>
+            <a:endParaRPr lang="en-GB" dirty="0"/>
           </a:p>
         </p:txBody>
       </p:sp>
+    </p:spTree>
+    <p:extLst>
+      <p:ext uri="{BB962C8B-B14F-4D97-AF65-F5344CB8AC3E}">
+        <p14:creationId xmlns:p14="http://schemas.microsoft.com/office/powerpoint/2010/main" val="2014354962"/>
+      </p:ext>
+    </p:extLst>
+  </p:cSld>
+  <p:clrMapOvr>
+    <a:masterClrMapping/>
+  </p:clrMapOvr>
+</p:sld>
+</file>
+
+<file path=ppt/slides/slide15.xml><?xml version="1.0" encoding="utf-8"?>
+<p:sld xmlns:a="http://schemas.openxmlformats.org/drawingml/2006/main" xmlns:r="http://schemas.openxmlformats.org/officeDocument/2006/relationships" xmlns:p="http://schemas.openxmlformats.org/presentationml/2006/main">
+  <p:cSld>
+    <p:spTree>
+      <p:nvGrpSpPr>
+        <p:cNvPr id="1" name=""/>
+        <p:cNvGrpSpPr/>
+        <p:nvPr/>
+      </p:nvGrpSpPr>
+      <p:grpSpPr>
+        <a:xfrm>
+          <a:off x="0" y="0"/>
+          <a:ext cx="0" cy="0"/>
+          <a:chOff x="0" y="0"/>
+          <a:chExt cx="0" cy="0"/>
+        </a:xfrm>
+      </p:grpSpPr>
       <p:sp>
         <p:nvSpPr>
-          <p:cNvPr id="3" name="Content Placeholder 2"/>
+          <p:cNvPr id="2" name="Title 1"/>
           <p:cNvSpPr>
             <a:spLocks noGrp="1"/>
           </p:cNvSpPr>
           <p:nvPr>
-            <p:ph idx="1"/>
+            <p:ph type="title"/>
           </p:nvPr>
         </p:nvSpPr>
         <p:spPr/>
@@ -6696,14 +6733,1261 @@
           <a:bodyPr/>
           <a:lstStyle/>
           <a:p>
-            <a:endParaRPr lang="en-GB"/>
+            <a:r>
+              <a:rPr lang="en-US" dirty="0" smtClean="0"/>
+              <a:t>decoupling</a:t>
+            </a:r>
+            <a:endParaRPr lang="en-GB" dirty="0"/>
+          </a:p>
+        </p:txBody>
+      </p:sp>
+      <p:cxnSp>
+        <p:nvCxnSpPr>
+          <p:cNvPr id="3" name="Straight Connector 2"/>
+          <p:cNvCxnSpPr/>
+          <p:nvPr/>
+        </p:nvCxnSpPr>
+        <p:spPr>
+          <a:xfrm>
+            <a:off x="771372" y="1154130"/>
+            <a:ext cx="360000" cy="360000"/>
+          </a:xfrm>
+          <a:prstGeom prst="line">
+            <a:avLst/>
+          </a:prstGeom>
+          <a:ln w="9525">
+            <a:headEnd type="oval" w="med" len="med"/>
+            <a:tailEnd type="oval" w="med" len="med"/>
+          </a:ln>
+        </p:spPr>
+        <p:style>
+          <a:lnRef idx="1">
+            <a:schemeClr val="dk1"/>
+          </a:lnRef>
+          <a:fillRef idx="0">
+            <a:schemeClr val="dk1"/>
+          </a:fillRef>
+          <a:effectRef idx="0">
+            <a:schemeClr val="dk1"/>
+          </a:effectRef>
+          <a:fontRef idx="minor">
+            <a:schemeClr val="tx1"/>
+          </a:fontRef>
+        </p:style>
+      </p:cxnSp>
+      <mc:AlternateContent xmlns:mc="http://schemas.openxmlformats.org/markup-compatibility/2006">
+        <mc:Choice xmlns:a14="http://schemas.microsoft.com/office/drawing/2010/main" Requires="a14">
+          <p:sp>
+            <p:nvSpPr>
+              <p:cNvPr id="4" name="TextBox 3"/>
+              <p:cNvSpPr txBox="1"/>
+              <p:nvPr/>
+            </p:nvSpPr>
+            <p:spPr>
+              <a:xfrm>
+                <a:off x="1814248" y="1567407"/>
+                <a:ext cx="165365" cy="153888"/>
+              </a:xfrm>
+              <a:prstGeom prst="rect">
+                <a:avLst/>
+              </a:prstGeom>
+              <a:noFill/>
+            </p:spPr>
+            <p:txBody>
+              <a:bodyPr wrap="none" lIns="0" tIns="0" rIns="0" bIns="0" rtlCol="0">
+                <a:spAutoFit/>
+              </a:bodyPr>
+              <a:lstStyle/>
+              <a:p>
+                <a:pPr/>
+                <a14:m>
+                  <m:oMathPara xmlns:m="http://schemas.openxmlformats.org/officeDocument/2006/math">
+                    <m:oMathParaPr>
+                      <m:jc m:val="centerGroup"/>
+                    </m:oMathParaPr>
+                    <m:oMath xmlns:m="http://schemas.openxmlformats.org/officeDocument/2006/math">
+                      <m:sSub>
+                        <m:sSubPr>
+                          <m:ctrlPr>
+                            <a:rPr lang="en-US" sz="1000" b="0" i="1" smtClean="0">
+                              <a:latin typeface="Cambria Math" panose="02040503050406030204" pitchFamily="18" charset="0"/>
+                            </a:rPr>
+                          </m:ctrlPr>
+                        </m:sSubPr>
+                        <m:e>
+                          <m:r>
+                            <a:rPr lang="en-US" sz="1000" b="0" i="1" smtClean="0">
+                              <a:latin typeface="Cambria Math" panose="02040503050406030204" pitchFamily="18" charset="0"/>
+                            </a:rPr>
+                            <m:t>𝑝</m:t>
+                          </m:r>
+                        </m:e>
+                        <m:sub>
+                          <m:r>
+                            <a:rPr lang="en-US" sz="1000" b="0" i="1" smtClean="0">
+                              <a:latin typeface="Cambria Math" panose="02040503050406030204" pitchFamily="18" charset="0"/>
+                            </a:rPr>
+                            <m:t>𝑃</m:t>
+                          </m:r>
+                        </m:sub>
+                      </m:sSub>
+                    </m:oMath>
+                  </m:oMathPara>
+                </a14:m>
+                <a:endParaRPr lang="en-GB" sz="1000" dirty="0"/>
+              </a:p>
+            </p:txBody>
+          </p:sp>
+        </mc:Choice>
+        <mc:Fallback>
+          <p:sp>
+            <p:nvSpPr>
+              <p:cNvPr id="4" name="TextBox 3"/>
+              <p:cNvSpPr txBox="1">
+                <a:spLocks noRot="1" noChangeAspect="1" noMove="1" noResize="1" noEditPoints="1" noAdjustHandles="1" noChangeArrowheads="1" noChangeShapeType="1" noTextEdit="1"/>
+              </p:cNvSpPr>
+              <p:nvPr/>
+            </p:nvSpPr>
+            <p:spPr>
+              <a:xfrm>
+                <a:off x="1814248" y="1567407"/>
+                <a:ext cx="165365" cy="153888"/>
+              </a:xfrm>
+              <a:prstGeom prst="rect">
+                <a:avLst/>
+              </a:prstGeom>
+              <a:blipFill>
+                <a:blip r:embed="rId2"/>
+                <a:stretch>
+                  <a:fillRect l="-22222" r="-3704" b="-28000"/>
+                </a:stretch>
+              </a:blipFill>
+            </p:spPr>
+            <p:txBody>
+              <a:bodyPr/>
+              <a:lstStyle/>
+              <a:p>
+                <a:r>
+                  <a:rPr lang="en-GB">
+                    <a:noFill/>
+                  </a:rPr>
+                  <a:t> </a:t>
+                </a:r>
+              </a:p>
+            </p:txBody>
+          </p:sp>
+        </mc:Fallback>
+      </mc:AlternateContent>
+      <p:cxnSp>
+        <p:nvCxnSpPr>
+          <p:cNvPr id="8" name="Straight Connector 7"/>
+          <p:cNvCxnSpPr/>
+          <p:nvPr/>
+        </p:nvCxnSpPr>
+        <p:spPr>
+          <a:xfrm rot="5400000">
+            <a:off x="1131372" y="1154130"/>
+            <a:ext cx="360000" cy="360000"/>
+          </a:xfrm>
+          <a:prstGeom prst="line">
+            <a:avLst/>
+          </a:prstGeom>
+          <a:ln w="9525">
+            <a:headEnd type="oval" w="med" len="med"/>
+            <a:tailEnd type="oval" w="med" len="med"/>
+          </a:ln>
+        </p:spPr>
+        <p:style>
+          <a:lnRef idx="1">
+            <a:schemeClr val="dk1"/>
+          </a:lnRef>
+          <a:fillRef idx="0">
+            <a:schemeClr val="dk1"/>
+          </a:fillRef>
+          <a:effectRef idx="0">
+            <a:schemeClr val="dk1"/>
+          </a:effectRef>
+          <a:fontRef idx="minor">
+            <a:schemeClr val="tx1"/>
+          </a:fontRef>
+        </p:style>
+      </p:cxnSp>
+      <p:cxnSp>
+        <p:nvCxnSpPr>
+          <p:cNvPr id="12" name="Straight Connector 11"/>
+          <p:cNvCxnSpPr/>
+          <p:nvPr/>
+        </p:nvCxnSpPr>
+        <p:spPr>
+          <a:xfrm>
+            <a:off x="1491372" y="1154130"/>
+            <a:ext cx="360000" cy="360000"/>
+          </a:xfrm>
+          <a:prstGeom prst="line">
+            <a:avLst/>
+          </a:prstGeom>
+          <a:ln w="9525">
+            <a:headEnd type="oval" w="med" len="med"/>
+            <a:tailEnd type="oval" w="med" len="med"/>
+          </a:ln>
+        </p:spPr>
+        <p:style>
+          <a:lnRef idx="1">
+            <a:schemeClr val="dk1"/>
+          </a:lnRef>
+          <a:fillRef idx="0">
+            <a:schemeClr val="dk1"/>
+          </a:fillRef>
+          <a:effectRef idx="0">
+            <a:schemeClr val="dk1"/>
+          </a:effectRef>
+          <a:fontRef idx="minor">
+            <a:schemeClr val="tx1"/>
+          </a:fontRef>
+        </p:style>
+      </p:cxnSp>
+      <p:cxnSp>
+        <p:nvCxnSpPr>
+          <p:cNvPr id="13" name="Straight Connector 12"/>
+          <p:cNvCxnSpPr/>
+          <p:nvPr/>
+        </p:nvCxnSpPr>
+        <p:spPr>
+          <a:xfrm rot="5400000">
+            <a:off x="1851372" y="1154130"/>
+            <a:ext cx="360000" cy="360000"/>
+          </a:xfrm>
+          <a:prstGeom prst="line">
+            <a:avLst/>
+          </a:prstGeom>
+          <a:ln w="9525">
+            <a:headEnd type="oval" w="med" len="med"/>
+            <a:tailEnd type="oval" w="med" len="med"/>
+          </a:ln>
+        </p:spPr>
+        <p:style>
+          <a:lnRef idx="1">
+            <a:schemeClr val="dk1"/>
+          </a:lnRef>
+          <a:fillRef idx="0">
+            <a:schemeClr val="dk1"/>
+          </a:fillRef>
+          <a:effectRef idx="0">
+            <a:schemeClr val="dk1"/>
+          </a:effectRef>
+          <a:fontRef idx="minor">
+            <a:schemeClr val="tx1"/>
+          </a:fontRef>
+        </p:style>
+      </p:cxnSp>
+      <p:cxnSp>
+        <p:nvCxnSpPr>
+          <p:cNvPr id="14" name="Straight Connector 13"/>
+          <p:cNvCxnSpPr/>
+          <p:nvPr/>
+        </p:nvCxnSpPr>
+        <p:spPr>
+          <a:xfrm>
+            <a:off x="2211372" y="1154130"/>
+            <a:ext cx="360000" cy="360000"/>
+          </a:xfrm>
+          <a:prstGeom prst="line">
+            <a:avLst/>
+          </a:prstGeom>
+          <a:ln w="9525">
+            <a:headEnd type="oval" w="med" len="med"/>
+            <a:tailEnd type="oval" w="med" len="med"/>
+          </a:ln>
+        </p:spPr>
+        <p:style>
+          <a:lnRef idx="1">
+            <a:schemeClr val="dk1"/>
+          </a:lnRef>
+          <a:fillRef idx="0">
+            <a:schemeClr val="dk1"/>
+          </a:fillRef>
+          <a:effectRef idx="0">
+            <a:schemeClr val="dk1"/>
+          </a:effectRef>
+          <a:fontRef idx="minor">
+            <a:schemeClr val="tx1"/>
+          </a:fontRef>
+        </p:style>
+      </p:cxnSp>
+      <p:cxnSp>
+        <p:nvCxnSpPr>
+          <p:cNvPr id="15" name="Straight Connector 14"/>
+          <p:cNvCxnSpPr/>
+          <p:nvPr/>
+        </p:nvCxnSpPr>
+        <p:spPr>
+          <a:xfrm rot="5400000">
+            <a:off x="2571372" y="1157959"/>
+            <a:ext cx="360000" cy="360000"/>
+          </a:xfrm>
+          <a:prstGeom prst="line">
+            <a:avLst/>
+          </a:prstGeom>
+          <a:ln w="9525">
+            <a:headEnd type="oval" w="med" len="med"/>
+            <a:tailEnd type="oval" w="med" len="med"/>
+          </a:ln>
+        </p:spPr>
+        <p:style>
+          <a:lnRef idx="1">
+            <a:schemeClr val="dk1"/>
+          </a:lnRef>
+          <a:fillRef idx="0">
+            <a:schemeClr val="dk1"/>
+          </a:fillRef>
+          <a:effectRef idx="0">
+            <a:schemeClr val="dk1"/>
+          </a:effectRef>
+          <a:fontRef idx="minor">
+            <a:schemeClr val="tx1"/>
+          </a:fontRef>
+        </p:style>
+      </p:cxnSp>
+      <p:grpSp>
+        <p:nvGrpSpPr>
+          <p:cNvPr id="28" name="Group 27"/>
+          <p:cNvGrpSpPr/>
+          <p:nvPr/>
+        </p:nvGrpSpPr>
+        <p:grpSpPr>
+          <a:xfrm>
+            <a:off x="951372" y="1085133"/>
+            <a:ext cx="1800000" cy="497994"/>
+            <a:chOff x="951372" y="1085133"/>
+            <a:chExt cx="1800000" cy="497994"/>
+          </a:xfrm>
+        </p:grpSpPr>
+        <p:cxnSp>
+          <p:nvCxnSpPr>
+            <p:cNvPr id="16" name="Straight Connector 15"/>
+            <p:cNvCxnSpPr/>
+            <p:nvPr/>
+          </p:nvCxnSpPr>
+          <p:spPr>
+            <a:xfrm>
+              <a:off x="951372" y="1085133"/>
+              <a:ext cx="0" cy="497994"/>
+            </a:xfrm>
+            <a:prstGeom prst="line">
+              <a:avLst/>
+            </a:prstGeom>
+            <a:ln w="9525">
+              <a:prstDash val="sysDash"/>
+              <a:headEnd type="none" w="med" len="med"/>
+              <a:tailEnd type="none" w="med" len="med"/>
+            </a:ln>
+          </p:spPr>
+          <p:style>
+            <a:lnRef idx="1">
+              <a:schemeClr val="dk1"/>
+            </a:lnRef>
+            <a:fillRef idx="0">
+              <a:schemeClr val="dk1"/>
+            </a:fillRef>
+            <a:effectRef idx="0">
+              <a:schemeClr val="dk1"/>
+            </a:effectRef>
+            <a:fontRef idx="minor">
+              <a:schemeClr val="tx1"/>
+            </a:fontRef>
+          </p:style>
+        </p:cxnSp>
+        <p:cxnSp>
+          <p:nvCxnSpPr>
+            <p:cNvPr id="19" name="Straight Connector 18"/>
+            <p:cNvCxnSpPr/>
+            <p:nvPr/>
+          </p:nvCxnSpPr>
+          <p:spPr>
+            <a:xfrm>
+              <a:off x="1311372" y="1085133"/>
+              <a:ext cx="0" cy="497994"/>
+            </a:xfrm>
+            <a:prstGeom prst="line">
+              <a:avLst/>
+            </a:prstGeom>
+            <a:ln w="9525">
+              <a:prstDash val="sysDash"/>
+              <a:headEnd type="none" w="med" len="med"/>
+              <a:tailEnd type="none" w="med" len="med"/>
+            </a:ln>
+          </p:spPr>
+          <p:style>
+            <a:lnRef idx="1">
+              <a:schemeClr val="dk1"/>
+            </a:lnRef>
+            <a:fillRef idx="0">
+              <a:schemeClr val="dk1"/>
+            </a:fillRef>
+            <a:effectRef idx="0">
+              <a:schemeClr val="dk1"/>
+            </a:effectRef>
+            <a:fontRef idx="minor">
+              <a:schemeClr val="tx1"/>
+            </a:fontRef>
+          </p:style>
+        </p:cxnSp>
+        <p:cxnSp>
+          <p:nvCxnSpPr>
+            <p:cNvPr id="21" name="Straight Connector 20"/>
+            <p:cNvCxnSpPr/>
+            <p:nvPr/>
+          </p:nvCxnSpPr>
+          <p:spPr>
+            <a:xfrm>
+              <a:off x="1671372" y="1085133"/>
+              <a:ext cx="0" cy="497994"/>
+            </a:xfrm>
+            <a:prstGeom prst="line">
+              <a:avLst/>
+            </a:prstGeom>
+            <a:ln w="9525">
+              <a:prstDash val="sysDash"/>
+              <a:headEnd type="none" w="med" len="med"/>
+              <a:tailEnd type="none" w="med" len="med"/>
+            </a:ln>
+          </p:spPr>
+          <p:style>
+            <a:lnRef idx="1">
+              <a:schemeClr val="dk1"/>
+            </a:lnRef>
+            <a:fillRef idx="0">
+              <a:schemeClr val="dk1"/>
+            </a:fillRef>
+            <a:effectRef idx="0">
+              <a:schemeClr val="dk1"/>
+            </a:effectRef>
+            <a:fontRef idx="minor">
+              <a:schemeClr val="tx1"/>
+            </a:fontRef>
+          </p:style>
+        </p:cxnSp>
+        <p:cxnSp>
+          <p:nvCxnSpPr>
+            <p:cNvPr id="23" name="Straight Connector 22"/>
+            <p:cNvCxnSpPr/>
+            <p:nvPr/>
+          </p:nvCxnSpPr>
+          <p:spPr>
+            <a:xfrm>
+              <a:off x="2031372" y="1085133"/>
+              <a:ext cx="0" cy="497994"/>
+            </a:xfrm>
+            <a:prstGeom prst="line">
+              <a:avLst/>
+            </a:prstGeom>
+            <a:ln w="9525">
+              <a:prstDash val="sysDash"/>
+              <a:headEnd type="none" w="med" len="med"/>
+              <a:tailEnd type="none" w="med" len="med"/>
+            </a:ln>
+          </p:spPr>
+          <p:style>
+            <a:lnRef idx="1">
+              <a:schemeClr val="dk1"/>
+            </a:lnRef>
+            <a:fillRef idx="0">
+              <a:schemeClr val="dk1"/>
+            </a:fillRef>
+            <a:effectRef idx="0">
+              <a:schemeClr val="dk1"/>
+            </a:effectRef>
+            <a:fontRef idx="minor">
+              <a:schemeClr val="tx1"/>
+            </a:fontRef>
+          </p:style>
+        </p:cxnSp>
+        <p:cxnSp>
+          <p:nvCxnSpPr>
+            <p:cNvPr id="25" name="Straight Connector 24"/>
+            <p:cNvCxnSpPr/>
+            <p:nvPr/>
+          </p:nvCxnSpPr>
+          <p:spPr>
+            <a:xfrm>
+              <a:off x="2391372" y="1085133"/>
+              <a:ext cx="0" cy="497994"/>
+            </a:xfrm>
+            <a:prstGeom prst="line">
+              <a:avLst/>
+            </a:prstGeom>
+            <a:ln w="9525">
+              <a:prstDash val="sysDash"/>
+              <a:headEnd type="none" w="med" len="med"/>
+              <a:tailEnd type="none" w="med" len="med"/>
+            </a:ln>
+          </p:spPr>
+          <p:style>
+            <a:lnRef idx="1">
+              <a:schemeClr val="dk1"/>
+            </a:lnRef>
+            <a:fillRef idx="0">
+              <a:schemeClr val="dk1"/>
+            </a:fillRef>
+            <a:effectRef idx="0">
+              <a:schemeClr val="dk1"/>
+            </a:effectRef>
+            <a:fontRef idx="minor">
+              <a:schemeClr val="tx1"/>
+            </a:fontRef>
+          </p:style>
+        </p:cxnSp>
+        <p:cxnSp>
+          <p:nvCxnSpPr>
+            <p:cNvPr id="27" name="Straight Connector 26"/>
+            <p:cNvCxnSpPr/>
+            <p:nvPr/>
+          </p:nvCxnSpPr>
+          <p:spPr>
+            <a:xfrm>
+              <a:off x="2751372" y="1085133"/>
+              <a:ext cx="0" cy="497994"/>
+            </a:xfrm>
+            <a:prstGeom prst="line">
+              <a:avLst/>
+            </a:prstGeom>
+            <a:ln w="9525">
+              <a:prstDash val="sysDash"/>
+              <a:headEnd type="none" w="med" len="med"/>
+              <a:tailEnd type="none" w="med" len="med"/>
+            </a:ln>
+          </p:spPr>
+          <p:style>
+            <a:lnRef idx="1">
+              <a:schemeClr val="dk1"/>
+            </a:lnRef>
+            <a:fillRef idx="0">
+              <a:schemeClr val="dk1"/>
+            </a:fillRef>
+            <a:effectRef idx="0">
+              <a:schemeClr val="dk1"/>
+            </a:effectRef>
+            <a:fontRef idx="minor">
+              <a:schemeClr val="tx1"/>
+            </a:fontRef>
+          </p:style>
+        </p:cxnSp>
+      </p:grpSp>
+      <mc:AlternateContent xmlns:mc="http://schemas.openxmlformats.org/markup-compatibility/2006">
+        <mc:Choice xmlns:a14="http://schemas.microsoft.com/office/drawing/2010/main" Requires="a14">
+          <p:sp>
+            <p:nvSpPr>
+              <p:cNvPr id="29" name="TextBox 28"/>
+              <p:cNvSpPr txBox="1"/>
+              <p:nvPr/>
+            </p:nvSpPr>
+            <p:spPr>
+              <a:xfrm>
+                <a:off x="1441783" y="1567407"/>
+                <a:ext cx="195502" cy="153888"/>
+              </a:xfrm>
+              <a:prstGeom prst="rect">
+                <a:avLst/>
+              </a:prstGeom>
+              <a:noFill/>
+            </p:spPr>
+            <p:txBody>
+              <a:bodyPr wrap="none" lIns="0" tIns="0" rIns="0" bIns="0" rtlCol="0">
+                <a:spAutoFit/>
+              </a:bodyPr>
+              <a:lstStyle/>
+              <a:p>
+                <a:pPr/>
+                <a14:m>
+                  <m:oMathPara xmlns:m="http://schemas.openxmlformats.org/officeDocument/2006/math">
+                    <m:oMathParaPr>
+                      <m:jc m:val="centerGroup"/>
+                    </m:oMathParaPr>
+                    <m:oMath xmlns:m="http://schemas.openxmlformats.org/officeDocument/2006/math">
+                      <m:sSub>
+                        <m:sSubPr>
+                          <m:ctrlPr>
+                            <a:rPr lang="en-US" sz="1000" b="0" i="1" smtClean="0">
+                              <a:latin typeface="Cambria Math" panose="02040503050406030204" pitchFamily="18" charset="0"/>
+                            </a:rPr>
+                          </m:ctrlPr>
+                        </m:sSubPr>
+                        <m:e>
+                          <m:r>
+                            <a:rPr lang="en-US" sz="1000" b="0" i="1" smtClean="0">
+                              <a:latin typeface="Cambria Math" panose="02040503050406030204" pitchFamily="18" charset="0"/>
+                            </a:rPr>
+                            <m:t>𝑝</m:t>
+                          </m:r>
+                        </m:e>
+                        <m:sub>
+                          <m:r>
+                            <a:rPr lang="en-US" sz="1000" b="0" i="1" smtClean="0">
+                              <a:latin typeface="Cambria Math" panose="02040503050406030204" pitchFamily="18" charset="0"/>
+                            </a:rPr>
+                            <m:t>𝑊</m:t>
+                          </m:r>
+                        </m:sub>
+                      </m:sSub>
+                    </m:oMath>
+                  </m:oMathPara>
+                </a14:m>
+                <a:endParaRPr lang="en-GB" sz="1000" dirty="0"/>
+              </a:p>
+            </p:txBody>
+          </p:sp>
+        </mc:Choice>
+        <mc:Fallback>
+          <p:sp>
+            <p:nvSpPr>
+              <p:cNvPr id="29" name="TextBox 28"/>
+              <p:cNvSpPr txBox="1">
+                <a:spLocks noRot="1" noChangeAspect="1" noMove="1" noResize="1" noEditPoints="1" noAdjustHandles="1" noChangeArrowheads="1" noChangeShapeType="1" noTextEdit="1"/>
+              </p:cNvSpPr>
+              <p:nvPr/>
+            </p:nvSpPr>
+            <p:spPr>
+              <a:xfrm>
+                <a:off x="1441783" y="1567407"/>
+                <a:ext cx="195502" cy="153888"/>
+              </a:xfrm>
+              <a:prstGeom prst="rect">
+                <a:avLst/>
+              </a:prstGeom>
+              <a:blipFill>
+                <a:blip r:embed="rId3"/>
+                <a:stretch>
+                  <a:fillRect l="-18750" r="-3125" b="-28000"/>
+                </a:stretch>
+              </a:blipFill>
+            </p:spPr>
+            <p:txBody>
+              <a:bodyPr/>
+              <a:lstStyle/>
+              <a:p>
+                <a:r>
+                  <a:rPr lang="en-GB">
+                    <a:noFill/>
+                  </a:rPr>
+                  <a:t> </a:t>
+                </a:r>
+              </a:p>
+            </p:txBody>
+          </p:sp>
+        </mc:Fallback>
+      </mc:AlternateContent>
+      <mc:AlternateContent xmlns:mc="http://schemas.openxmlformats.org/markup-compatibility/2006">
+        <mc:Choice xmlns:a14="http://schemas.microsoft.com/office/drawing/2010/main" Requires="a14">
+          <p:sp>
+            <p:nvSpPr>
+              <p:cNvPr id="30" name="TextBox 29"/>
+              <p:cNvSpPr txBox="1"/>
+              <p:nvPr/>
+            </p:nvSpPr>
+            <p:spPr>
+              <a:xfrm>
+                <a:off x="2156576" y="1583127"/>
+                <a:ext cx="165237" cy="153888"/>
+              </a:xfrm>
+              <a:prstGeom prst="rect">
+                <a:avLst/>
+              </a:prstGeom>
+              <a:noFill/>
+            </p:spPr>
+            <p:txBody>
+              <a:bodyPr wrap="none" lIns="0" tIns="0" rIns="0" bIns="0" rtlCol="0">
+                <a:spAutoFit/>
+              </a:bodyPr>
+              <a:lstStyle/>
+              <a:p>
+                <a:pPr/>
+                <a14:m>
+                  <m:oMathPara xmlns:m="http://schemas.openxmlformats.org/officeDocument/2006/math">
+                    <m:oMathParaPr>
+                      <m:jc m:val="centerGroup"/>
+                    </m:oMathParaPr>
+                    <m:oMath xmlns:m="http://schemas.openxmlformats.org/officeDocument/2006/math">
+                      <m:sSub>
+                        <m:sSubPr>
+                          <m:ctrlPr>
+                            <a:rPr lang="en-US" sz="1000" b="0" i="1" smtClean="0">
+                              <a:latin typeface="Cambria Math" panose="02040503050406030204" pitchFamily="18" charset="0"/>
+                            </a:rPr>
+                          </m:ctrlPr>
+                        </m:sSubPr>
+                        <m:e>
+                          <m:r>
+                            <a:rPr lang="en-US" sz="1000" b="0" i="1" smtClean="0">
+                              <a:latin typeface="Cambria Math" panose="02040503050406030204" pitchFamily="18" charset="0"/>
+                            </a:rPr>
+                            <m:t>𝑝</m:t>
+                          </m:r>
+                        </m:e>
+                        <m:sub>
+                          <m:r>
+                            <a:rPr lang="en-US" sz="1000" b="0" i="1" smtClean="0">
+                              <a:latin typeface="Cambria Math" panose="02040503050406030204" pitchFamily="18" charset="0"/>
+                            </a:rPr>
+                            <m:t>𝐸</m:t>
+                          </m:r>
+                        </m:sub>
+                      </m:sSub>
+                    </m:oMath>
+                  </m:oMathPara>
+                </a14:m>
+                <a:endParaRPr lang="en-GB" sz="1000" dirty="0"/>
+              </a:p>
+            </p:txBody>
+          </p:sp>
+        </mc:Choice>
+        <mc:Fallback>
+          <p:sp>
+            <p:nvSpPr>
+              <p:cNvPr id="30" name="TextBox 29"/>
+              <p:cNvSpPr txBox="1">
+                <a:spLocks noRot="1" noChangeAspect="1" noMove="1" noResize="1" noEditPoints="1" noAdjustHandles="1" noChangeArrowheads="1" noChangeShapeType="1" noTextEdit="1"/>
+              </p:cNvSpPr>
+              <p:nvPr/>
+            </p:nvSpPr>
+            <p:spPr>
+              <a:xfrm>
+                <a:off x="2156576" y="1583127"/>
+                <a:ext cx="165237" cy="153888"/>
+              </a:xfrm>
+              <a:prstGeom prst="rect">
+                <a:avLst/>
+              </a:prstGeom>
+              <a:blipFill>
+                <a:blip r:embed="rId4"/>
+                <a:stretch>
+                  <a:fillRect l="-22222" r="-3704" b="-24000"/>
+                </a:stretch>
+              </a:blipFill>
+            </p:spPr>
+            <p:txBody>
+              <a:bodyPr/>
+              <a:lstStyle/>
+              <a:p>
+                <a:r>
+                  <a:rPr lang="en-GB">
+                    <a:noFill/>
+                  </a:rPr>
+                  <a:t> </a:t>
+                </a:r>
+              </a:p>
+            </p:txBody>
+          </p:sp>
+        </mc:Fallback>
+      </mc:AlternateContent>
+      <mc:AlternateContent xmlns:mc="http://schemas.openxmlformats.org/markup-compatibility/2006">
+        <mc:Choice xmlns:a14="http://schemas.microsoft.com/office/drawing/2010/main" Requires="a14">
+          <p:sp>
+            <p:nvSpPr>
+              <p:cNvPr id="31" name="TextBox 30"/>
+              <p:cNvSpPr txBox="1"/>
+              <p:nvPr/>
+            </p:nvSpPr>
+            <p:spPr>
+              <a:xfrm>
+                <a:off x="1969192" y="904607"/>
+                <a:ext cx="155427" cy="153888"/>
+              </a:xfrm>
+              <a:prstGeom prst="rect">
+                <a:avLst/>
+              </a:prstGeom>
+              <a:noFill/>
+            </p:spPr>
+            <p:txBody>
+              <a:bodyPr wrap="none" lIns="0" tIns="0" rIns="0" bIns="0" rtlCol="0">
+                <a:spAutoFit/>
+              </a:bodyPr>
+              <a:lstStyle/>
+              <a:p>
+                <a:pPr/>
+                <a14:m>
+                  <m:oMathPara xmlns:m="http://schemas.openxmlformats.org/officeDocument/2006/math">
+                    <m:oMathParaPr>
+                      <m:jc m:val="centerGroup"/>
+                    </m:oMathParaPr>
+                    <m:oMath xmlns:m="http://schemas.openxmlformats.org/officeDocument/2006/math">
+                      <m:sSub>
+                        <m:sSubPr>
+                          <m:ctrlPr>
+                            <a:rPr lang="en-US" sz="1000" b="0" i="1" smtClean="0">
+                              <a:latin typeface="Cambria Math" panose="02040503050406030204" pitchFamily="18" charset="0"/>
+                            </a:rPr>
+                          </m:ctrlPr>
+                        </m:sSubPr>
+                        <m:e>
+                          <m:r>
+                            <a:rPr lang="en-US" sz="1000" b="0" i="1" smtClean="0">
+                              <a:latin typeface="Cambria Math" panose="02040503050406030204" pitchFamily="18" charset="0"/>
+                            </a:rPr>
+                            <m:t>𝑝</m:t>
+                          </m:r>
+                        </m:e>
+                        <m:sub>
+                          <m:r>
+                            <a:rPr lang="en-US" sz="1000" b="0" i="1" smtClean="0">
+                              <a:latin typeface="Cambria Math" panose="02040503050406030204" pitchFamily="18" charset="0"/>
+                            </a:rPr>
+                            <m:t>𝑒</m:t>
+                          </m:r>
+                        </m:sub>
+                      </m:sSub>
+                    </m:oMath>
+                  </m:oMathPara>
+                </a14:m>
+                <a:endParaRPr lang="en-GB" sz="1000" dirty="0"/>
+              </a:p>
+            </p:txBody>
+          </p:sp>
+        </mc:Choice>
+        <mc:Fallback>
+          <p:sp>
+            <p:nvSpPr>
+              <p:cNvPr id="31" name="TextBox 30"/>
+              <p:cNvSpPr txBox="1">
+                <a:spLocks noRot="1" noChangeAspect="1" noMove="1" noResize="1" noEditPoints="1" noAdjustHandles="1" noChangeArrowheads="1" noChangeShapeType="1" noTextEdit="1"/>
+              </p:cNvSpPr>
+              <p:nvPr/>
+            </p:nvSpPr>
+            <p:spPr>
+              <a:xfrm>
+                <a:off x="1969192" y="904607"/>
+                <a:ext cx="155427" cy="153888"/>
+              </a:xfrm>
+              <a:prstGeom prst="rect">
+                <a:avLst/>
+              </a:prstGeom>
+              <a:blipFill>
+                <a:blip r:embed="rId5"/>
+                <a:stretch>
+                  <a:fillRect l="-19231" b="-23077"/>
+                </a:stretch>
+              </a:blipFill>
+            </p:spPr>
+            <p:txBody>
+              <a:bodyPr/>
+              <a:lstStyle/>
+              <a:p>
+                <a:r>
+                  <a:rPr lang="en-GB">
+                    <a:noFill/>
+                  </a:rPr>
+                  <a:t> </a:t>
+                </a:r>
+              </a:p>
+            </p:txBody>
+          </p:sp>
+        </mc:Fallback>
+      </mc:AlternateContent>
+      <mc:AlternateContent xmlns:mc="http://schemas.openxmlformats.org/markup-compatibility/2006">
+        <mc:Choice xmlns:a14="http://schemas.microsoft.com/office/drawing/2010/main" Requires="a14">
+          <p:sp>
+            <p:nvSpPr>
+              <p:cNvPr id="32" name="TextBox 31"/>
+              <p:cNvSpPr txBox="1"/>
+              <p:nvPr/>
+            </p:nvSpPr>
+            <p:spPr>
+              <a:xfrm>
+                <a:off x="1606517" y="896747"/>
+                <a:ext cx="180626" cy="153888"/>
+              </a:xfrm>
+              <a:prstGeom prst="rect">
+                <a:avLst/>
+              </a:prstGeom>
+              <a:noFill/>
+            </p:spPr>
+            <p:txBody>
+              <a:bodyPr wrap="none" lIns="0" tIns="0" rIns="0" bIns="0" rtlCol="0">
+                <a:spAutoFit/>
+              </a:bodyPr>
+              <a:lstStyle/>
+              <a:p>
+                <a:pPr/>
+                <a14:m>
+                  <m:oMathPara xmlns:m="http://schemas.openxmlformats.org/officeDocument/2006/math">
+                    <m:oMathParaPr>
+                      <m:jc m:val="centerGroup"/>
+                    </m:oMathParaPr>
+                    <m:oMath xmlns:m="http://schemas.openxmlformats.org/officeDocument/2006/math">
+                      <m:sSub>
+                        <m:sSubPr>
+                          <m:ctrlPr>
+                            <a:rPr lang="en-US" sz="1000" b="0" i="1" smtClean="0">
+                              <a:latin typeface="Cambria Math" panose="02040503050406030204" pitchFamily="18" charset="0"/>
+                            </a:rPr>
+                          </m:ctrlPr>
+                        </m:sSubPr>
+                        <m:e>
+                          <m:r>
+                            <a:rPr lang="en-US" sz="1000" b="0" i="1" smtClean="0">
+                              <a:latin typeface="Cambria Math" panose="02040503050406030204" pitchFamily="18" charset="0"/>
+                            </a:rPr>
+                            <m:t>𝑝</m:t>
+                          </m:r>
+                        </m:e>
+                        <m:sub>
+                          <m:r>
+                            <a:rPr lang="en-US" sz="1000" b="0" i="1" smtClean="0">
+                              <a:latin typeface="Cambria Math" panose="02040503050406030204" pitchFamily="18" charset="0"/>
+                            </a:rPr>
+                            <m:t>𝑤</m:t>
+                          </m:r>
+                        </m:sub>
+                      </m:sSub>
+                    </m:oMath>
+                  </m:oMathPara>
+                </a14:m>
+                <a:endParaRPr lang="en-GB" sz="1000" dirty="0"/>
+              </a:p>
+            </p:txBody>
+          </p:sp>
+        </mc:Choice>
+        <mc:Fallback>
+          <p:sp>
+            <p:nvSpPr>
+              <p:cNvPr id="32" name="TextBox 31"/>
+              <p:cNvSpPr txBox="1">
+                <a:spLocks noRot="1" noChangeAspect="1" noMove="1" noResize="1" noEditPoints="1" noAdjustHandles="1" noChangeArrowheads="1" noChangeShapeType="1" noTextEdit="1"/>
+              </p:cNvSpPr>
+              <p:nvPr/>
+            </p:nvSpPr>
+            <p:spPr>
+              <a:xfrm>
+                <a:off x="1606517" y="896747"/>
+                <a:ext cx="180626" cy="153888"/>
+              </a:xfrm>
+              <a:prstGeom prst="rect">
+                <a:avLst/>
+              </a:prstGeom>
+              <a:blipFill>
+                <a:blip r:embed="rId6"/>
+                <a:stretch>
+                  <a:fillRect l="-20690" b="-28000"/>
+                </a:stretch>
+              </a:blipFill>
+            </p:spPr>
+            <p:txBody>
+              <a:bodyPr/>
+              <a:lstStyle/>
+              <a:p>
+                <a:r>
+                  <a:rPr lang="en-GB">
+                    <a:noFill/>
+                  </a:rPr>
+                  <a:t> </a:t>
+                </a:r>
+              </a:p>
+            </p:txBody>
+          </p:sp>
+        </mc:Fallback>
+      </mc:AlternateContent>
+      <mc:AlternateContent xmlns:mc="http://schemas.openxmlformats.org/markup-compatibility/2006">
+        <mc:Choice xmlns:a14="http://schemas.microsoft.com/office/drawing/2010/main" Requires="a14">
+          <p:sp>
+            <p:nvSpPr>
+              <p:cNvPr id="33" name="TextBox 32"/>
+              <p:cNvSpPr txBox="1"/>
+              <p:nvPr/>
+            </p:nvSpPr>
+            <p:spPr>
+              <a:xfrm>
+                <a:off x="1992199" y="1583127"/>
+                <a:ext cx="125034" cy="153888"/>
+              </a:xfrm>
+              <a:prstGeom prst="rect">
+                <a:avLst/>
+              </a:prstGeom>
+              <a:noFill/>
+            </p:spPr>
+            <p:txBody>
+              <a:bodyPr wrap="none" lIns="0" tIns="0" rIns="0" bIns="0" rtlCol="0">
+                <a:spAutoFit/>
+              </a:bodyPr>
+              <a:lstStyle/>
+              <a:p>
+                <a:pPr/>
+                <a14:m>
+                  <m:oMathPara xmlns:m="http://schemas.openxmlformats.org/officeDocument/2006/math">
+                    <m:oMathParaPr>
+                      <m:jc m:val="centerGroup"/>
+                    </m:oMathParaPr>
+                    <m:oMath xmlns:m="http://schemas.openxmlformats.org/officeDocument/2006/math">
+                      <m:r>
+                        <a:rPr lang="en-GB" sz="1000" i="1" smtClean="0">
+                          <a:latin typeface="Cambria Math" panose="02040503050406030204" pitchFamily="18" charset="0"/>
+                          <a:ea typeface="Cambria Math" panose="02040503050406030204" pitchFamily="18" charset="0"/>
+                        </a:rPr>
+                        <m:t>&lt;</m:t>
+                      </m:r>
+                    </m:oMath>
+                  </m:oMathPara>
+                </a14:m>
+                <a:endParaRPr lang="en-GB" sz="1000" dirty="0"/>
+              </a:p>
+            </p:txBody>
+          </p:sp>
+        </mc:Choice>
+        <mc:Fallback>
+          <p:sp>
+            <p:nvSpPr>
+              <p:cNvPr id="33" name="TextBox 32"/>
+              <p:cNvSpPr txBox="1">
+                <a:spLocks noRot="1" noChangeAspect="1" noMove="1" noResize="1" noEditPoints="1" noAdjustHandles="1" noChangeArrowheads="1" noChangeShapeType="1" noTextEdit="1"/>
+              </p:cNvSpPr>
+              <p:nvPr/>
+            </p:nvSpPr>
+            <p:spPr>
+              <a:xfrm>
+                <a:off x="1992199" y="1583127"/>
+                <a:ext cx="125034" cy="153888"/>
+              </a:xfrm>
+              <a:prstGeom prst="rect">
+                <a:avLst/>
+              </a:prstGeom>
+              <a:blipFill>
+                <a:blip r:embed="rId7"/>
+                <a:stretch>
+                  <a:fillRect l="-25000" r="-20000" b="-4000"/>
+                </a:stretch>
+              </a:blipFill>
+            </p:spPr>
+            <p:txBody>
+              <a:bodyPr/>
+              <a:lstStyle/>
+              <a:p>
+                <a:r>
+                  <a:rPr lang="en-GB">
+                    <a:noFill/>
+                  </a:rPr>
+                  <a:t> </a:t>
+                </a:r>
+              </a:p>
+            </p:txBody>
+          </p:sp>
+        </mc:Fallback>
+      </mc:AlternateContent>
+      <mc:AlternateContent xmlns:mc="http://schemas.openxmlformats.org/markup-compatibility/2006">
+        <mc:Choice xmlns:a14="http://schemas.microsoft.com/office/drawing/2010/main" Requires="a14">
+          <p:sp>
+            <p:nvSpPr>
+              <p:cNvPr id="34" name="TextBox 33"/>
+              <p:cNvSpPr txBox="1"/>
+              <p:nvPr/>
+            </p:nvSpPr>
+            <p:spPr>
+              <a:xfrm>
+                <a:off x="1649871" y="1583127"/>
+                <a:ext cx="125034" cy="153888"/>
+              </a:xfrm>
+              <a:prstGeom prst="rect">
+                <a:avLst/>
+              </a:prstGeom>
+              <a:noFill/>
+            </p:spPr>
+            <p:txBody>
+              <a:bodyPr wrap="none" lIns="0" tIns="0" rIns="0" bIns="0" rtlCol="0">
+                <a:spAutoFit/>
+              </a:bodyPr>
+              <a:lstStyle/>
+              <a:p>
+                <a:pPr/>
+                <a14:m>
+                  <m:oMathPara xmlns:m="http://schemas.openxmlformats.org/officeDocument/2006/math">
+                    <m:oMathParaPr>
+                      <m:jc m:val="centerGroup"/>
+                    </m:oMathParaPr>
+                    <m:oMath xmlns:m="http://schemas.openxmlformats.org/officeDocument/2006/math">
+                      <m:r>
+                        <a:rPr lang="en-GB" sz="1000" i="1" smtClean="0">
+                          <a:latin typeface="Cambria Math" panose="02040503050406030204" pitchFamily="18" charset="0"/>
+                          <a:ea typeface="Cambria Math" panose="02040503050406030204" pitchFamily="18" charset="0"/>
+                        </a:rPr>
+                        <m:t>&gt;</m:t>
+                      </m:r>
+                    </m:oMath>
+                  </m:oMathPara>
+                </a14:m>
+                <a:endParaRPr lang="en-GB" sz="1000" dirty="0"/>
+              </a:p>
+            </p:txBody>
+          </p:sp>
+        </mc:Choice>
+        <mc:Fallback>
+          <p:sp>
+            <p:nvSpPr>
+              <p:cNvPr id="34" name="TextBox 33"/>
+              <p:cNvSpPr txBox="1">
+                <a:spLocks noRot="1" noChangeAspect="1" noMove="1" noResize="1" noEditPoints="1" noAdjustHandles="1" noChangeArrowheads="1" noChangeShapeType="1" noTextEdit="1"/>
+              </p:cNvSpPr>
+              <p:nvPr/>
+            </p:nvSpPr>
+            <p:spPr>
+              <a:xfrm>
+                <a:off x="1649871" y="1583127"/>
+                <a:ext cx="125034" cy="153888"/>
+              </a:xfrm>
+              <a:prstGeom prst="rect">
+                <a:avLst/>
+              </a:prstGeom>
+              <a:blipFill>
+                <a:blip r:embed="rId8"/>
+                <a:stretch>
+                  <a:fillRect l="-25000" r="-20000" b="-4000"/>
+                </a:stretch>
+              </a:blipFill>
+            </p:spPr>
+            <p:txBody>
+              <a:bodyPr/>
+              <a:lstStyle/>
+              <a:p>
+                <a:r>
+                  <a:rPr lang="en-GB">
+                    <a:noFill/>
+                  </a:rPr>
+                  <a:t> </a:t>
+                </a:r>
+              </a:p>
+            </p:txBody>
+          </p:sp>
+        </mc:Fallback>
+      </mc:AlternateContent>
+      <p:sp>
+        <p:nvSpPr>
+          <p:cNvPr id="35" name="TextBox 34"/>
+          <p:cNvSpPr txBox="1"/>
+          <p:nvPr/>
+        </p:nvSpPr>
+        <p:spPr>
+          <a:xfrm>
+            <a:off x="1818258" y="904607"/>
+            <a:ext cx="64120" cy="153888"/>
+          </a:xfrm>
+          <a:prstGeom prst="rect">
+            <a:avLst/>
+          </a:prstGeom>
+          <a:noFill/>
+        </p:spPr>
+        <p:txBody>
+          <a:bodyPr wrap="none" lIns="0" tIns="0" rIns="0" bIns="0" rtlCol="0">
+            <a:spAutoFit/>
+          </a:bodyPr>
+          <a:lstStyle/>
+          <a:p>
+            <a:pPr/>
+            <a:r>
+              <a:rPr lang="en-US" sz="1000" dirty="0" smtClean="0"/>
+              <a:t>=</a:t>
+            </a:r>
+            <a:endParaRPr lang="en-GB" sz="1000" dirty="0"/>
           </a:p>
         </p:txBody>
       </p:sp>
     </p:spTree>
     <p:extLst>
       <p:ext uri="{BB962C8B-B14F-4D97-AF65-F5344CB8AC3E}">
-        <p14:creationId xmlns:p14="http://schemas.microsoft.com/office/powerpoint/2010/main" val="2014354962"/>
+        <p14:creationId xmlns:p14="http://schemas.microsoft.com/office/powerpoint/2010/main" val="991767696"/>
+      </p:ext>
+    </p:extLst>
+  </p:cSld>
+  <p:clrMapOvr>
+    <a:masterClrMapping/>
+  </p:clrMapOvr>
+</p:sld>
+</file>
+
+<file path=ppt/slides/slide16.xml><?xml version="1.0" encoding="utf-8"?>
+<p:sld xmlns:a="http://schemas.openxmlformats.org/drawingml/2006/main" xmlns:r="http://schemas.openxmlformats.org/officeDocument/2006/relationships" xmlns:p="http://schemas.openxmlformats.org/presentationml/2006/main">
+  <p:cSld>
+    <p:spTree>
+      <p:nvGrpSpPr>
+        <p:cNvPr id="1" name=""/>
+        <p:cNvGrpSpPr/>
+        <p:nvPr/>
+      </p:nvGrpSpPr>
+      <p:grpSpPr>
+        <a:xfrm>
+          <a:off x="0" y="0"/>
+          <a:ext cx="0" cy="0"/>
+          <a:chOff x="0" y="0"/>
+          <a:chExt cx="0" cy="0"/>
+        </a:xfrm>
+      </p:grpSpPr>
+      <p:sp>
+        <p:nvSpPr>
+          <p:cNvPr id="2" name="Title 1"/>
+          <p:cNvSpPr>
+            <a:spLocks noGrp="1"/>
+          </p:cNvSpPr>
+          <p:nvPr>
+            <p:ph type="title"/>
+          </p:nvPr>
+        </p:nvSpPr>
+        <p:spPr/>
+        <p:txBody>
+          <a:bodyPr/>
+          <a:lstStyle/>
+          <a:p>
+            <a:endParaRPr lang="en-GB" dirty="0"/>
+          </a:p>
+        </p:txBody>
+      </p:sp>
+    </p:spTree>
+    <p:extLst>
+      <p:ext uri="{BB962C8B-B14F-4D97-AF65-F5344CB8AC3E}">
+        <p14:creationId xmlns:p14="http://schemas.microsoft.com/office/powerpoint/2010/main" val="2775895910"/>
+      </p:ext>
+    </p:extLst>
+  </p:cSld>
+  <p:clrMapOvr>
+    <a:masterClrMapping/>
+  </p:clrMapOvr>
+</p:sld>
+</file>
+
+<file path=ppt/slides/slide17.xml><?xml version="1.0" encoding="utf-8"?>
+<p:sld xmlns:a="http://schemas.openxmlformats.org/drawingml/2006/main" xmlns:r="http://schemas.openxmlformats.org/officeDocument/2006/relationships" xmlns:p="http://schemas.openxmlformats.org/presentationml/2006/main">
+  <p:cSld>
+    <p:spTree>
+      <p:nvGrpSpPr>
+        <p:cNvPr id="1" name=""/>
+        <p:cNvGrpSpPr/>
+        <p:nvPr/>
+      </p:nvGrpSpPr>
+      <p:grpSpPr>
+        <a:xfrm>
+          <a:off x="0" y="0"/>
+          <a:ext cx="0" cy="0"/>
+          <a:chOff x="0" y="0"/>
+          <a:chExt cx="0" cy="0"/>
+        </a:xfrm>
+      </p:grpSpPr>
+      <p:sp>
+        <p:nvSpPr>
+          <p:cNvPr id="2" name="Title 1"/>
+          <p:cNvSpPr>
+            <a:spLocks noGrp="1"/>
+          </p:cNvSpPr>
+          <p:nvPr>
+            <p:ph type="title"/>
+          </p:nvPr>
+        </p:nvSpPr>
+        <p:spPr/>
+        <p:txBody>
+          <a:bodyPr/>
+          <a:lstStyle/>
+          <a:p>
+            <a:endParaRPr lang="en-GB" dirty="0"/>
+          </a:p>
+        </p:txBody>
+      </p:sp>
+    </p:spTree>
+    <p:extLst>
+      <p:ext uri="{BB962C8B-B14F-4D97-AF65-F5344CB8AC3E}">
+        <p14:creationId xmlns:p14="http://schemas.microsoft.com/office/powerpoint/2010/main" val="3488095981"/>
       </p:ext>
     </p:extLst>
   </p:cSld>

</xml_diff>

<commit_message>
First complite version. All sections written
</commit_message>
<xml_diff>
--- a/lectureNotes/figures/powerPointRawFigures.pptx
+++ b/lectureNotes/figures/powerPointRawFigures.pptx
@@ -21,7 +21,10 @@
     <p:sldId id="265" r:id="rId15"/>
     <p:sldId id="270" r:id="rId16"/>
     <p:sldId id="271" r:id="rId17"/>
-    <p:sldId id="272" r:id="rId18"/>
+    <p:sldId id="275" r:id="rId18"/>
+    <p:sldId id="273" r:id="rId19"/>
+    <p:sldId id="274" r:id="rId20"/>
+    <p:sldId id="272" r:id="rId21"/>
   </p:sldIdLst>
   <p:sldSz cx="3959225" cy="2339975"/>
   <p:notesSz cx="6858000" cy="9144000"/>
@@ -259,7 +262,7 @@
           <a:p>
             <a:fld id="{53F5E09F-28DC-4F5E-9122-84F938C8DB47}" type="datetimeFigureOut">
               <a:rPr lang="en-GB" smtClean="0"/>
-              <a:t>2018-02-11</a:t>
+              <a:t>2018-03-09</a:t>
             </a:fld>
             <a:endParaRPr lang="en-GB"/>
           </a:p>
@@ -429,7 +432,7 @@
           <a:p>
             <a:fld id="{53F5E09F-28DC-4F5E-9122-84F938C8DB47}" type="datetimeFigureOut">
               <a:rPr lang="en-GB" smtClean="0"/>
-              <a:t>2018-02-11</a:t>
+              <a:t>2018-03-09</a:t>
             </a:fld>
             <a:endParaRPr lang="en-GB"/>
           </a:p>
@@ -609,7 +612,7 @@
           <a:p>
             <a:fld id="{53F5E09F-28DC-4F5E-9122-84F938C8DB47}" type="datetimeFigureOut">
               <a:rPr lang="en-GB" smtClean="0"/>
-              <a:t>2018-02-11</a:t>
+              <a:t>2018-03-09</a:t>
             </a:fld>
             <a:endParaRPr lang="en-GB"/>
           </a:p>
@@ -779,7 +782,7 @@
           <a:p>
             <a:fld id="{53F5E09F-28DC-4F5E-9122-84F938C8DB47}" type="datetimeFigureOut">
               <a:rPr lang="en-GB" smtClean="0"/>
-              <a:t>2018-02-11</a:t>
+              <a:t>2018-03-09</a:t>
             </a:fld>
             <a:endParaRPr lang="en-GB"/>
           </a:p>
@@ -1025,7 +1028,7 @@
           <a:p>
             <a:fld id="{53F5E09F-28DC-4F5E-9122-84F938C8DB47}" type="datetimeFigureOut">
               <a:rPr lang="en-GB" smtClean="0"/>
-              <a:t>2018-02-11</a:t>
+              <a:t>2018-03-09</a:t>
             </a:fld>
             <a:endParaRPr lang="en-GB"/>
           </a:p>
@@ -1257,7 +1260,7 @@
           <a:p>
             <a:fld id="{53F5E09F-28DC-4F5E-9122-84F938C8DB47}" type="datetimeFigureOut">
               <a:rPr lang="en-GB" smtClean="0"/>
-              <a:t>2018-02-11</a:t>
+              <a:t>2018-03-09</a:t>
             </a:fld>
             <a:endParaRPr lang="en-GB"/>
           </a:p>
@@ -1624,7 +1627,7 @@
           <a:p>
             <a:fld id="{53F5E09F-28DC-4F5E-9122-84F938C8DB47}" type="datetimeFigureOut">
               <a:rPr lang="en-GB" smtClean="0"/>
-              <a:t>2018-02-11</a:t>
+              <a:t>2018-03-09</a:t>
             </a:fld>
             <a:endParaRPr lang="en-GB"/>
           </a:p>
@@ -1742,7 +1745,7 @@
           <a:p>
             <a:fld id="{53F5E09F-28DC-4F5E-9122-84F938C8DB47}" type="datetimeFigureOut">
               <a:rPr lang="en-GB" smtClean="0"/>
-              <a:t>2018-02-11</a:t>
+              <a:t>2018-03-09</a:t>
             </a:fld>
             <a:endParaRPr lang="en-GB"/>
           </a:p>
@@ -1837,7 +1840,7 @@
           <a:p>
             <a:fld id="{53F5E09F-28DC-4F5E-9122-84F938C8DB47}" type="datetimeFigureOut">
               <a:rPr lang="en-GB" smtClean="0"/>
-              <a:t>2018-02-11</a:t>
+              <a:t>2018-03-09</a:t>
             </a:fld>
             <a:endParaRPr lang="en-GB"/>
           </a:p>
@@ -2114,7 +2117,7 @@
           <a:p>
             <a:fld id="{53F5E09F-28DC-4F5E-9122-84F938C8DB47}" type="datetimeFigureOut">
               <a:rPr lang="en-GB" smtClean="0"/>
-              <a:t>2018-02-11</a:t>
+              <a:t>2018-03-09</a:t>
             </a:fld>
             <a:endParaRPr lang="en-GB"/>
           </a:p>
@@ -2371,7 +2374,7 @@
           <a:p>
             <a:fld id="{53F5E09F-28DC-4F5E-9122-84F938C8DB47}" type="datetimeFigureOut">
               <a:rPr lang="en-GB" smtClean="0"/>
-              <a:t>2018-02-11</a:t>
+              <a:t>2018-03-09</a:t>
             </a:fld>
             <a:endParaRPr lang="en-GB"/>
           </a:p>
@@ -2584,7 +2587,7 @@
           <a:p>
             <a:fld id="{53F5E09F-28DC-4F5E-9122-84F938C8DB47}" type="datetimeFigureOut">
               <a:rPr lang="en-GB" smtClean="0"/>
-              <a:t>2018-02-11</a:t>
+              <a:t>2018-03-09</a:t>
             </a:fld>
             <a:endParaRPr lang="en-GB"/>
           </a:p>
@@ -3010,7 +3013,7 @@
       </p:sp>
       <p:sp>
         <p:nvSpPr>
-          <p:cNvPr id="3" name="Content Placeholder 2"/>
+          <p:cNvPr id="5" name="Content Placeholder 4"/>
           <p:cNvSpPr>
             <a:spLocks noGrp="1"/>
           </p:cNvSpPr>
@@ -3699,8 +3702,8 @@
           </p:sp>
         </p:grpSp>
       </p:grpSp>
-      <mc:AlternateContent xmlns:mc="http://schemas.openxmlformats.org/markup-compatibility/2006">
-        <mc:Choice xmlns:a14="http://schemas.microsoft.com/office/drawing/2010/main" Requires="a14">
+      <mc:AlternateContent xmlns:mc="http://schemas.openxmlformats.org/markup-compatibility/2006" xmlns:a14="http://schemas.microsoft.com/office/drawing/2010/main">
+        <mc:Choice Requires="a14">
           <p:sp>
             <p:nvSpPr>
               <p:cNvPr id="32" name="TextBox 31"/>
@@ -3840,7 +3843,7 @@
             </p:txBody>
           </p:sp>
         </mc:Choice>
-        <mc:Fallback>
+        <mc:Fallback xmlns="">
           <p:sp>
             <p:nvSpPr>
               <p:cNvPr id="32" name="TextBox 31"/>
@@ -3879,8 +3882,8 @@
           </p:sp>
         </mc:Fallback>
       </mc:AlternateContent>
-      <mc:AlternateContent xmlns:mc="http://schemas.openxmlformats.org/markup-compatibility/2006">
-        <mc:Choice xmlns:a14="http://schemas.microsoft.com/office/drawing/2010/main" Requires="a14">
+      <mc:AlternateContent xmlns:mc="http://schemas.openxmlformats.org/markup-compatibility/2006" xmlns:a14="http://schemas.microsoft.com/office/drawing/2010/main">
+        <mc:Choice Requires="a14">
           <p:sp>
             <p:nvSpPr>
               <p:cNvPr id="33" name="TextBox 32"/>
@@ -4014,7 +4017,7 @@
             </p:txBody>
           </p:sp>
         </mc:Choice>
-        <mc:Fallback>
+        <mc:Fallback xmlns="">
           <p:sp>
             <p:nvSpPr>
               <p:cNvPr id="33" name="TextBox 32"/>
@@ -5092,8 +5095,8 @@
           </a:p>
         </p:txBody>
       </p:sp>
-      <mc:AlternateContent xmlns:mc="http://schemas.openxmlformats.org/markup-compatibility/2006">
-        <mc:Choice xmlns:a14="http://schemas.microsoft.com/office/drawing/2010/main" Requires="a14">
+      <mc:AlternateContent xmlns:mc="http://schemas.openxmlformats.org/markup-compatibility/2006" xmlns:a14="http://schemas.microsoft.com/office/drawing/2010/main">
+        <mc:Choice Requires="a14">
           <p:sp>
             <p:nvSpPr>
               <p:cNvPr id="3" name="Rectangle 2"/>
@@ -5115,6 +5118,7 @@
               </a:bodyPr>
               <a:lstStyle/>
               <a:p>
+                <a:pPr/>
                 <a14:m>
                   <m:oMathPara xmlns:m="http://schemas.openxmlformats.org/officeDocument/2006/math">
                     <m:oMathParaPr>
@@ -5124,7 +5128,7 @@
                       <m:sSub>
                         <m:sSubPr>
                           <m:ctrlPr>
-                            <a:rPr lang="en-US" sz="1000" b="0" i="0" smtClean="0">
+                            <a:rPr lang="en-US" sz="1000" b="0" i="1" smtClean="0">
                               <a:latin typeface="Cambria Math" panose="02040503050406030204" pitchFamily="18" charset="0"/>
                             </a:rPr>
                           </m:ctrlPr>
@@ -5157,7 +5161,7 @@
             </p:txBody>
           </p:sp>
         </mc:Choice>
-        <mc:Fallback>
+        <mc:Fallback xmlns="">
           <p:sp>
             <p:nvSpPr>
               <p:cNvPr id="3" name="Rectangle 2"/>
@@ -5196,8 +5200,8 @@
           </p:sp>
         </mc:Fallback>
       </mc:AlternateContent>
-      <mc:AlternateContent xmlns:mc="http://schemas.openxmlformats.org/markup-compatibility/2006">
-        <mc:Choice xmlns:a14="http://schemas.microsoft.com/office/drawing/2010/main" Requires="a14">
+      <mc:AlternateContent xmlns:mc="http://schemas.openxmlformats.org/markup-compatibility/2006" xmlns:a14="http://schemas.microsoft.com/office/drawing/2010/main">
+        <mc:Choice Requires="a14">
           <p:sp>
             <p:nvSpPr>
               <p:cNvPr id="50" name="Rectangle 49"/>
@@ -5219,6 +5223,7 @@
               </a:bodyPr>
               <a:lstStyle/>
               <a:p>
+                <a:pPr/>
                 <a14:m>
                   <m:oMathPara xmlns:m="http://schemas.openxmlformats.org/officeDocument/2006/math">
                     <m:oMathParaPr>
@@ -5228,7 +5233,7 @@
                       <m:sSub>
                         <m:sSubPr>
                           <m:ctrlPr>
-                            <a:rPr lang="en-US" sz="1000" b="0" i="0" smtClean="0">
+                            <a:rPr lang="en-US" sz="1000" b="0" i="1" smtClean="0">
                               <a:latin typeface="Cambria Math" panose="02040503050406030204" pitchFamily="18" charset="0"/>
                             </a:rPr>
                           </m:ctrlPr>
@@ -5258,7 +5263,7 @@
             </p:txBody>
           </p:sp>
         </mc:Choice>
-        <mc:Fallback>
+        <mc:Fallback xmlns="">
           <p:sp>
             <p:nvSpPr>
               <p:cNvPr id="50" name="Rectangle 49"/>
@@ -5297,8 +5302,8 @@
           </p:sp>
         </mc:Fallback>
       </mc:AlternateContent>
-      <mc:AlternateContent xmlns:mc="http://schemas.openxmlformats.org/markup-compatibility/2006">
-        <mc:Choice xmlns:a14="http://schemas.microsoft.com/office/drawing/2010/main" Requires="a14">
+      <mc:AlternateContent xmlns:mc="http://schemas.openxmlformats.org/markup-compatibility/2006" xmlns:a14="http://schemas.microsoft.com/office/drawing/2010/main">
+        <mc:Choice Requires="a14">
           <p:sp>
             <p:nvSpPr>
               <p:cNvPr id="51" name="Rectangle 50"/>
@@ -5320,6 +5325,7 @@
               </a:bodyPr>
               <a:lstStyle/>
               <a:p>
+                <a:pPr/>
                 <a14:m>
                   <m:oMathPara xmlns:m="http://schemas.openxmlformats.org/officeDocument/2006/math">
                     <m:oMathParaPr>
@@ -5329,7 +5335,7 @@
                       <m:sSub>
                         <m:sSubPr>
                           <m:ctrlPr>
-                            <a:rPr lang="en-US" sz="1000" b="0" i="0" smtClean="0">
+                            <a:rPr lang="en-US" sz="1000" b="0" i="1" smtClean="0">
                               <a:latin typeface="Cambria Math" panose="02040503050406030204" pitchFamily="18" charset="0"/>
                             </a:rPr>
                           </m:ctrlPr>
@@ -5359,7 +5365,7 @@
             </p:txBody>
           </p:sp>
         </mc:Choice>
-        <mc:Fallback>
+        <mc:Fallback xmlns="">
           <p:sp>
             <p:nvSpPr>
               <p:cNvPr id="51" name="Rectangle 50"/>
@@ -5398,8 +5404,8 @@
           </p:sp>
         </mc:Fallback>
       </mc:AlternateContent>
-      <mc:AlternateContent xmlns:mc="http://schemas.openxmlformats.org/markup-compatibility/2006">
-        <mc:Choice xmlns:a14="http://schemas.microsoft.com/office/drawing/2010/main" Requires="a14">
+      <mc:AlternateContent xmlns:mc="http://schemas.openxmlformats.org/markup-compatibility/2006" xmlns:a14="http://schemas.microsoft.com/office/drawing/2010/main">
+        <mc:Choice Requires="a14">
           <p:sp>
             <p:nvSpPr>
               <p:cNvPr id="52" name="Rectangle 51"/>
@@ -5421,6 +5427,7 @@
               </a:bodyPr>
               <a:lstStyle/>
               <a:p>
+                <a:pPr/>
                 <a14:m>
                   <m:oMathPara xmlns:m="http://schemas.openxmlformats.org/officeDocument/2006/math">
                     <m:oMathParaPr>
@@ -5430,7 +5437,7 @@
                       <m:sSub>
                         <m:sSubPr>
                           <m:ctrlPr>
-                            <a:rPr lang="en-US" sz="1000" b="0" i="0" smtClean="0">
+                            <a:rPr lang="en-US" sz="1000" b="0" i="1" smtClean="0">
                               <a:latin typeface="Cambria Math" panose="02040503050406030204" pitchFamily="18" charset="0"/>
                             </a:rPr>
                           </m:ctrlPr>
@@ -5463,7 +5470,7 @@
             </p:txBody>
           </p:sp>
         </mc:Choice>
-        <mc:Fallback>
+        <mc:Fallback xmlns="">
           <p:sp>
             <p:nvSpPr>
               <p:cNvPr id="52" name="Rectangle 51"/>
@@ -6775,8 +6782,8 @@
           </a:fontRef>
         </p:style>
       </p:cxnSp>
-      <mc:AlternateContent xmlns:mc="http://schemas.openxmlformats.org/markup-compatibility/2006">
-        <mc:Choice xmlns:a14="http://schemas.microsoft.com/office/drawing/2010/main" Requires="a14">
+      <mc:AlternateContent xmlns:mc="http://schemas.openxmlformats.org/markup-compatibility/2006" xmlns:a14="http://schemas.microsoft.com/office/drawing/2010/main">
+        <mc:Choice Requires="a14">
           <p:sp>
             <p:nvSpPr>
               <p:cNvPr id="4" name="TextBox 3"/>
@@ -6839,7 +6846,7 @@
             </p:txBody>
           </p:sp>
         </mc:Choice>
-        <mc:Fallback>
+        <mc:Fallback xmlns="">
           <p:sp>
             <p:nvSpPr>
               <p:cNvPr id="4" name="TextBox 3"/>
@@ -7273,8 +7280,8 @@
           </p:style>
         </p:cxnSp>
       </p:grpSp>
-      <mc:AlternateContent xmlns:mc="http://schemas.openxmlformats.org/markup-compatibility/2006">
-        <mc:Choice xmlns:a14="http://schemas.microsoft.com/office/drawing/2010/main" Requires="a14">
+      <mc:AlternateContent xmlns:mc="http://schemas.openxmlformats.org/markup-compatibility/2006" xmlns:a14="http://schemas.microsoft.com/office/drawing/2010/main">
+        <mc:Choice Requires="a14">
           <p:sp>
             <p:nvSpPr>
               <p:cNvPr id="29" name="TextBox 28"/>
@@ -7337,7 +7344,7 @@
             </p:txBody>
           </p:sp>
         </mc:Choice>
-        <mc:Fallback>
+        <mc:Fallback xmlns="">
           <p:sp>
             <p:nvSpPr>
               <p:cNvPr id="29" name="TextBox 28"/>
@@ -7376,8 +7383,8 @@
           </p:sp>
         </mc:Fallback>
       </mc:AlternateContent>
-      <mc:AlternateContent xmlns:mc="http://schemas.openxmlformats.org/markup-compatibility/2006">
-        <mc:Choice xmlns:a14="http://schemas.microsoft.com/office/drawing/2010/main" Requires="a14">
+      <mc:AlternateContent xmlns:mc="http://schemas.openxmlformats.org/markup-compatibility/2006" xmlns:a14="http://schemas.microsoft.com/office/drawing/2010/main">
+        <mc:Choice Requires="a14">
           <p:sp>
             <p:nvSpPr>
               <p:cNvPr id="30" name="TextBox 29"/>
@@ -7440,7 +7447,7 @@
             </p:txBody>
           </p:sp>
         </mc:Choice>
-        <mc:Fallback>
+        <mc:Fallback xmlns="">
           <p:sp>
             <p:nvSpPr>
               <p:cNvPr id="30" name="TextBox 29"/>
@@ -7479,8 +7486,8 @@
           </p:sp>
         </mc:Fallback>
       </mc:AlternateContent>
-      <mc:AlternateContent xmlns:mc="http://schemas.openxmlformats.org/markup-compatibility/2006">
-        <mc:Choice xmlns:a14="http://schemas.microsoft.com/office/drawing/2010/main" Requires="a14">
+      <mc:AlternateContent xmlns:mc="http://schemas.openxmlformats.org/markup-compatibility/2006" xmlns:a14="http://schemas.microsoft.com/office/drawing/2010/main">
+        <mc:Choice Requires="a14">
           <p:sp>
             <p:nvSpPr>
               <p:cNvPr id="31" name="TextBox 30"/>
@@ -7543,7 +7550,7 @@
             </p:txBody>
           </p:sp>
         </mc:Choice>
-        <mc:Fallback>
+        <mc:Fallback xmlns="">
           <p:sp>
             <p:nvSpPr>
               <p:cNvPr id="31" name="TextBox 30"/>
@@ -7582,8 +7589,8 @@
           </p:sp>
         </mc:Fallback>
       </mc:AlternateContent>
-      <mc:AlternateContent xmlns:mc="http://schemas.openxmlformats.org/markup-compatibility/2006">
-        <mc:Choice xmlns:a14="http://schemas.microsoft.com/office/drawing/2010/main" Requires="a14">
+      <mc:AlternateContent xmlns:mc="http://schemas.openxmlformats.org/markup-compatibility/2006" xmlns:a14="http://schemas.microsoft.com/office/drawing/2010/main">
+        <mc:Choice Requires="a14">
           <p:sp>
             <p:nvSpPr>
               <p:cNvPr id="32" name="TextBox 31"/>
@@ -7646,7 +7653,7 @@
             </p:txBody>
           </p:sp>
         </mc:Choice>
-        <mc:Fallback>
+        <mc:Fallback xmlns="">
           <p:sp>
             <p:nvSpPr>
               <p:cNvPr id="32" name="TextBox 31"/>
@@ -7685,8 +7692,8 @@
           </p:sp>
         </mc:Fallback>
       </mc:AlternateContent>
-      <mc:AlternateContent xmlns:mc="http://schemas.openxmlformats.org/markup-compatibility/2006">
-        <mc:Choice xmlns:a14="http://schemas.microsoft.com/office/drawing/2010/main" Requires="a14">
+      <mc:AlternateContent xmlns:mc="http://schemas.openxmlformats.org/markup-compatibility/2006" xmlns:a14="http://schemas.microsoft.com/office/drawing/2010/main">
+        <mc:Choice Requires="a14">
           <p:sp>
             <p:nvSpPr>
               <p:cNvPr id="33" name="TextBox 32"/>
@@ -7731,7 +7738,7 @@
             </p:txBody>
           </p:sp>
         </mc:Choice>
-        <mc:Fallback>
+        <mc:Fallback xmlns="">
           <p:sp>
             <p:nvSpPr>
               <p:cNvPr id="33" name="TextBox 32"/>
@@ -7770,8 +7777,8 @@
           </p:sp>
         </mc:Fallback>
       </mc:AlternateContent>
-      <mc:AlternateContent xmlns:mc="http://schemas.openxmlformats.org/markup-compatibility/2006">
-        <mc:Choice xmlns:a14="http://schemas.microsoft.com/office/drawing/2010/main" Requires="a14">
+      <mc:AlternateContent xmlns:mc="http://schemas.openxmlformats.org/markup-compatibility/2006" xmlns:a14="http://schemas.microsoft.com/office/drawing/2010/main">
+        <mc:Choice Requires="a14">
           <p:sp>
             <p:nvSpPr>
               <p:cNvPr id="34" name="TextBox 33"/>
@@ -7816,7 +7823,7 @@
             </p:txBody>
           </p:sp>
         </mc:Choice>
-        <mc:Fallback>
+        <mc:Fallback xmlns="">
           <p:sp>
             <p:nvSpPr>
               <p:cNvPr id="34" name="TextBox 33"/>
@@ -7877,7 +7884,6 @@
           </a:bodyPr>
           <a:lstStyle/>
           <a:p>
-            <a:pPr/>
             <a:r>
               <a:rPr lang="en-US" sz="1000" dirty="0" smtClean="0"/>
               <a:t>=</a:t>
@@ -7931,6 +7937,10 @@
           <a:bodyPr/>
           <a:lstStyle/>
           <a:p>
+            <a:r>
+              <a:rPr lang="en-US" dirty="0" smtClean="0"/>
+              <a:t>Mesh</a:t>
+            </a:r>
             <a:endParaRPr lang="en-GB" dirty="0"/>
           </a:p>
         </p:txBody>
@@ -7980,14 +7990,2959 @@
           <a:bodyPr/>
           <a:lstStyle/>
           <a:p>
+            <a:r>
+              <a:rPr lang="en-US" dirty="0" smtClean="0"/>
+              <a:t>orthogonality</a:t>
+            </a:r>
             <a:endParaRPr lang="en-GB" dirty="0"/>
+          </a:p>
+        </p:txBody>
+      </p:sp>
+      <p:sp>
+        <p:nvSpPr>
+          <p:cNvPr id="12" name="Rectangle 11"/>
+          <p:cNvSpPr/>
+          <p:nvPr/>
+        </p:nvSpPr>
+        <p:spPr>
+          <a:xfrm>
+            <a:off x="1173581" y="803632"/>
+            <a:ext cx="1712493" cy="1010881"/>
+          </a:xfrm>
+          <a:prstGeom prst="rect">
+            <a:avLst/>
+          </a:prstGeom>
+          <a:ln w="9525">
+            <a:solidFill>
+              <a:schemeClr val="tx1"/>
+            </a:solidFill>
+          </a:ln>
+        </p:spPr>
+        <p:style>
+          <a:lnRef idx="2">
+            <a:schemeClr val="accent6"/>
+          </a:lnRef>
+          <a:fillRef idx="1">
+            <a:schemeClr val="lt1"/>
+          </a:fillRef>
+          <a:effectRef idx="0">
+            <a:schemeClr val="accent6"/>
+          </a:effectRef>
+          <a:fontRef idx="minor">
+            <a:schemeClr val="dk1"/>
+          </a:fontRef>
+        </p:style>
+        <p:txBody>
+          <a:bodyPr rot="0" spcFirstLastPara="0" vertOverflow="overflow" horzOverflow="overflow" vert="horz" wrap="square" lIns="9577" tIns="4789" rIns="9577" bIns="4789" numCol="1" spcCol="0" rtlCol="0" fromWordArt="0" anchor="ctr" anchorCtr="0" forceAA="0" compatLnSpc="1">
+            <a:prstTxWarp prst="textNoShape">
+              <a:avLst/>
+            </a:prstTxWarp>
+            <a:noAutofit/>
+          </a:bodyPr>
+          <a:lstStyle/>
+          <a:p>
+            <a:pPr algn="ctr"/>
+            <a:endParaRPr lang="en-GB" sz="1000" dirty="0"/>
+          </a:p>
+        </p:txBody>
+      </p:sp>
+      <p:cxnSp>
+        <p:nvCxnSpPr>
+          <p:cNvPr id="13" name="Straight Connector 12"/>
+          <p:cNvCxnSpPr/>
+          <p:nvPr/>
+        </p:nvCxnSpPr>
+        <p:spPr>
+          <a:xfrm flipH="1">
+            <a:off x="1173582" y="803632"/>
+            <a:ext cx="1712492" cy="1010881"/>
+          </a:xfrm>
+          <a:prstGeom prst="line">
+            <a:avLst/>
+          </a:prstGeom>
+          <a:ln w="9525">
+            <a:headEnd type="none" w="med" len="med"/>
+            <a:tailEnd type="none" w="sm" len="sm"/>
+          </a:ln>
+        </p:spPr>
+        <p:style>
+          <a:lnRef idx="1">
+            <a:schemeClr val="dk1"/>
+          </a:lnRef>
+          <a:fillRef idx="0">
+            <a:schemeClr val="dk1"/>
+          </a:fillRef>
+          <a:effectRef idx="0">
+            <a:schemeClr val="dk1"/>
+          </a:effectRef>
+          <a:fontRef idx="minor">
+            <a:schemeClr val="tx1"/>
+          </a:fontRef>
+        </p:style>
+      </p:cxnSp>
+      <p:sp>
+        <p:nvSpPr>
+          <p:cNvPr id="17" name="Oval 16"/>
+          <p:cNvSpPr>
+            <a:spLocks noChangeAspect="1"/>
+          </p:cNvSpPr>
+          <p:nvPr/>
+        </p:nvSpPr>
+        <p:spPr>
+          <a:xfrm>
+            <a:off x="1548278" y="1167311"/>
+            <a:ext cx="25200" cy="25200"/>
+          </a:xfrm>
+          <a:prstGeom prst="ellipse">
+            <a:avLst/>
+          </a:prstGeom>
+        </p:spPr>
+        <p:style>
+          <a:lnRef idx="2">
+            <a:schemeClr val="dk1">
+              <a:shade val="50000"/>
+            </a:schemeClr>
+          </a:lnRef>
+          <a:fillRef idx="1">
+            <a:schemeClr val="dk1"/>
+          </a:fillRef>
+          <a:effectRef idx="0">
+            <a:schemeClr val="dk1"/>
+          </a:effectRef>
+          <a:fontRef idx="minor">
+            <a:schemeClr val="lt1"/>
+          </a:fontRef>
+        </p:style>
+        <p:txBody>
+          <a:bodyPr rtlCol="0" anchor="ctr"/>
+          <a:lstStyle/>
+          <a:p>
+            <a:pPr algn="ctr"/>
+            <a:endParaRPr lang="en-GB"/>
+          </a:p>
+        </p:txBody>
+      </p:sp>
+      <p:sp>
+        <p:nvSpPr>
+          <p:cNvPr id="18" name="Oval 17"/>
+          <p:cNvSpPr>
+            <a:spLocks noChangeAspect="1"/>
+          </p:cNvSpPr>
+          <p:nvPr/>
+        </p:nvSpPr>
+        <p:spPr>
+          <a:xfrm>
+            <a:off x="2374571" y="1464968"/>
+            <a:ext cx="25200" cy="25200"/>
+          </a:xfrm>
+          <a:prstGeom prst="ellipse">
+            <a:avLst/>
+          </a:prstGeom>
+        </p:spPr>
+        <p:style>
+          <a:lnRef idx="2">
+            <a:schemeClr val="dk1">
+              <a:shade val="50000"/>
+            </a:schemeClr>
+          </a:lnRef>
+          <a:fillRef idx="1">
+            <a:schemeClr val="dk1"/>
+          </a:fillRef>
+          <a:effectRef idx="0">
+            <a:schemeClr val="dk1"/>
+          </a:effectRef>
+          <a:fontRef idx="minor">
+            <a:schemeClr val="lt1"/>
+          </a:fontRef>
+        </p:style>
+        <p:txBody>
+          <a:bodyPr rtlCol="0" anchor="ctr"/>
+          <a:lstStyle/>
+          <a:p>
+            <a:pPr algn="ctr"/>
+            <a:endParaRPr lang="en-GB"/>
+          </a:p>
+        </p:txBody>
+      </p:sp>
+      <p:cxnSp>
+        <p:nvCxnSpPr>
+          <p:cNvPr id="19" name="Straight Connector 18"/>
+          <p:cNvCxnSpPr>
+            <a:stCxn id="18" idx="6"/>
+            <a:endCxn id="17" idx="6"/>
+          </p:cNvCxnSpPr>
+          <p:nvPr/>
+        </p:nvCxnSpPr>
+        <p:spPr>
+          <a:xfrm flipH="1" flipV="1">
+            <a:off x="1573478" y="1179911"/>
+            <a:ext cx="826293" cy="297657"/>
+          </a:xfrm>
+          <a:prstGeom prst="line">
+            <a:avLst/>
+          </a:prstGeom>
+          <a:ln w="9525">
+            <a:headEnd type="none" w="med" len="med"/>
+            <a:tailEnd type="none" w="sm" len="sm"/>
+          </a:ln>
+        </p:spPr>
+        <p:style>
+          <a:lnRef idx="1">
+            <a:schemeClr val="dk1"/>
+          </a:lnRef>
+          <a:fillRef idx="0">
+            <a:schemeClr val="dk1"/>
+          </a:fillRef>
+          <a:effectRef idx="0">
+            <a:schemeClr val="dk1"/>
+          </a:effectRef>
+          <a:fontRef idx="minor">
+            <a:schemeClr val="tx1"/>
+          </a:fontRef>
+        </p:style>
+      </p:cxnSp>
+      <p:cxnSp>
+        <p:nvCxnSpPr>
+          <p:cNvPr id="23" name="Straight Connector 22"/>
+          <p:cNvCxnSpPr/>
+          <p:nvPr/>
+        </p:nvCxnSpPr>
+        <p:spPr>
+          <a:xfrm flipH="1" flipV="1">
+            <a:off x="1760339" y="998416"/>
+            <a:ext cx="226287" cy="330323"/>
+          </a:xfrm>
+          <a:prstGeom prst="line">
+            <a:avLst/>
+          </a:prstGeom>
+          <a:ln w="9525">
+            <a:headEnd type="none" w="med" len="med"/>
+            <a:tailEnd type="triangle" w="sm" len="sm"/>
+          </a:ln>
+        </p:spPr>
+        <p:style>
+          <a:lnRef idx="1">
+            <a:schemeClr val="dk1"/>
+          </a:lnRef>
+          <a:fillRef idx="0">
+            <a:schemeClr val="dk1"/>
+          </a:fillRef>
+          <a:effectRef idx="0">
+            <a:schemeClr val="dk1"/>
+          </a:effectRef>
+          <a:fontRef idx="minor">
+            <a:schemeClr val="tx1"/>
+          </a:fontRef>
+        </p:style>
+      </p:cxnSp>
+      <p:sp>
+        <p:nvSpPr>
+          <p:cNvPr id="28" name="Arc 27"/>
+          <p:cNvSpPr/>
+          <p:nvPr/>
+        </p:nvSpPr>
+        <p:spPr>
+          <a:xfrm rot="15189694">
+            <a:off x="1923044" y="1255663"/>
+            <a:ext cx="64590" cy="84927"/>
+          </a:xfrm>
+          <a:prstGeom prst="arc">
+            <a:avLst/>
+          </a:prstGeom>
+        </p:spPr>
+        <p:style>
+          <a:lnRef idx="1">
+            <a:schemeClr val="dk1"/>
+          </a:lnRef>
+          <a:fillRef idx="0">
+            <a:schemeClr val="dk1"/>
+          </a:fillRef>
+          <a:effectRef idx="0">
+            <a:schemeClr val="dk1"/>
+          </a:effectRef>
+          <a:fontRef idx="minor">
+            <a:schemeClr val="tx1"/>
+          </a:fontRef>
+        </p:style>
+        <p:txBody>
+          <a:bodyPr rtlCol="0" anchor="ctr"/>
+          <a:lstStyle/>
+          <a:p>
+            <a:pPr algn="ctr"/>
+            <a:endParaRPr lang="en-GB"/>
+          </a:p>
+        </p:txBody>
+      </p:sp>
+      <p:sp>
+        <p:nvSpPr>
+          <p:cNvPr id="29" name="TextBox 28"/>
+          <p:cNvSpPr txBox="1"/>
+          <p:nvPr/>
+        </p:nvSpPr>
+        <p:spPr>
+          <a:xfrm>
+            <a:off x="1777446" y="1115567"/>
+            <a:ext cx="68930" cy="153888"/>
+          </a:xfrm>
+          <a:prstGeom prst="rect">
+            <a:avLst/>
+          </a:prstGeom>
+          <a:noFill/>
+        </p:spPr>
+        <p:txBody>
+          <a:bodyPr wrap="none" lIns="0" tIns="0" rIns="0" bIns="0" rtlCol="0">
+            <a:spAutoFit/>
+          </a:bodyPr>
+          <a:lstStyle/>
+          <a:p>
+            <a:pPr/>
+            <a:r>
+              <a:rPr lang="el-GR" sz="1000" dirty="0" smtClean="0"/>
+              <a:t>θ</a:t>
+            </a:r>
+            <a:endParaRPr lang="en-GB" sz="1000" dirty="0"/>
           </a:p>
         </p:txBody>
       </p:sp>
     </p:spTree>
     <p:extLst>
       <p:ext uri="{BB962C8B-B14F-4D97-AF65-F5344CB8AC3E}">
-        <p14:creationId xmlns:p14="http://schemas.microsoft.com/office/powerpoint/2010/main" val="3488095981"/>
+        <p14:creationId xmlns:p14="http://schemas.microsoft.com/office/powerpoint/2010/main" val="1593464286"/>
+      </p:ext>
+    </p:extLst>
+  </p:cSld>
+  <p:clrMapOvr>
+    <a:masterClrMapping/>
+  </p:clrMapOvr>
+</p:sld>
+</file>
+
+<file path=ppt/slides/slide18.xml><?xml version="1.0" encoding="utf-8"?>
+<p:sld xmlns:a="http://schemas.openxmlformats.org/drawingml/2006/main" xmlns:r="http://schemas.openxmlformats.org/officeDocument/2006/relationships" xmlns:p="http://schemas.openxmlformats.org/presentationml/2006/main">
+  <p:cSld>
+    <p:spTree>
+      <p:nvGrpSpPr>
+        <p:cNvPr id="1" name=""/>
+        <p:cNvGrpSpPr/>
+        <p:nvPr/>
+      </p:nvGrpSpPr>
+      <p:grpSpPr>
+        <a:xfrm>
+          <a:off x="0" y="0"/>
+          <a:ext cx="0" cy="0"/>
+          <a:chOff x="0" y="0"/>
+          <a:chExt cx="0" cy="0"/>
+        </a:xfrm>
+      </p:grpSpPr>
+      <p:sp>
+        <p:nvSpPr>
+          <p:cNvPr id="2" name="Title 1"/>
+          <p:cNvSpPr>
+            <a:spLocks noGrp="1"/>
+          </p:cNvSpPr>
+          <p:nvPr>
+            <p:ph type="title"/>
+          </p:nvPr>
+        </p:nvSpPr>
+        <p:spPr/>
+        <p:txBody>
+          <a:bodyPr/>
+          <a:lstStyle/>
+          <a:p>
+            <a:r>
+              <a:rPr lang="en-US" dirty="0" err="1" smtClean="0"/>
+              <a:t>skewError</a:t>
+            </a:r>
+            <a:endParaRPr lang="en-GB" dirty="0"/>
+          </a:p>
+        </p:txBody>
+      </p:sp>
+      <p:sp>
+        <p:nvSpPr>
+          <p:cNvPr id="4" name="Rectangle 3"/>
+          <p:cNvSpPr/>
+          <p:nvPr/>
+        </p:nvSpPr>
+        <p:spPr>
+          <a:xfrm>
+            <a:off x="1259544" y="912007"/>
+            <a:ext cx="474080" cy="624734"/>
+          </a:xfrm>
+          <a:custGeom>
+            <a:avLst/>
+            <a:gdLst>
+              <a:gd name="connsiteX0" fmla="*/ 0 w 469028"/>
+              <a:gd name="connsiteY0" fmla="*/ 0 h 440886"/>
+              <a:gd name="connsiteX1" fmla="*/ 469028 w 469028"/>
+              <a:gd name="connsiteY1" fmla="*/ 0 h 440886"/>
+              <a:gd name="connsiteX2" fmla="*/ 469028 w 469028"/>
+              <a:gd name="connsiteY2" fmla="*/ 440886 h 440886"/>
+              <a:gd name="connsiteX3" fmla="*/ 0 w 469028"/>
+              <a:gd name="connsiteY3" fmla="*/ 440886 h 440886"/>
+              <a:gd name="connsiteX4" fmla="*/ 0 w 469028"/>
+              <a:gd name="connsiteY4" fmla="*/ 0 h 440886"/>
+              <a:gd name="connsiteX0" fmla="*/ 9677 w 478705"/>
+              <a:gd name="connsiteY0" fmla="*/ 0 h 586029"/>
+              <a:gd name="connsiteX1" fmla="*/ 478705 w 478705"/>
+              <a:gd name="connsiteY1" fmla="*/ 0 h 586029"/>
+              <a:gd name="connsiteX2" fmla="*/ 478705 w 478705"/>
+              <a:gd name="connsiteY2" fmla="*/ 440886 h 586029"/>
+              <a:gd name="connsiteX3" fmla="*/ 0 w 478705"/>
+              <a:gd name="connsiteY3" fmla="*/ 586029 h 586029"/>
+              <a:gd name="connsiteX4" fmla="*/ 9677 w 478705"/>
+              <a:gd name="connsiteY4" fmla="*/ 0 h 586029"/>
+              <a:gd name="connsiteX0" fmla="*/ 14515 w 478705"/>
+              <a:gd name="connsiteY0" fmla="*/ 149981 h 586029"/>
+              <a:gd name="connsiteX1" fmla="*/ 478705 w 478705"/>
+              <a:gd name="connsiteY1" fmla="*/ 0 h 586029"/>
+              <a:gd name="connsiteX2" fmla="*/ 478705 w 478705"/>
+              <a:gd name="connsiteY2" fmla="*/ 440886 h 586029"/>
+              <a:gd name="connsiteX3" fmla="*/ 0 w 478705"/>
+              <a:gd name="connsiteY3" fmla="*/ 586029 h 586029"/>
+              <a:gd name="connsiteX4" fmla="*/ 14515 w 478705"/>
+              <a:gd name="connsiteY4" fmla="*/ 149981 h 586029"/>
+              <a:gd name="connsiteX0" fmla="*/ 4838 w 469028"/>
+              <a:gd name="connsiteY0" fmla="*/ 149981 h 624734"/>
+              <a:gd name="connsiteX1" fmla="*/ 469028 w 469028"/>
+              <a:gd name="connsiteY1" fmla="*/ 0 h 624734"/>
+              <a:gd name="connsiteX2" fmla="*/ 469028 w 469028"/>
+              <a:gd name="connsiteY2" fmla="*/ 440886 h 624734"/>
+              <a:gd name="connsiteX3" fmla="*/ 0 w 469028"/>
+              <a:gd name="connsiteY3" fmla="*/ 624734 h 624734"/>
+              <a:gd name="connsiteX4" fmla="*/ 4838 w 469028"/>
+              <a:gd name="connsiteY4" fmla="*/ 149981 h 624734"/>
+              <a:gd name="connsiteX0" fmla="*/ 9676 w 469028"/>
+              <a:gd name="connsiteY0" fmla="*/ 266095 h 624734"/>
+              <a:gd name="connsiteX1" fmla="*/ 469028 w 469028"/>
+              <a:gd name="connsiteY1" fmla="*/ 0 h 624734"/>
+              <a:gd name="connsiteX2" fmla="*/ 469028 w 469028"/>
+              <a:gd name="connsiteY2" fmla="*/ 440886 h 624734"/>
+              <a:gd name="connsiteX3" fmla="*/ 0 w 469028"/>
+              <a:gd name="connsiteY3" fmla="*/ 624734 h 624734"/>
+              <a:gd name="connsiteX4" fmla="*/ 9676 w 469028"/>
+              <a:gd name="connsiteY4" fmla="*/ 266095 h 624734"/>
+              <a:gd name="connsiteX0" fmla="*/ 214 w 474080"/>
+              <a:gd name="connsiteY0" fmla="*/ 203200 h 624734"/>
+              <a:gd name="connsiteX1" fmla="*/ 474080 w 474080"/>
+              <a:gd name="connsiteY1" fmla="*/ 0 h 624734"/>
+              <a:gd name="connsiteX2" fmla="*/ 474080 w 474080"/>
+              <a:gd name="connsiteY2" fmla="*/ 440886 h 624734"/>
+              <a:gd name="connsiteX3" fmla="*/ 5052 w 474080"/>
+              <a:gd name="connsiteY3" fmla="*/ 624734 h 624734"/>
+              <a:gd name="connsiteX4" fmla="*/ 214 w 474080"/>
+              <a:gd name="connsiteY4" fmla="*/ 203200 h 624734"/>
+            </a:gdLst>
+            <a:ahLst/>
+            <a:cxnLst>
+              <a:cxn ang="0">
+                <a:pos x="connsiteX0" y="connsiteY0"/>
+              </a:cxn>
+              <a:cxn ang="0">
+                <a:pos x="connsiteX1" y="connsiteY1"/>
+              </a:cxn>
+              <a:cxn ang="0">
+                <a:pos x="connsiteX2" y="connsiteY2"/>
+              </a:cxn>
+              <a:cxn ang="0">
+                <a:pos x="connsiteX3" y="connsiteY3"/>
+              </a:cxn>
+              <a:cxn ang="0">
+                <a:pos x="connsiteX4" y="connsiteY4"/>
+              </a:cxn>
+            </a:cxnLst>
+            <a:rect l="l" t="t" r="r" b="b"/>
+            <a:pathLst>
+              <a:path w="474080" h="624734">
+                <a:moveTo>
+                  <a:pt x="214" y="203200"/>
+                </a:moveTo>
+                <a:lnTo>
+                  <a:pt x="474080" y="0"/>
+                </a:lnTo>
+                <a:lnTo>
+                  <a:pt x="474080" y="440886"/>
+                </a:lnTo>
+                <a:lnTo>
+                  <a:pt x="5052" y="624734"/>
+                </a:lnTo>
+                <a:cubicBezTo>
+                  <a:pt x="6665" y="466483"/>
+                  <a:pt x="-1399" y="361451"/>
+                  <a:pt x="214" y="203200"/>
+                </a:cubicBezTo>
+                <a:close/>
+              </a:path>
+            </a:pathLst>
+          </a:custGeom>
+          <a:ln w="9525">
+            <a:solidFill>
+              <a:schemeClr val="tx1"/>
+            </a:solidFill>
+          </a:ln>
+        </p:spPr>
+        <p:style>
+          <a:lnRef idx="2">
+            <a:schemeClr val="accent6"/>
+          </a:lnRef>
+          <a:fillRef idx="1">
+            <a:schemeClr val="lt1"/>
+          </a:fillRef>
+          <a:effectRef idx="0">
+            <a:schemeClr val="accent6"/>
+          </a:effectRef>
+          <a:fontRef idx="minor">
+            <a:schemeClr val="dk1"/>
+          </a:fontRef>
+        </p:style>
+        <p:txBody>
+          <a:bodyPr rot="0" spcFirstLastPara="0" vertOverflow="overflow" horzOverflow="overflow" vert="horz" wrap="square" lIns="9577" tIns="4789" rIns="9577" bIns="4789" numCol="1" spcCol="0" rtlCol="0" fromWordArt="0" anchor="ctr" anchorCtr="0" forceAA="0" compatLnSpc="1">
+            <a:prstTxWarp prst="textNoShape">
+              <a:avLst/>
+            </a:prstTxWarp>
+            <a:noAutofit/>
+          </a:bodyPr>
+          <a:lstStyle/>
+          <a:p>
+            <a:pPr algn="ctr"/>
+            <a:endParaRPr lang="en-GB" sz="1000" dirty="0"/>
+          </a:p>
+        </p:txBody>
+      </p:sp>
+      <p:sp>
+        <p:nvSpPr>
+          <p:cNvPr id="6" name="Rectangle 5"/>
+          <p:cNvSpPr/>
+          <p:nvPr/>
+        </p:nvSpPr>
+        <p:spPr>
+          <a:xfrm>
+            <a:off x="1733624" y="912007"/>
+            <a:ext cx="488381" cy="610219"/>
+          </a:xfrm>
+          <a:custGeom>
+            <a:avLst/>
+            <a:gdLst>
+              <a:gd name="connsiteX0" fmla="*/ 0 w 469028"/>
+              <a:gd name="connsiteY0" fmla="*/ 0 h 440886"/>
+              <a:gd name="connsiteX1" fmla="*/ 469028 w 469028"/>
+              <a:gd name="connsiteY1" fmla="*/ 0 h 440886"/>
+              <a:gd name="connsiteX2" fmla="*/ 469028 w 469028"/>
+              <a:gd name="connsiteY2" fmla="*/ 440886 h 440886"/>
+              <a:gd name="connsiteX3" fmla="*/ 0 w 469028"/>
+              <a:gd name="connsiteY3" fmla="*/ 440886 h 440886"/>
+              <a:gd name="connsiteX4" fmla="*/ 0 w 469028"/>
+              <a:gd name="connsiteY4" fmla="*/ 0 h 440886"/>
+              <a:gd name="connsiteX0" fmla="*/ 0 w 483543"/>
+              <a:gd name="connsiteY0" fmla="*/ 0 h 610219"/>
+              <a:gd name="connsiteX1" fmla="*/ 469028 w 483543"/>
+              <a:gd name="connsiteY1" fmla="*/ 0 h 610219"/>
+              <a:gd name="connsiteX2" fmla="*/ 483543 w 483543"/>
+              <a:gd name="connsiteY2" fmla="*/ 610219 h 610219"/>
+              <a:gd name="connsiteX3" fmla="*/ 0 w 483543"/>
+              <a:gd name="connsiteY3" fmla="*/ 440886 h 610219"/>
+              <a:gd name="connsiteX4" fmla="*/ 0 w 483543"/>
+              <a:gd name="connsiteY4" fmla="*/ 0 h 610219"/>
+              <a:gd name="connsiteX0" fmla="*/ 0 w 488381"/>
+              <a:gd name="connsiteY0" fmla="*/ 0 h 610219"/>
+              <a:gd name="connsiteX1" fmla="*/ 488381 w 488381"/>
+              <a:gd name="connsiteY1" fmla="*/ 154819 h 610219"/>
+              <a:gd name="connsiteX2" fmla="*/ 483543 w 488381"/>
+              <a:gd name="connsiteY2" fmla="*/ 610219 h 610219"/>
+              <a:gd name="connsiteX3" fmla="*/ 0 w 488381"/>
+              <a:gd name="connsiteY3" fmla="*/ 440886 h 610219"/>
+              <a:gd name="connsiteX4" fmla="*/ 0 w 488381"/>
+              <a:gd name="connsiteY4" fmla="*/ 0 h 610219"/>
+            </a:gdLst>
+            <a:ahLst/>
+            <a:cxnLst>
+              <a:cxn ang="0">
+                <a:pos x="connsiteX0" y="connsiteY0"/>
+              </a:cxn>
+              <a:cxn ang="0">
+                <a:pos x="connsiteX1" y="connsiteY1"/>
+              </a:cxn>
+              <a:cxn ang="0">
+                <a:pos x="connsiteX2" y="connsiteY2"/>
+              </a:cxn>
+              <a:cxn ang="0">
+                <a:pos x="connsiteX3" y="connsiteY3"/>
+              </a:cxn>
+              <a:cxn ang="0">
+                <a:pos x="connsiteX4" y="connsiteY4"/>
+              </a:cxn>
+            </a:cxnLst>
+            <a:rect l="l" t="t" r="r" b="b"/>
+            <a:pathLst>
+              <a:path w="488381" h="610219">
+                <a:moveTo>
+                  <a:pt x="0" y="0"/>
+                </a:moveTo>
+                <a:lnTo>
+                  <a:pt x="488381" y="154819"/>
+                </a:lnTo>
+                <a:cubicBezTo>
+                  <a:pt x="486768" y="306619"/>
+                  <a:pt x="485156" y="458419"/>
+                  <a:pt x="483543" y="610219"/>
+                </a:cubicBezTo>
+                <a:lnTo>
+                  <a:pt x="0" y="440886"/>
+                </a:lnTo>
+                <a:lnTo>
+                  <a:pt x="0" y="0"/>
+                </a:lnTo>
+                <a:close/>
+              </a:path>
+            </a:pathLst>
+          </a:custGeom>
+          <a:ln w="9525">
+            <a:solidFill>
+              <a:schemeClr val="tx1"/>
+            </a:solidFill>
+          </a:ln>
+        </p:spPr>
+        <p:style>
+          <a:lnRef idx="2">
+            <a:schemeClr val="accent6"/>
+          </a:lnRef>
+          <a:fillRef idx="1">
+            <a:schemeClr val="lt1"/>
+          </a:fillRef>
+          <a:effectRef idx="0">
+            <a:schemeClr val="accent6"/>
+          </a:effectRef>
+          <a:fontRef idx="minor">
+            <a:schemeClr val="dk1"/>
+          </a:fontRef>
+        </p:style>
+        <p:txBody>
+          <a:bodyPr rot="0" spcFirstLastPara="0" vertOverflow="overflow" horzOverflow="overflow" vert="horz" wrap="square" lIns="9577" tIns="4789" rIns="9577" bIns="4789" numCol="1" spcCol="0" rtlCol="0" fromWordArt="0" anchor="ctr" anchorCtr="0" forceAA="0" compatLnSpc="1">
+            <a:prstTxWarp prst="textNoShape">
+              <a:avLst/>
+            </a:prstTxWarp>
+            <a:noAutofit/>
+          </a:bodyPr>
+          <a:lstStyle/>
+          <a:p>
+            <a:pPr algn="ctr"/>
+            <a:endParaRPr lang="en-GB" sz="1000" dirty="0"/>
+          </a:p>
+        </p:txBody>
+      </p:sp>
+      <p:sp>
+        <p:nvSpPr>
+          <p:cNvPr id="7" name="Oval 6"/>
+          <p:cNvSpPr>
+            <a:spLocks noChangeAspect="1"/>
+          </p:cNvSpPr>
+          <p:nvPr/>
+        </p:nvSpPr>
+        <p:spPr>
+          <a:xfrm>
+            <a:off x="1483984" y="1219699"/>
+            <a:ext cx="25200" cy="25200"/>
+          </a:xfrm>
+          <a:prstGeom prst="ellipse">
+            <a:avLst/>
+          </a:prstGeom>
+        </p:spPr>
+        <p:style>
+          <a:lnRef idx="2">
+            <a:schemeClr val="dk1">
+              <a:shade val="50000"/>
+            </a:schemeClr>
+          </a:lnRef>
+          <a:fillRef idx="1">
+            <a:schemeClr val="dk1"/>
+          </a:fillRef>
+          <a:effectRef idx="0">
+            <a:schemeClr val="dk1"/>
+          </a:effectRef>
+          <a:fontRef idx="minor">
+            <a:schemeClr val="lt1"/>
+          </a:fontRef>
+        </p:style>
+        <p:txBody>
+          <a:bodyPr rtlCol="0" anchor="ctr"/>
+          <a:lstStyle/>
+          <a:p>
+            <a:pPr algn="ctr"/>
+            <a:endParaRPr lang="en-GB"/>
+          </a:p>
+        </p:txBody>
+      </p:sp>
+      <p:sp>
+        <p:nvSpPr>
+          <p:cNvPr id="8" name="Oval 7"/>
+          <p:cNvSpPr>
+            <a:spLocks noChangeAspect="1"/>
+          </p:cNvSpPr>
+          <p:nvPr/>
+        </p:nvSpPr>
+        <p:spPr>
+          <a:xfrm>
+            <a:off x="1958064" y="1203817"/>
+            <a:ext cx="25200" cy="25200"/>
+          </a:xfrm>
+          <a:prstGeom prst="ellipse">
+            <a:avLst/>
+          </a:prstGeom>
+        </p:spPr>
+        <p:style>
+          <a:lnRef idx="2">
+            <a:schemeClr val="dk1">
+              <a:shade val="50000"/>
+            </a:schemeClr>
+          </a:lnRef>
+          <a:fillRef idx="1">
+            <a:schemeClr val="dk1"/>
+          </a:fillRef>
+          <a:effectRef idx="0">
+            <a:schemeClr val="dk1"/>
+          </a:effectRef>
+          <a:fontRef idx="minor">
+            <a:schemeClr val="lt1"/>
+          </a:fontRef>
+        </p:style>
+        <p:txBody>
+          <a:bodyPr rtlCol="0" anchor="ctr"/>
+          <a:lstStyle/>
+          <a:p>
+            <a:pPr algn="ctr"/>
+            <a:endParaRPr lang="en-GB"/>
+          </a:p>
+        </p:txBody>
+      </p:sp>
+      <p:cxnSp>
+        <p:nvCxnSpPr>
+          <p:cNvPr id="9" name="Straight Connector 8"/>
+          <p:cNvCxnSpPr>
+            <a:stCxn id="8" idx="2"/>
+            <a:endCxn id="7" idx="6"/>
+          </p:cNvCxnSpPr>
+          <p:nvPr/>
+        </p:nvCxnSpPr>
+        <p:spPr>
+          <a:xfrm flipH="1">
+            <a:off x="1509184" y="1216417"/>
+            <a:ext cx="448880" cy="15882"/>
+          </a:xfrm>
+          <a:prstGeom prst="line">
+            <a:avLst/>
+          </a:prstGeom>
+          <a:ln w="9525">
+            <a:headEnd type="none" w="med" len="med"/>
+            <a:tailEnd type="none" w="sm" len="sm"/>
+          </a:ln>
+        </p:spPr>
+        <p:style>
+          <a:lnRef idx="1">
+            <a:schemeClr val="dk1"/>
+          </a:lnRef>
+          <a:fillRef idx="0">
+            <a:schemeClr val="dk1"/>
+          </a:fillRef>
+          <a:effectRef idx="0">
+            <a:schemeClr val="dk1"/>
+          </a:effectRef>
+          <a:fontRef idx="minor">
+            <a:schemeClr val="tx1"/>
+          </a:fontRef>
+        </p:style>
+      </p:cxnSp>
+      <p:sp>
+        <p:nvSpPr>
+          <p:cNvPr id="19" name="Rectangle 18"/>
+          <p:cNvSpPr/>
+          <p:nvPr/>
+        </p:nvSpPr>
+        <p:spPr>
+          <a:xfrm>
+            <a:off x="1599826" y="1008914"/>
+            <a:ext cx="251992" cy="215444"/>
+          </a:xfrm>
+          <a:prstGeom prst="rect">
+            <a:avLst/>
+          </a:prstGeom>
+        </p:spPr>
+        <p:txBody>
+          <a:bodyPr wrap="none">
+            <a:spAutoFit/>
+          </a:bodyPr>
+          <a:lstStyle/>
+          <a:p>
+            <a:r>
+              <a:rPr lang="en-US" sz="800" dirty="0" smtClean="0"/>
+              <a:t> x</a:t>
+            </a:r>
+            <a:endParaRPr lang="en-GB" sz="800" dirty="0"/>
+          </a:p>
+        </p:txBody>
+      </p:sp>
+      <p:sp>
+        <p:nvSpPr>
+          <p:cNvPr id="20" name="Right Brace 19"/>
+          <p:cNvSpPr/>
+          <p:nvPr/>
+        </p:nvSpPr>
+        <p:spPr>
+          <a:xfrm>
+            <a:off x="1764666" y="1124577"/>
+            <a:ext cx="45719" cy="99781"/>
+          </a:xfrm>
+          <a:prstGeom prst="rightBrace">
+            <a:avLst/>
+          </a:prstGeom>
+        </p:spPr>
+        <p:style>
+          <a:lnRef idx="1">
+            <a:schemeClr val="dk1"/>
+          </a:lnRef>
+          <a:fillRef idx="0">
+            <a:schemeClr val="dk1"/>
+          </a:fillRef>
+          <a:effectRef idx="0">
+            <a:schemeClr val="dk1"/>
+          </a:effectRef>
+          <a:fontRef idx="minor">
+            <a:schemeClr val="tx1"/>
+          </a:fontRef>
+        </p:style>
+        <p:txBody>
+          <a:bodyPr rtlCol="0" anchor="ctr"/>
+          <a:lstStyle/>
+          <a:p>
+            <a:pPr algn="ctr"/>
+            <a:endParaRPr lang="en-GB"/>
+          </a:p>
+        </p:txBody>
+      </p:sp>
+      <p:sp>
+        <p:nvSpPr>
+          <p:cNvPr id="21" name="Rectangle 20"/>
+          <p:cNvSpPr/>
+          <p:nvPr/>
+        </p:nvSpPr>
+        <p:spPr>
+          <a:xfrm>
+            <a:off x="1737565" y="1029455"/>
+            <a:ext cx="418704" cy="215444"/>
+          </a:xfrm>
+          <a:prstGeom prst="rect">
+            <a:avLst/>
+          </a:prstGeom>
+        </p:spPr>
+        <p:txBody>
+          <a:bodyPr wrap="none">
+            <a:spAutoFit/>
+          </a:bodyPr>
+          <a:lstStyle/>
+          <a:p>
+            <a:r>
+              <a:rPr lang="en-US" sz="800" dirty="0" smtClean="0"/>
+              <a:t> error</a:t>
+            </a:r>
+            <a:endParaRPr lang="en-GB" sz="800" dirty="0"/>
+          </a:p>
+        </p:txBody>
+      </p:sp>
+    </p:spTree>
+    <p:extLst>
+      <p:ext uri="{BB962C8B-B14F-4D97-AF65-F5344CB8AC3E}">
+        <p14:creationId xmlns:p14="http://schemas.microsoft.com/office/powerpoint/2010/main" val="2354881622"/>
+      </p:ext>
+    </p:extLst>
+  </p:cSld>
+  <p:clrMapOvr>
+    <a:masterClrMapping/>
+  </p:clrMapOvr>
+</p:sld>
+</file>
+
+<file path=ppt/slides/slide19.xml><?xml version="1.0" encoding="utf-8"?>
+<p:sld xmlns:a="http://schemas.openxmlformats.org/drawingml/2006/main" xmlns:r="http://schemas.openxmlformats.org/officeDocument/2006/relationships" xmlns:p="http://schemas.openxmlformats.org/presentationml/2006/main">
+  <p:cSld>
+    <p:spTree>
+      <p:nvGrpSpPr>
+        <p:cNvPr id="1" name=""/>
+        <p:cNvGrpSpPr/>
+        <p:nvPr/>
+      </p:nvGrpSpPr>
+      <p:grpSpPr>
+        <a:xfrm>
+          <a:off x="0" y="0"/>
+          <a:ext cx="0" cy="0"/>
+          <a:chOff x="0" y="0"/>
+          <a:chExt cx="0" cy="0"/>
+        </a:xfrm>
+      </p:grpSpPr>
+      <p:sp>
+        <p:nvSpPr>
+          <p:cNvPr id="2" name="Title 1"/>
+          <p:cNvSpPr>
+            <a:spLocks noGrp="1"/>
+          </p:cNvSpPr>
+          <p:nvPr>
+            <p:ph type="title"/>
+          </p:nvPr>
+        </p:nvSpPr>
+        <p:spPr/>
+        <p:txBody>
+          <a:bodyPr/>
+          <a:lstStyle/>
+          <a:p>
+            <a:r>
+              <a:rPr lang="en-US" dirty="0" err="1" smtClean="0"/>
+              <a:t>WallLayers</a:t>
+            </a:r>
+            <a:endParaRPr lang="en-GB" dirty="0"/>
+          </a:p>
+        </p:txBody>
+      </p:sp>
+      <p:grpSp>
+        <p:nvGrpSpPr>
+          <p:cNvPr id="11" name="Group 10"/>
+          <p:cNvGrpSpPr/>
+          <p:nvPr/>
+        </p:nvGrpSpPr>
+        <p:grpSpPr>
+          <a:xfrm>
+            <a:off x="735432" y="2097747"/>
+            <a:ext cx="2321716" cy="45719"/>
+            <a:chOff x="797344" y="912006"/>
+            <a:chExt cx="2321716" cy="440886"/>
+          </a:xfrm>
+        </p:grpSpPr>
+        <p:sp>
+          <p:nvSpPr>
+            <p:cNvPr id="28" name="Rectangle 27"/>
+            <p:cNvSpPr/>
+            <p:nvPr/>
+          </p:nvSpPr>
+          <p:spPr>
+            <a:xfrm>
+              <a:off x="1264596" y="912006"/>
+              <a:ext cx="469028" cy="440886"/>
+            </a:xfrm>
+            <a:prstGeom prst="rect">
+              <a:avLst/>
+            </a:prstGeom>
+            <a:ln w="9525">
+              <a:solidFill>
+                <a:schemeClr val="tx1"/>
+              </a:solidFill>
+            </a:ln>
+          </p:spPr>
+          <p:style>
+            <a:lnRef idx="2">
+              <a:schemeClr val="accent6"/>
+            </a:lnRef>
+            <a:fillRef idx="1">
+              <a:schemeClr val="lt1"/>
+            </a:fillRef>
+            <a:effectRef idx="0">
+              <a:schemeClr val="accent6"/>
+            </a:effectRef>
+            <a:fontRef idx="minor">
+              <a:schemeClr val="dk1"/>
+            </a:fontRef>
+          </p:style>
+          <p:txBody>
+            <a:bodyPr rot="0" spcFirstLastPara="0" vertOverflow="overflow" horzOverflow="overflow" vert="horz" wrap="square" lIns="9577" tIns="4789" rIns="9577" bIns="4789" numCol="1" spcCol="0" rtlCol="0" fromWordArt="0" anchor="ctr" anchorCtr="0" forceAA="0" compatLnSpc="1">
+              <a:prstTxWarp prst="textNoShape">
+                <a:avLst/>
+              </a:prstTxWarp>
+              <a:noAutofit/>
+            </a:bodyPr>
+            <a:lstStyle/>
+            <a:p>
+              <a:pPr algn="ctr"/>
+              <a:endParaRPr lang="en-GB" sz="1000" dirty="0"/>
+            </a:p>
+          </p:txBody>
+        </p:sp>
+        <p:sp>
+          <p:nvSpPr>
+            <p:cNvPr id="26" name="Rectangle 25"/>
+            <p:cNvSpPr/>
+            <p:nvPr/>
+          </p:nvSpPr>
+          <p:spPr>
+            <a:xfrm>
+              <a:off x="1715528" y="912006"/>
+              <a:ext cx="469028" cy="440886"/>
+            </a:xfrm>
+            <a:prstGeom prst="rect">
+              <a:avLst/>
+            </a:prstGeom>
+            <a:ln w="9525">
+              <a:solidFill>
+                <a:schemeClr val="tx1"/>
+              </a:solidFill>
+            </a:ln>
+          </p:spPr>
+          <p:style>
+            <a:lnRef idx="2">
+              <a:schemeClr val="accent6"/>
+            </a:lnRef>
+            <a:fillRef idx="1">
+              <a:schemeClr val="lt1"/>
+            </a:fillRef>
+            <a:effectRef idx="0">
+              <a:schemeClr val="accent6"/>
+            </a:effectRef>
+            <a:fontRef idx="minor">
+              <a:schemeClr val="dk1"/>
+            </a:fontRef>
+          </p:style>
+          <p:txBody>
+            <a:bodyPr rot="0" spcFirstLastPara="0" vertOverflow="overflow" horzOverflow="overflow" vert="horz" wrap="square" lIns="9577" tIns="4789" rIns="9577" bIns="4789" numCol="1" spcCol="0" rtlCol="0" fromWordArt="0" anchor="ctr" anchorCtr="0" forceAA="0" compatLnSpc="1">
+              <a:prstTxWarp prst="textNoShape">
+                <a:avLst/>
+              </a:prstTxWarp>
+              <a:noAutofit/>
+            </a:bodyPr>
+            <a:lstStyle/>
+            <a:p>
+              <a:pPr algn="ctr"/>
+              <a:endParaRPr lang="en-GB" sz="1000" dirty="0"/>
+            </a:p>
+          </p:txBody>
+        </p:sp>
+        <p:sp>
+          <p:nvSpPr>
+            <p:cNvPr id="24" name="Rectangle 23"/>
+            <p:cNvSpPr/>
+            <p:nvPr/>
+          </p:nvSpPr>
+          <p:spPr>
+            <a:xfrm>
+              <a:off x="2184556" y="912006"/>
+              <a:ext cx="469028" cy="440886"/>
+            </a:xfrm>
+            <a:prstGeom prst="rect">
+              <a:avLst/>
+            </a:prstGeom>
+            <a:ln w="9525">
+              <a:solidFill>
+                <a:schemeClr val="tx1"/>
+              </a:solidFill>
+            </a:ln>
+          </p:spPr>
+          <p:style>
+            <a:lnRef idx="2">
+              <a:schemeClr val="accent6"/>
+            </a:lnRef>
+            <a:fillRef idx="1">
+              <a:schemeClr val="lt1"/>
+            </a:fillRef>
+            <a:effectRef idx="0">
+              <a:schemeClr val="accent6"/>
+            </a:effectRef>
+            <a:fontRef idx="minor">
+              <a:schemeClr val="dk1"/>
+            </a:fontRef>
+          </p:style>
+          <p:txBody>
+            <a:bodyPr rot="0" spcFirstLastPara="0" vertOverflow="overflow" horzOverflow="overflow" vert="horz" wrap="square" lIns="9577" tIns="4789" rIns="9577" bIns="4789" numCol="1" spcCol="0" rtlCol="0" fromWordArt="0" anchor="ctr" anchorCtr="0" forceAA="0" compatLnSpc="1">
+              <a:prstTxWarp prst="textNoShape">
+                <a:avLst/>
+              </a:prstTxWarp>
+              <a:noAutofit/>
+            </a:bodyPr>
+            <a:lstStyle/>
+            <a:p>
+              <a:pPr algn="ctr"/>
+              <a:endParaRPr lang="en-GB" sz="1000" dirty="0"/>
+            </a:p>
+          </p:txBody>
+        </p:sp>
+        <p:sp>
+          <p:nvSpPr>
+            <p:cNvPr id="22" name="Rectangle 21"/>
+            <p:cNvSpPr/>
+            <p:nvPr/>
+          </p:nvSpPr>
+          <p:spPr>
+            <a:xfrm>
+              <a:off x="2650032" y="912006"/>
+              <a:ext cx="469028" cy="440886"/>
+            </a:xfrm>
+            <a:prstGeom prst="rect">
+              <a:avLst/>
+            </a:prstGeom>
+            <a:ln w="9525">
+              <a:solidFill>
+                <a:schemeClr val="tx1"/>
+              </a:solidFill>
+            </a:ln>
+          </p:spPr>
+          <p:style>
+            <a:lnRef idx="2">
+              <a:schemeClr val="accent6"/>
+            </a:lnRef>
+            <a:fillRef idx="1">
+              <a:schemeClr val="lt1"/>
+            </a:fillRef>
+            <a:effectRef idx="0">
+              <a:schemeClr val="accent6"/>
+            </a:effectRef>
+            <a:fontRef idx="minor">
+              <a:schemeClr val="dk1"/>
+            </a:fontRef>
+          </p:style>
+          <p:txBody>
+            <a:bodyPr rot="0" spcFirstLastPara="0" vertOverflow="overflow" horzOverflow="overflow" vert="horz" wrap="square" lIns="9577" tIns="4789" rIns="9577" bIns="4789" numCol="1" spcCol="0" rtlCol="0" fromWordArt="0" anchor="ctr" anchorCtr="0" forceAA="0" compatLnSpc="1">
+              <a:prstTxWarp prst="textNoShape">
+                <a:avLst/>
+              </a:prstTxWarp>
+              <a:noAutofit/>
+            </a:bodyPr>
+            <a:lstStyle/>
+            <a:p>
+              <a:pPr algn="ctr"/>
+              <a:endParaRPr lang="en-GB" sz="1000" dirty="0"/>
+            </a:p>
+          </p:txBody>
+        </p:sp>
+        <p:sp>
+          <p:nvSpPr>
+            <p:cNvPr id="17" name="Rectangle 16"/>
+            <p:cNvSpPr/>
+            <p:nvPr/>
+          </p:nvSpPr>
+          <p:spPr>
+            <a:xfrm>
+              <a:off x="797344" y="912006"/>
+              <a:ext cx="469028" cy="440886"/>
+            </a:xfrm>
+            <a:prstGeom prst="rect">
+              <a:avLst/>
+            </a:prstGeom>
+            <a:ln w="9525">
+              <a:solidFill>
+                <a:schemeClr val="tx1"/>
+              </a:solidFill>
+            </a:ln>
+          </p:spPr>
+          <p:style>
+            <a:lnRef idx="2">
+              <a:schemeClr val="accent6"/>
+            </a:lnRef>
+            <a:fillRef idx="1">
+              <a:schemeClr val="lt1"/>
+            </a:fillRef>
+            <a:effectRef idx="0">
+              <a:schemeClr val="accent6"/>
+            </a:effectRef>
+            <a:fontRef idx="minor">
+              <a:schemeClr val="dk1"/>
+            </a:fontRef>
+          </p:style>
+          <p:txBody>
+            <a:bodyPr rot="0" spcFirstLastPara="0" vertOverflow="overflow" horzOverflow="overflow" vert="horz" wrap="square" lIns="9577" tIns="4789" rIns="9577" bIns="4789" numCol="1" spcCol="0" rtlCol="0" fromWordArt="0" anchor="ctr" anchorCtr="0" forceAA="0" compatLnSpc="1">
+              <a:prstTxWarp prst="textNoShape">
+                <a:avLst/>
+              </a:prstTxWarp>
+              <a:noAutofit/>
+            </a:bodyPr>
+            <a:lstStyle/>
+            <a:p>
+              <a:pPr algn="ctr"/>
+              <a:endParaRPr lang="en-GB" sz="1000" dirty="0"/>
+            </a:p>
+          </p:txBody>
+        </p:sp>
+      </p:grpSp>
+      <p:grpSp>
+        <p:nvGrpSpPr>
+          <p:cNvPr id="30" name="Group 29"/>
+          <p:cNvGrpSpPr/>
+          <p:nvPr/>
+        </p:nvGrpSpPr>
+        <p:grpSpPr>
+          <a:xfrm>
+            <a:off x="735432" y="2028826"/>
+            <a:ext cx="2321716" cy="68922"/>
+            <a:chOff x="797344" y="912006"/>
+            <a:chExt cx="2321716" cy="440886"/>
+          </a:xfrm>
+        </p:grpSpPr>
+        <p:sp>
+          <p:nvSpPr>
+            <p:cNvPr id="31" name="Rectangle 30"/>
+            <p:cNvSpPr/>
+            <p:nvPr/>
+          </p:nvSpPr>
+          <p:spPr>
+            <a:xfrm>
+              <a:off x="1264596" y="912006"/>
+              <a:ext cx="469028" cy="440886"/>
+            </a:xfrm>
+            <a:prstGeom prst="rect">
+              <a:avLst/>
+            </a:prstGeom>
+            <a:ln w="9525">
+              <a:solidFill>
+                <a:schemeClr val="tx1"/>
+              </a:solidFill>
+            </a:ln>
+          </p:spPr>
+          <p:style>
+            <a:lnRef idx="2">
+              <a:schemeClr val="accent6"/>
+            </a:lnRef>
+            <a:fillRef idx="1">
+              <a:schemeClr val="lt1"/>
+            </a:fillRef>
+            <a:effectRef idx="0">
+              <a:schemeClr val="accent6"/>
+            </a:effectRef>
+            <a:fontRef idx="minor">
+              <a:schemeClr val="dk1"/>
+            </a:fontRef>
+          </p:style>
+          <p:txBody>
+            <a:bodyPr rot="0" spcFirstLastPara="0" vertOverflow="overflow" horzOverflow="overflow" vert="horz" wrap="square" lIns="9577" tIns="4789" rIns="9577" bIns="4789" numCol="1" spcCol="0" rtlCol="0" fromWordArt="0" anchor="ctr" anchorCtr="0" forceAA="0" compatLnSpc="1">
+              <a:prstTxWarp prst="textNoShape">
+                <a:avLst/>
+              </a:prstTxWarp>
+              <a:noAutofit/>
+            </a:bodyPr>
+            <a:lstStyle/>
+            <a:p>
+              <a:pPr algn="ctr"/>
+              <a:endParaRPr lang="en-GB" sz="1000" dirty="0"/>
+            </a:p>
+          </p:txBody>
+        </p:sp>
+        <p:sp>
+          <p:nvSpPr>
+            <p:cNvPr id="32" name="Rectangle 31"/>
+            <p:cNvSpPr/>
+            <p:nvPr/>
+          </p:nvSpPr>
+          <p:spPr>
+            <a:xfrm>
+              <a:off x="1715528" y="912006"/>
+              <a:ext cx="469028" cy="440886"/>
+            </a:xfrm>
+            <a:prstGeom prst="rect">
+              <a:avLst/>
+            </a:prstGeom>
+            <a:ln w="9525">
+              <a:solidFill>
+                <a:schemeClr val="tx1"/>
+              </a:solidFill>
+            </a:ln>
+          </p:spPr>
+          <p:style>
+            <a:lnRef idx="2">
+              <a:schemeClr val="accent6"/>
+            </a:lnRef>
+            <a:fillRef idx="1">
+              <a:schemeClr val="lt1"/>
+            </a:fillRef>
+            <a:effectRef idx="0">
+              <a:schemeClr val="accent6"/>
+            </a:effectRef>
+            <a:fontRef idx="minor">
+              <a:schemeClr val="dk1"/>
+            </a:fontRef>
+          </p:style>
+          <p:txBody>
+            <a:bodyPr rot="0" spcFirstLastPara="0" vertOverflow="overflow" horzOverflow="overflow" vert="horz" wrap="square" lIns="9577" tIns="4789" rIns="9577" bIns="4789" numCol="1" spcCol="0" rtlCol="0" fromWordArt="0" anchor="ctr" anchorCtr="0" forceAA="0" compatLnSpc="1">
+              <a:prstTxWarp prst="textNoShape">
+                <a:avLst/>
+              </a:prstTxWarp>
+              <a:noAutofit/>
+            </a:bodyPr>
+            <a:lstStyle/>
+            <a:p>
+              <a:pPr algn="ctr"/>
+              <a:endParaRPr lang="en-GB" sz="1000" dirty="0"/>
+            </a:p>
+          </p:txBody>
+        </p:sp>
+        <p:sp>
+          <p:nvSpPr>
+            <p:cNvPr id="33" name="Rectangle 32"/>
+            <p:cNvSpPr/>
+            <p:nvPr/>
+          </p:nvSpPr>
+          <p:spPr>
+            <a:xfrm>
+              <a:off x="2184556" y="912006"/>
+              <a:ext cx="469028" cy="440886"/>
+            </a:xfrm>
+            <a:prstGeom prst="rect">
+              <a:avLst/>
+            </a:prstGeom>
+            <a:ln w="9525">
+              <a:solidFill>
+                <a:schemeClr val="tx1"/>
+              </a:solidFill>
+            </a:ln>
+          </p:spPr>
+          <p:style>
+            <a:lnRef idx="2">
+              <a:schemeClr val="accent6"/>
+            </a:lnRef>
+            <a:fillRef idx="1">
+              <a:schemeClr val="lt1"/>
+            </a:fillRef>
+            <a:effectRef idx="0">
+              <a:schemeClr val="accent6"/>
+            </a:effectRef>
+            <a:fontRef idx="minor">
+              <a:schemeClr val="dk1"/>
+            </a:fontRef>
+          </p:style>
+          <p:txBody>
+            <a:bodyPr rot="0" spcFirstLastPara="0" vertOverflow="overflow" horzOverflow="overflow" vert="horz" wrap="square" lIns="9577" tIns="4789" rIns="9577" bIns="4789" numCol="1" spcCol="0" rtlCol="0" fromWordArt="0" anchor="ctr" anchorCtr="0" forceAA="0" compatLnSpc="1">
+              <a:prstTxWarp prst="textNoShape">
+                <a:avLst/>
+              </a:prstTxWarp>
+              <a:noAutofit/>
+            </a:bodyPr>
+            <a:lstStyle/>
+            <a:p>
+              <a:pPr algn="ctr"/>
+              <a:endParaRPr lang="en-GB" sz="1000" dirty="0"/>
+            </a:p>
+          </p:txBody>
+        </p:sp>
+        <p:sp>
+          <p:nvSpPr>
+            <p:cNvPr id="34" name="Rectangle 33"/>
+            <p:cNvSpPr/>
+            <p:nvPr/>
+          </p:nvSpPr>
+          <p:spPr>
+            <a:xfrm>
+              <a:off x="2650032" y="912006"/>
+              <a:ext cx="469028" cy="440886"/>
+            </a:xfrm>
+            <a:prstGeom prst="rect">
+              <a:avLst/>
+            </a:prstGeom>
+            <a:ln w="9525">
+              <a:solidFill>
+                <a:schemeClr val="tx1"/>
+              </a:solidFill>
+            </a:ln>
+          </p:spPr>
+          <p:style>
+            <a:lnRef idx="2">
+              <a:schemeClr val="accent6"/>
+            </a:lnRef>
+            <a:fillRef idx="1">
+              <a:schemeClr val="lt1"/>
+            </a:fillRef>
+            <a:effectRef idx="0">
+              <a:schemeClr val="accent6"/>
+            </a:effectRef>
+            <a:fontRef idx="minor">
+              <a:schemeClr val="dk1"/>
+            </a:fontRef>
+          </p:style>
+          <p:txBody>
+            <a:bodyPr rot="0" spcFirstLastPara="0" vertOverflow="overflow" horzOverflow="overflow" vert="horz" wrap="square" lIns="9577" tIns="4789" rIns="9577" bIns="4789" numCol="1" spcCol="0" rtlCol="0" fromWordArt="0" anchor="ctr" anchorCtr="0" forceAA="0" compatLnSpc="1">
+              <a:prstTxWarp prst="textNoShape">
+                <a:avLst/>
+              </a:prstTxWarp>
+              <a:noAutofit/>
+            </a:bodyPr>
+            <a:lstStyle/>
+            <a:p>
+              <a:pPr algn="ctr"/>
+              <a:endParaRPr lang="en-GB" sz="1000" dirty="0"/>
+            </a:p>
+          </p:txBody>
+        </p:sp>
+        <p:sp>
+          <p:nvSpPr>
+            <p:cNvPr id="35" name="Rectangle 34"/>
+            <p:cNvSpPr/>
+            <p:nvPr/>
+          </p:nvSpPr>
+          <p:spPr>
+            <a:xfrm>
+              <a:off x="797344" y="912006"/>
+              <a:ext cx="469028" cy="440886"/>
+            </a:xfrm>
+            <a:prstGeom prst="rect">
+              <a:avLst/>
+            </a:prstGeom>
+            <a:ln w="9525">
+              <a:solidFill>
+                <a:schemeClr val="tx1"/>
+              </a:solidFill>
+            </a:ln>
+          </p:spPr>
+          <p:style>
+            <a:lnRef idx="2">
+              <a:schemeClr val="accent6"/>
+            </a:lnRef>
+            <a:fillRef idx="1">
+              <a:schemeClr val="lt1"/>
+            </a:fillRef>
+            <a:effectRef idx="0">
+              <a:schemeClr val="accent6"/>
+            </a:effectRef>
+            <a:fontRef idx="minor">
+              <a:schemeClr val="dk1"/>
+            </a:fontRef>
+          </p:style>
+          <p:txBody>
+            <a:bodyPr rot="0" spcFirstLastPara="0" vertOverflow="overflow" horzOverflow="overflow" vert="horz" wrap="square" lIns="9577" tIns="4789" rIns="9577" bIns="4789" numCol="1" spcCol="0" rtlCol="0" fromWordArt="0" anchor="ctr" anchorCtr="0" forceAA="0" compatLnSpc="1">
+              <a:prstTxWarp prst="textNoShape">
+                <a:avLst/>
+              </a:prstTxWarp>
+              <a:noAutofit/>
+            </a:bodyPr>
+            <a:lstStyle/>
+            <a:p>
+              <a:pPr algn="ctr"/>
+              <a:endParaRPr lang="en-GB" sz="1000" dirty="0"/>
+            </a:p>
+          </p:txBody>
+        </p:sp>
+      </p:grpSp>
+      <p:grpSp>
+        <p:nvGrpSpPr>
+          <p:cNvPr id="36" name="Group 35"/>
+          <p:cNvGrpSpPr/>
+          <p:nvPr/>
+        </p:nvGrpSpPr>
+        <p:grpSpPr>
+          <a:xfrm>
+            <a:off x="735432" y="1938338"/>
+            <a:ext cx="2321716" cy="90488"/>
+            <a:chOff x="797344" y="912006"/>
+            <a:chExt cx="2321716" cy="440886"/>
+          </a:xfrm>
+        </p:grpSpPr>
+        <p:sp>
+          <p:nvSpPr>
+            <p:cNvPr id="37" name="Rectangle 36"/>
+            <p:cNvSpPr/>
+            <p:nvPr/>
+          </p:nvSpPr>
+          <p:spPr>
+            <a:xfrm>
+              <a:off x="1264596" y="912006"/>
+              <a:ext cx="469028" cy="440886"/>
+            </a:xfrm>
+            <a:prstGeom prst="rect">
+              <a:avLst/>
+            </a:prstGeom>
+            <a:ln w="9525">
+              <a:solidFill>
+                <a:schemeClr val="tx1"/>
+              </a:solidFill>
+            </a:ln>
+          </p:spPr>
+          <p:style>
+            <a:lnRef idx="2">
+              <a:schemeClr val="accent6"/>
+            </a:lnRef>
+            <a:fillRef idx="1">
+              <a:schemeClr val="lt1"/>
+            </a:fillRef>
+            <a:effectRef idx="0">
+              <a:schemeClr val="accent6"/>
+            </a:effectRef>
+            <a:fontRef idx="minor">
+              <a:schemeClr val="dk1"/>
+            </a:fontRef>
+          </p:style>
+          <p:txBody>
+            <a:bodyPr rot="0" spcFirstLastPara="0" vertOverflow="overflow" horzOverflow="overflow" vert="horz" wrap="square" lIns="9577" tIns="4789" rIns="9577" bIns="4789" numCol="1" spcCol="0" rtlCol="0" fromWordArt="0" anchor="ctr" anchorCtr="0" forceAA="0" compatLnSpc="1">
+              <a:prstTxWarp prst="textNoShape">
+                <a:avLst/>
+              </a:prstTxWarp>
+              <a:noAutofit/>
+            </a:bodyPr>
+            <a:lstStyle/>
+            <a:p>
+              <a:pPr algn="ctr"/>
+              <a:endParaRPr lang="en-GB" sz="1000" dirty="0"/>
+            </a:p>
+          </p:txBody>
+        </p:sp>
+        <p:sp>
+          <p:nvSpPr>
+            <p:cNvPr id="38" name="Rectangle 37"/>
+            <p:cNvSpPr/>
+            <p:nvPr/>
+          </p:nvSpPr>
+          <p:spPr>
+            <a:xfrm>
+              <a:off x="1715528" y="912006"/>
+              <a:ext cx="469028" cy="440886"/>
+            </a:xfrm>
+            <a:prstGeom prst="rect">
+              <a:avLst/>
+            </a:prstGeom>
+            <a:ln w="9525">
+              <a:solidFill>
+                <a:schemeClr val="tx1"/>
+              </a:solidFill>
+            </a:ln>
+          </p:spPr>
+          <p:style>
+            <a:lnRef idx="2">
+              <a:schemeClr val="accent6"/>
+            </a:lnRef>
+            <a:fillRef idx="1">
+              <a:schemeClr val="lt1"/>
+            </a:fillRef>
+            <a:effectRef idx="0">
+              <a:schemeClr val="accent6"/>
+            </a:effectRef>
+            <a:fontRef idx="minor">
+              <a:schemeClr val="dk1"/>
+            </a:fontRef>
+          </p:style>
+          <p:txBody>
+            <a:bodyPr rot="0" spcFirstLastPara="0" vertOverflow="overflow" horzOverflow="overflow" vert="horz" wrap="square" lIns="9577" tIns="4789" rIns="9577" bIns="4789" numCol="1" spcCol="0" rtlCol="0" fromWordArt="0" anchor="ctr" anchorCtr="0" forceAA="0" compatLnSpc="1">
+              <a:prstTxWarp prst="textNoShape">
+                <a:avLst/>
+              </a:prstTxWarp>
+              <a:noAutofit/>
+            </a:bodyPr>
+            <a:lstStyle/>
+            <a:p>
+              <a:pPr algn="ctr"/>
+              <a:endParaRPr lang="en-GB" sz="1000" dirty="0"/>
+            </a:p>
+          </p:txBody>
+        </p:sp>
+        <p:sp>
+          <p:nvSpPr>
+            <p:cNvPr id="39" name="Rectangle 38"/>
+            <p:cNvSpPr/>
+            <p:nvPr/>
+          </p:nvSpPr>
+          <p:spPr>
+            <a:xfrm>
+              <a:off x="2184556" y="912006"/>
+              <a:ext cx="469028" cy="440886"/>
+            </a:xfrm>
+            <a:prstGeom prst="rect">
+              <a:avLst/>
+            </a:prstGeom>
+            <a:ln w="9525">
+              <a:solidFill>
+                <a:schemeClr val="tx1"/>
+              </a:solidFill>
+            </a:ln>
+          </p:spPr>
+          <p:style>
+            <a:lnRef idx="2">
+              <a:schemeClr val="accent6"/>
+            </a:lnRef>
+            <a:fillRef idx="1">
+              <a:schemeClr val="lt1"/>
+            </a:fillRef>
+            <a:effectRef idx="0">
+              <a:schemeClr val="accent6"/>
+            </a:effectRef>
+            <a:fontRef idx="minor">
+              <a:schemeClr val="dk1"/>
+            </a:fontRef>
+          </p:style>
+          <p:txBody>
+            <a:bodyPr rot="0" spcFirstLastPara="0" vertOverflow="overflow" horzOverflow="overflow" vert="horz" wrap="square" lIns="9577" tIns="4789" rIns="9577" bIns="4789" numCol="1" spcCol="0" rtlCol="0" fromWordArt="0" anchor="ctr" anchorCtr="0" forceAA="0" compatLnSpc="1">
+              <a:prstTxWarp prst="textNoShape">
+                <a:avLst/>
+              </a:prstTxWarp>
+              <a:noAutofit/>
+            </a:bodyPr>
+            <a:lstStyle/>
+            <a:p>
+              <a:pPr algn="ctr"/>
+              <a:endParaRPr lang="en-GB" sz="1000" dirty="0"/>
+            </a:p>
+          </p:txBody>
+        </p:sp>
+        <p:sp>
+          <p:nvSpPr>
+            <p:cNvPr id="40" name="Rectangle 39"/>
+            <p:cNvSpPr/>
+            <p:nvPr/>
+          </p:nvSpPr>
+          <p:spPr>
+            <a:xfrm>
+              <a:off x="2650032" y="912006"/>
+              <a:ext cx="469028" cy="440886"/>
+            </a:xfrm>
+            <a:prstGeom prst="rect">
+              <a:avLst/>
+            </a:prstGeom>
+            <a:ln w="9525">
+              <a:solidFill>
+                <a:schemeClr val="tx1"/>
+              </a:solidFill>
+            </a:ln>
+          </p:spPr>
+          <p:style>
+            <a:lnRef idx="2">
+              <a:schemeClr val="accent6"/>
+            </a:lnRef>
+            <a:fillRef idx="1">
+              <a:schemeClr val="lt1"/>
+            </a:fillRef>
+            <a:effectRef idx="0">
+              <a:schemeClr val="accent6"/>
+            </a:effectRef>
+            <a:fontRef idx="minor">
+              <a:schemeClr val="dk1"/>
+            </a:fontRef>
+          </p:style>
+          <p:txBody>
+            <a:bodyPr rot="0" spcFirstLastPara="0" vertOverflow="overflow" horzOverflow="overflow" vert="horz" wrap="square" lIns="9577" tIns="4789" rIns="9577" bIns="4789" numCol="1" spcCol="0" rtlCol="0" fromWordArt="0" anchor="ctr" anchorCtr="0" forceAA="0" compatLnSpc="1">
+              <a:prstTxWarp prst="textNoShape">
+                <a:avLst/>
+              </a:prstTxWarp>
+              <a:noAutofit/>
+            </a:bodyPr>
+            <a:lstStyle/>
+            <a:p>
+              <a:pPr algn="ctr"/>
+              <a:endParaRPr lang="en-GB" sz="1000" dirty="0"/>
+            </a:p>
+          </p:txBody>
+        </p:sp>
+        <p:sp>
+          <p:nvSpPr>
+            <p:cNvPr id="41" name="Rectangle 40"/>
+            <p:cNvSpPr/>
+            <p:nvPr/>
+          </p:nvSpPr>
+          <p:spPr>
+            <a:xfrm>
+              <a:off x="797344" y="912006"/>
+              <a:ext cx="469028" cy="440886"/>
+            </a:xfrm>
+            <a:prstGeom prst="rect">
+              <a:avLst/>
+            </a:prstGeom>
+            <a:ln w="9525">
+              <a:solidFill>
+                <a:schemeClr val="tx1"/>
+              </a:solidFill>
+            </a:ln>
+          </p:spPr>
+          <p:style>
+            <a:lnRef idx="2">
+              <a:schemeClr val="accent6"/>
+            </a:lnRef>
+            <a:fillRef idx="1">
+              <a:schemeClr val="lt1"/>
+            </a:fillRef>
+            <a:effectRef idx="0">
+              <a:schemeClr val="accent6"/>
+            </a:effectRef>
+            <a:fontRef idx="minor">
+              <a:schemeClr val="dk1"/>
+            </a:fontRef>
+          </p:style>
+          <p:txBody>
+            <a:bodyPr rot="0" spcFirstLastPara="0" vertOverflow="overflow" horzOverflow="overflow" vert="horz" wrap="square" lIns="9577" tIns="4789" rIns="9577" bIns="4789" numCol="1" spcCol="0" rtlCol="0" fromWordArt="0" anchor="ctr" anchorCtr="0" forceAA="0" compatLnSpc="1">
+              <a:prstTxWarp prst="textNoShape">
+                <a:avLst/>
+              </a:prstTxWarp>
+              <a:noAutofit/>
+            </a:bodyPr>
+            <a:lstStyle/>
+            <a:p>
+              <a:pPr algn="ctr"/>
+              <a:endParaRPr lang="en-GB" sz="1000" dirty="0"/>
+            </a:p>
+          </p:txBody>
+        </p:sp>
+      </p:grpSp>
+      <p:grpSp>
+        <p:nvGrpSpPr>
+          <p:cNvPr id="42" name="Group 41"/>
+          <p:cNvGrpSpPr/>
+          <p:nvPr/>
+        </p:nvGrpSpPr>
+        <p:grpSpPr>
+          <a:xfrm>
+            <a:off x="735432" y="1819275"/>
+            <a:ext cx="2321716" cy="119063"/>
+            <a:chOff x="797344" y="912006"/>
+            <a:chExt cx="2321716" cy="440886"/>
+          </a:xfrm>
+        </p:grpSpPr>
+        <p:sp>
+          <p:nvSpPr>
+            <p:cNvPr id="43" name="Rectangle 42"/>
+            <p:cNvSpPr/>
+            <p:nvPr/>
+          </p:nvSpPr>
+          <p:spPr>
+            <a:xfrm>
+              <a:off x="1264596" y="912006"/>
+              <a:ext cx="469028" cy="440886"/>
+            </a:xfrm>
+            <a:prstGeom prst="rect">
+              <a:avLst/>
+            </a:prstGeom>
+            <a:ln w="9525">
+              <a:solidFill>
+                <a:schemeClr val="tx1"/>
+              </a:solidFill>
+            </a:ln>
+          </p:spPr>
+          <p:style>
+            <a:lnRef idx="2">
+              <a:schemeClr val="accent6"/>
+            </a:lnRef>
+            <a:fillRef idx="1">
+              <a:schemeClr val="lt1"/>
+            </a:fillRef>
+            <a:effectRef idx="0">
+              <a:schemeClr val="accent6"/>
+            </a:effectRef>
+            <a:fontRef idx="minor">
+              <a:schemeClr val="dk1"/>
+            </a:fontRef>
+          </p:style>
+          <p:txBody>
+            <a:bodyPr rot="0" spcFirstLastPara="0" vertOverflow="overflow" horzOverflow="overflow" vert="horz" wrap="square" lIns="9577" tIns="4789" rIns="9577" bIns="4789" numCol="1" spcCol="0" rtlCol="0" fromWordArt="0" anchor="ctr" anchorCtr="0" forceAA="0" compatLnSpc="1">
+              <a:prstTxWarp prst="textNoShape">
+                <a:avLst/>
+              </a:prstTxWarp>
+              <a:noAutofit/>
+            </a:bodyPr>
+            <a:lstStyle/>
+            <a:p>
+              <a:pPr algn="ctr"/>
+              <a:endParaRPr lang="en-GB" sz="1000" dirty="0"/>
+            </a:p>
+          </p:txBody>
+        </p:sp>
+        <p:sp>
+          <p:nvSpPr>
+            <p:cNvPr id="44" name="Rectangle 43"/>
+            <p:cNvSpPr/>
+            <p:nvPr/>
+          </p:nvSpPr>
+          <p:spPr>
+            <a:xfrm>
+              <a:off x="1715528" y="912006"/>
+              <a:ext cx="469028" cy="440886"/>
+            </a:xfrm>
+            <a:prstGeom prst="rect">
+              <a:avLst/>
+            </a:prstGeom>
+            <a:ln w="9525">
+              <a:solidFill>
+                <a:schemeClr val="tx1"/>
+              </a:solidFill>
+            </a:ln>
+          </p:spPr>
+          <p:style>
+            <a:lnRef idx="2">
+              <a:schemeClr val="accent6"/>
+            </a:lnRef>
+            <a:fillRef idx="1">
+              <a:schemeClr val="lt1"/>
+            </a:fillRef>
+            <a:effectRef idx="0">
+              <a:schemeClr val="accent6"/>
+            </a:effectRef>
+            <a:fontRef idx="minor">
+              <a:schemeClr val="dk1"/>
+            </a:fontRef>
+          </p:style>
+          <p:txBody>
+            <a:bodyPr rot="0" spcFirstLastPara="0" vertOverflow="overflow" horzOverflow="overflow" vert="horz" wrap="square" lIns="9577" tIns="4789" rIns="9577" bIns="4789" numCol="1" spcCol="0" rtlCol="0" fromWordArt="0" anchor="ctr" anchorCtr="0" forceAA="0" compatLnSpc="1">
+              <a:prstTxWarp prst="textNoShape">
+                <a:avLst/>
+              </a:prstTxWarp>
+              <a:noAutofit/>
+            </a:bodyPr>
+            <a:lstStyle/>
+            <a:p>
+              <a:pPr algn="ctr"/>
+              <a:endParaRPr lang="en-GB" sz="1000" dirty="0"/>
+            </a:p>
+          </p:txBody>
+        </p:sp>
+        <p:sp>
+          <p:nvSpPr>
+            <p:cNvPr id="45" name="Rectangle 44"/>
+            <p:cNvSpPr/>
+            <p:nvPr/>
+          </p:nvSpPr>
+          <p:spPr>
+            <a:xfrm>
+              <a:off x="2184556" y="912006"/>
+              <a:ext cx="469028" cy="440886"/>
+            </a:xfrm>
+            <a:prstGeom prst="rect">
+              <a:avLst/>
+            </a:prstGeom>
+            <a:ln w="9525">
+              <a:solidFill>
+                <a:schemeClr val="tx1"/>
+              </a:solidFill>
+            </a:ln>
+          </p:spPr>
+          <p:style>
+            <a:lnRef idx="2">
+              <a:schemeClr val="accent6"/>
+            </a:lnRef>
+            <a:fillRef idx="1">
+              <a:schemeClr val="lt1"/>
+            </a:fillRef>
+            <a:effectRef idx="0">
+              <a:schemeClr val="accent6"/>
+            </a:effectRef>
+            <a:fontRef idx="minor">
+              <a:schemeClr val="dk1"/>
+            </a:fontRef>
+          </p:style>
+          <p:txBody>
+            <a:bodyPr rot="0" spcFirstLastPara="0" vertOverflow="overflow" horzOverflow="overflow" vert="horz" wrap="square" lIns="9577" tIns="4789" rIns="9577" bIns="4789" numCol="1" spcCol="0" rtlCol="0" fromWordArt="0" anchor="ctr" anchorCtr="0" forceAA="0" compatLnSpc="1">
+              <a:prstTxWarp prst="textNoShape">
+                <a:avLst/>
+              </a:prstTxWarp>
+              <a:noAutofit/>
+            </a:bodyPr>
+            <a:lstStyle/>
+            <a:p>
+              <a:pPr algn="ctr"/>
+              <a:endParaRPr lang="en-GB" sz="1000" dirty="0"/>
+            </a:p>
+          </p:txBody>
+        </p:sp>
+        <p:sp>
+          <p:nvSpPr>
+            <p:cNvPr id="46" name="Rectangle 45"/>
+            <p:cNvSpPr/>
+            <p:nvPr/>
+          </p:nvSpPr>
+          <p:spPr>
+            <a:xfrm>
+              <a:off x="2650032" y="912006"/>
+              <a:ext cx="469028" cy="440886"/>
+            </a:xfrm>
+            <a:prstGeom prst="rect">
+              <a:avLst/>
+            </a:prstGeom>
+            <a:ln w="9525">
+              <a:solidFill>
+                <a:schemeClr val="tx1"/>
+              </a:solidFill>
+            </a:ln>
+          </p:spPr>
+          <p:style>
+            <a:lnRef idx="2">
+              <a:schemeClr val="accent6"/>
+            </a:lnRef>
+            <a:fillRef idx="1">
+              <a:schemeClr val="lt1"/>
+            </a:fillRef>
+            <a:effectRef idx="0">
+              <a:schemeClr val="accent6"/>
+            </a:effectRef>
+            <a:fontRef idx="minor">
+              <a:schemeClr val="dk1"/>
+            </a:fontRef>
+          </p:style>
+          <p:txBody>
+            <a:bodyPr rot="0" spcFirstLastPara="0" vertOverflow="overflow" horzOverflow="overflow" vert="horz" wrap="square" lIns="9577" tIns="4789" rIns="9577" bIns="4789" numCol="1" spcCol="0" rtlCol="0" fromWordArt="0" anchor="ctr" anchorCtr="0" forceAA="0" compatLnSpc="1">
+              <a:prstTxWarp prst="textNoShape">
+                <a:avLst/>
+              </a:prstTxWarp>
+              <a:noAutofit/>
+            </a:bodyPr>
+            <a:lstStyle/>
+            <a:p>
+              <a:pPr algn="ctr"/>
+              <a:endParaRPr lang="en-GB" sz="1000" dirty="0"/>
+            </a:p>
+          </p:txBody>
+        </p:sp>
+        <p:sp>
+          <p:nvSpPr>
+            <p:cNvPr id="47" name="Rectangle 46"/>
+            <p:cNvSpPr/>
+            <p:nvPr/>
+          </p:nvSpPr>
+          <p:spPr>
+            <a:xfrm>
+              <a:off x="797344" y="912006"/>
+              <a:ext cx="469028" cy="440886"/>
+            </a:xfrm>
+            <a:prstGeom prst="rect">
+              <a:avLst/>
+            </a:prstGeom>
+            <a:ln w="9525">
+              <a:solidFill>
+                <a:schemeClr val="tx1"/>
+              </a:solidFill>
+            </a:ln>
+          </p:spPr>
+          <p:style>
+            <a:lnRef idx="2">
+              <a:schemeClr val="accent6"/>
+            </a:lnRef>
+            <a:fillRef idx="1">
+              <a:schemeClr val="lt1"/>
+            </a:fillRef>
+            <a:effectRef idx="0">
+              <a:schemeClr val="accent6"/>
+            </a:effectRef>
+            <a:fontRef idx="minor">
+              <a:schemeClr val="dk1"/>
+            </a:fontRef>
+          </p:style>
+          <p:txBody>
+            <a:bodyPr rot="0" spcFirstLastPara="0" vertOverflow="overflow" horzOverflow="overflow" vert="horz" wrap="square" lIns="9577" tIns="4789" rIns="9577" bIns="4789" numCol="1" spcCol="0" rtlCol="0" fromWordArt="0" anchor="ctr" anchorCtr="0" forceAA="0" compatLnSpc="1">
+              <a:prstTxWarp prst="textNoShape">
+                <a:avLst/>
+              </a:prstTxWarp>
+              <a:noAutofit/>
+            </a:bodyPr>
+            <a:lstStyle/>
+            <a:p>
+              <a:pPr algn="ctr"/>
+              <a:endParaRPr lang="en-GB" sz="1000" dirty="0"/>
+            </a:p>
+          </p:txBody>
+        </p:sp>
+      </p:grpSp>
+      <p:grpSp>
+        <p:nvGrpSpPr>
+          <p:cNvPr id="48" name="Group 47"/>
+          <p:cNvGrpSpPr/>
+          <p:nvPr/>
+        </p:nvGrpSpPr>
+        <p:grpSpPr>
+          <a:xfrm>
+            <a:off x="735432" y="1633538"/>
+            <a:ext cx="2321716" cy="185737"/>
+            <a:chOff x="797344" y="912006"/>
+            <a:chExt cx="2321716" cy="440886"/>
+          </a:xfrm>
+        </p:grpSpPr>
+        <p:sp>
+          <p:nvSpPr>
+            <p:cNvPr id="49" name="Rectangle 48"/>
+            <p:cNvSpPr/>
+            <p:nvPr/>
+          </p:nvSpPr>
+          <p:spPr>
+            <a:xfrm>
+              <a:off x="1264596" y="912006"/>
+              <a:ext cx="469028" cy="440886"/>
+            </a:xfrm>
+            <a:prstGeom prst="rect">
+              <a:avLst/>
+            </a:prstGeom>
+            <a:ln w="9525">
+              <a:solidFill>
+                <a:schemeClr val="tx1"/>
+              </a:solidFill>
+            </a:ln>
+          </p:spPr>
+          <p:style>
+            <a:lnRef idx="2">
+              <a:schemeClr val="accent6"/>
+            </a:lnRef>
+            <a:fillRef idx="1">
+              <a:schemeClr val="lt1"/>
+            </a:fillRef>
+            <a:effectRef idx="0">
+              <a:schemeClr val="accent6"/>
+            </a:effectRef>
+            <a:fontRef idx="minor">
+              <a:schemeClr val="dk1"/>
+            </a:fontRef>
+          </p:style>
+          <p:txBody>
+            <a:bodyPr rot="0" spcFirstLastPara="0" vertOverflow="overflow" horzOverflow="overflow" vert="horz" wrap="square" lIns="9577" tIns="4789" rIns="9577" bIns="4789" numCol="1" spcCol="0" rtlCol="0" fromWordArt="0" anchor="ctr" anchorCtr="0" forceAA="0" compatLnSpc="1">
+              <a:prstTxWarp prst="textNoShape">
+                <a:avLst/>
+              </a:prstTxWarp>
+              <a:noAutofit/>
+            </a:bodyPr>
+            <a:lstStyle/>
+            <a:p>
+              <a:pPr algn="ctr"/>
+              <a:endParaRPr lang="en-GB" sz="1000" dirty="0"/>
+            </a:p>
+          </p:txBody>
+        </p:sp>
+        <p:sp>
+          <p:nvSpPr>
+            <p:cNvPr id="50" name="Rectangle 49"/>
+            <p:cNvSpPr/>
+            <p:nvPr/>
+          </p:nvSpPr>
+          <p:spPr>
+            <a:xfrm>
+              <a:off x="1715528" y="912006"/>
+              <a:ext cx="469028" cy="440886"/>
+            </a:xfrm>
+            <a:prstGeom prst="rect">
+              <a:avLst/>
+            </a:prstGeom>
+            <a:ln w="9525">
+              <a:solidFill>
+                <a:schemeClr val="tx1"/>
+              </a:solidFill>
+            </a:ln>
+          </p:spPr>
+          <p:style>
+            <a:lnRef idx="2">
+              <a:schemeClr val="accent6"/>
+            </a:lnRef>
+            <a:fillRef idx="1">
+              <a:schemeClr val="lt1"/>
+            </a:fillRef>
+            <a:effectRef idx="0">
+              <a:schemeClr val="accent6"/>
+            </a:effectRef>
+            <a:fontRef idx="minor">
+              <a:schemeClr val="dk1"/>
+            </a:fontRef>
+          </p:style>
+          <p:txBody>
+            <a:bodyPr rot="0" spcFirstLastPara="0" vertOverflow="overflow" horzOverflow="overflow" vert="horz" wrap="square" lIns="9577" tIns="4789" rIns="9577" bIns="4789" numCol="1" spcCol="0" rtlCol="0" fromWordArt="0" anchor="ctr" anchorCtr="0" forceAA="0" compatLnSpc="1">
+              <a:prstTxWarp prst="textNoShape">
+                <a:avLst/>
+              </a:prstTxWarp>
+              <a:noAutofit/>
+            </a:bodyPr>
+            <a:lstStyle/>
+            <a:p>
+              <a:pPr algn="ctr"/>
+              <a:endParaRPr lang="en-GB" sz="1000" dirty="0"/>
+            </a:p>
+          </p:txBody>
+        </p:sp>
+        <p:sp>
+          <p:nvSpPr>
+            <p:cNvPr id="51" name="Rectangle 50"/>
+            <p:cNvSpPr/>
+            <p:nvPr/>
+          </p:nvSpPr>
+          <p:spPr>
+            <a:xfrm>
+              <a:off x="2184556" y="912006"/>
+              <a:ext cx="469028" cy="440886"/>
+            </a:xfrm>
+            <a:prstGeom prst="rect">
+              <a:avLst/>
+            </a:prstGeom>
+            <a:ln w="9525">
+              <a:solidFill>
+                <a:schemeClr val="tx1"/>
+              </a:solidFill>
+            </a:ln>
+          </p:spPr>
+          <p:style>
+            <a:lnRef idx="2">
+              <a:schemeClr val="accent6"/>
+            </a:lnRef>
+            <a:fillRef idx="1">
+              <a:schemeClr val="lt1"/>
+            </a:fillRef>
+            <a:effectRef idx="0">
+              <a:schemeClr val="accent6"/>
+            </a:effectRef>
+            <a:fontRef idx="minor">
+              <a:schemeClr val="dk1"/>
+            </a:fontRef>
+          </p:style>
+          <p:txBody>
+            <a:bodyPr rot="0" spcFirstLastPara="0" vertOverflow="overflow" horzOverflow="overflow" vert="horz" wrap="square" lIns="9577" tIns="4789" rIns="9577" bIns="4789" numCol="1" spcCol="0" rtlCol="0" fromWordArt="0" anchor="ctr" anchorCtr="0" forceAA="0" compatLnSpc="1">
+              <a:prstTxWarp prst="textNoShape">
+                <a:avLst/>
+              </a:prstTxWarp>
+              <a:noAutofit/>
+            </a:bodyPr>
+            <a:lstStyle/>
+            <a:p>
+              <a:pPr algn="ctr"/>
+              <a:endParaRPr lang="en-GB" sz="1000" dirty="0"/>
+            </a:p>
+          </p:txBody>
+        </p:sp>
+        <p:sp>
+          <p:nvSpPr>
+            <p:cNvPr id="52" name="Rectangle 51"/>
+            <p:cNvSpPr/>
+            <p:nvPr/>
+          </p:nvSpPr>
+          <p:spPr>
+            <a:xfrm>
+              <a:off x="2650032" y="912006"/>
+              <a:ext cx="469028" cy="440886"/>
+            </a:xfrm>
+            <a:prstGeom prst="rect">
+              <a:avLst/>
+            </a:prstGeom>
+            <a:ln w="9525">
+              <a:solidFill>
+                <a:schemeClr val="tx1"/>
+              </a:solidFill>
+            </a:ln>
+          </p:spPr>
+          <p:style>
+            <a:lnRef idx="2">
+              <a:schemeClr val="accent6"/>
+            </a:lnRef>
+            <a:fillRef idx="1">
+              <a:schemeClr val="lt1"/>
+            </a:fillRef>
+            <a:effectRef idx="0">
+              <a:schemeClr val="accent6"/>
+            </a:effectRef>
+            <a:fontRef idx="minor">
+              <a:schemeClr val="dk1"/>
+            </a:fontRef>
+          </p:style>
+          <p:txBody>
+            <a:bodyPr rot="0" spcFirstLastPara="0" vertOverflow="overflow" horzOverflow="overflow" vert="horz" wrap="square" lIns="9577" tIns="4789" rIns="9577" bIns="4789" numCol="1" spcCol="0" rtlCol="0" fromWordArt="0" anchor="ctr" anchorCtr="0" forceAA="0" compatLnSpc="1">
+              <a:prstTxWarp prst="textNoShape">
+                <a:avLst/>
+              </a:prstTxWarp>
+              <a:noAutofit/>
+            </a:bodyPr>
+            <a:lstStyle/>
+            <a:p>
+              <a:pPr algn="ctr"/>
+              <a:endParaRPr lang="en-GB" sz="1000" dirty="0"/>
+            </a:p>
+          </p:txBody>
+        </p:sp>
+        <p:sp>
+          <p:nvSpPr>
+            <p:cNvPr id="53" name="Rectangle 52"/>
+            <p:cNvSpPr/>
+            <p:nvPr/>
+          </p:nvSpPr>
+          <p:spPr>
+            <a:xfrm>
+              <a:off x="797344" y="912006"/>
+              <a:ext cx="469028" cy="440886"/>
+            </a:xfrm>
+            <a:prstGeom prst="rect">
+              <a:avLst/>
+            </a:prstGeom>
+            <a:ln w="9525">
+              <a:solidFill>
+                <a:schemeClr val="tx1"/>
+              </a:solidFill>
+            </a:ln>
+          </p:spPr>
+          <p:style>
+            <a:lnRef idx="2">
+              <a:schemeClr val="accent6"/>
+            </a:lnRef>
+            <a:fillRef idx="1">
+              <a:schemeClr val="lt1"/>
+            </a:fillRef>
+            <a:effectRef idx="0">
+              <a:schemeClr val="accent6"/>
+            </a:effectRef>
+            <a:fontRef idx="minor">
+              <a:schemeClr val="dk1"/>
+            </a:fontRef>
+          </p:style>
+          <p:txBody>
+            <a:bodyPr rot="0" spcFirstLastPara="0" vertOverflow="overflow" horzOverflow="overflow" vert="horz" wrap="square" lIns="9577" tIns="4789" rIns="9577" bIns="4789" numCol="1" spcCol="0" rtlCol="0" fromWordArt="0" anchor="ctr" anchorCtr="0" forceAA="0" compatLnSpc="1">
+              <a:prstTxWarp prst="textNoShape">
+                <a:avLst/>
+              </a:prstTxWarp>
+              <a:noAutofit/>
+            </a:bodyPr>
+            <a:lstStyle/>
+            <a:p>
+              <a:pPr algn="ctr"/>
+              <a:endParaRPr lang="en-GB" sz="1000" dirty="0"/>
+            </a:p>
+          </p:txBody>
+        </p:sp>
+      </p:grpSp>
+      <p:grpSp>
+        <p:nvGrpSpPr>
+          <p:cNvPr id="55" name="Group 54"/>
+          <p:cNvGrpSpPr/>
+          <p:nvPr/>
+        </p:nvGrpSpPr>
+        <p:grpSpPr>
+          <a:xfrm>
+            <a:off x="735432" y="1376363"/>
+            <a:ext cx="2321716" cy="266699"/>
+            <a:chOff x="797344" y="912006"/>
+            <a:chExt cx="2321716" cy="440886"/>
+          </a:xfrm>
+        </p:grpSpPr>
+        <p:sp>
+          <p:nvSpPr>
+            <p:cNvPr id="56" name="Rectangle 55"/>
+            <p:cNvSpPr/>
+            <p:nvPr/>
+          </p:nvSpPr>
+          <p:spPr>
+            <a:xfrm>
+              <a:off x="1264596" y="912006"/>
+              <a:ext cx="469028" cy="440886"/>
+            </a:xfrm>
+            <a:prstGeom prst="rect">
+              <a:avLst/>
+            </a:prstGeom>
+            <a:ln w="9525">
+              <a:solidFill>
+                <a:schemeClr val="tx1"/>
+              </a:solidFill>
+            </a:ln>
+          </p:spPr>
+          <p:style>
+            <a:lnRef idx="2">
+              <a:schemeClr val="accent6"/>
+            </a:lnRef>
+            <a:fillRef idx="1">
+              <a:schemeClr val="lt1"/>
+            </a:fillRef>
+            <a:effectRef idx="0">
+              <a:schemeClr val="accent6"/>
+            </a:effectRef>
+            <a:fontRef idx="minor">
+              <a:schemeClr val="dk1"/>
+            </a:fontRef>
+          </p:style>
+          <p:txBody>
+            <a:bodyPr rot="0" spcFirstLastPara="0" vertOverflow="overflow" horzOverflow="overflow" vert="horz" wrap="square" lIns="9577" tIns="4789" rIns="9577" bIns="4789" numCol="1" spcCol="0" rtlCol="0" fromWordArt="0" anchor="ctr" anchorCtr="0" forceAA="0" compatLnSpc="1">
+              <a:prstTxWarp prst="textNoShape">
+                <a:avLst/>
+              </a:prstTxWarp>
+              <a:noAutofit/>
+            </a:bodyPr>
+            <a:lstStyle/>
+            <a:p>
+              <a:pPr algn="ctr"/>
+              <a:endParaRPr lang="en-GB" sz="1000" dirty="0"/>
+            </a:p>
+          </p:txBody>
+        </p:sp>
+        <p:sp>
+          <p:nvSpPr>
+            <p:cNvPr id="57" name="Rectangle 56"/>
+            <p:cNvSpPr/>
+            <p:nvPr/>
+          </p:nvSpPr>
+          <p:spPr>
+            <a:xfrm>
+              <a:off x="1715528" y="912006"/>
+              <a:ext cx="469028" cy="440886"/>
+            </a:xfrm>
+            <a:prstGeom prst="rect">
+              <a:avLst/>
+            </a:prstGeom>
+            <a:ln w="9525">
+              <a:solidFill>
+                <a:schemeClr val="tx1"/>
+              </a:solidFill>
+            </a:ln>
+          </p:spPr>
+          <p:style>
+            <a:lnRef idx="2">
+              <a:schemeClr val="accent6"/>
+            </a:lnRef>
+            <a:fillRef idx="1">
+              <a:schemeClr val="lt1"/>
+            </a:fillRef>
+            <a:effectRef idx="0">
+              <a:schemeClr val="accent6"/>
+            </a:effectRef>
+            <a:fontRef idx="minor">
+              <a:schemeClr val="dk1"/>
+            </a:fontRef>
+          </p:style>
+          <p:txBody>
+            <a:bodyPr rot="0" spcFirstLastPara="0" vertOverflow="overflow" horzOverflow="overflow" vert="horz" wrap="square" lIns="9577" tIns="4789" rIns="9577" bIns="4789" numCol="1" spcCol="0" rtlCol="0" fromWordArt="0" anchor="ctr" anchorCtr="0" forceAA="0" compatLnSpc="1">
+              <a:prstTxWarp prst="textNoShape">
+                <a:avLst/>
+              </a:prstTxWarp>
+              <a:noAutofit/>
+            </a:bodyPr>
+            <a:lstStyle/>
+            <a:p>
+              <a:pPr algn="ctr"/>
+              <a:endParaRPr lang="en-GB" sz="1000" dirty="0"/>
+            </a:p>
+          </p:txBody>
+        </p:sp>
+        <p:sp>
+          <p:nvSpPr>
+            <p:cNvPr id="58" name="Rectangle 57"/>
+            <p:cNvSpPr/>
+            <p:nvPr/>
+          </p:nvSpPr>
+          <p:spPr>
+            <a:xfrm>
+              <a:off x="2184556" y="912006"/>
+              <a:ext cx="469028" cy="440886"/>
+            </a:xfrm>
+            <a:prstGeom prst="rect">
+              <a:avLst/>
+            </a:prstGeom>
+            <a:ln w="9525">
+              <a:solidFill>
+                <a:schemeClr val="tx1"/>
+              </a:solidFill>
+            </a:ln>
+          </p:spPr>
+          <p:style>
+            <a:lnRef idx="2">
+              <a:schemeClr val="accent6"/>
+            </a:lnRef>
+            <a:fillRef idx="1">
+              <a:schemeClr val="lt1"/>
+            </a:fillRef>
+            <a:effectRef idx="0">
+              <a:schemeClr val="accent6"/>
+            </a:effectRef>
+            <a:fontRef idx="minor">
+              <a:schemeClr val="dk1"/>
+            </a:fontRef>
+          </p:style>
+          <p:txBody>
+            <a:bodyPr rot="0" spcFirstLastPara="0" vertOverflow="overflow" horzOverflow="overflow" vert="horz" wrap="square" lIns="9577" tIns="4789" rIns="9577" bIns="4789" numCol="1" spcCol="0" rtlCol="0" fromWordArt="0" anchor="ctr" anchorCtr="0" forceAA="0" compatLnSpc="1">
+              <a:prstTxWarp prst="textNoShape">
+                <a:avLst/>
+              </a:prstTxWarp>
+              <a:noAutofit/>
+            </a:bodyPr>
+            <a:lstStyle/>
+            <a:p>
+              <a:pPr algn="ctr"/>
+              <a:endParaRPr lang="en-GB" sz="1000" dirty="0"/>
+            </a:p>
+          </p:txBody>
+        </p:sp>
+        <p:sp>
+          <p:nvSpPr>
+            <p:cNvPr id="59" name="Rectangle 58"/>
+            <p:cNvSpPr/>
+            <p:nvPr/>
+          </p:nvSpPr>
+          <p:spPr>
+            <a:xfrm>
+              <a:off x="2650032" y="912006"/>
+              <a:ext cx="469028" cy="440886"/>
+            </a:xfrm>
+            <a:prstGeom prst="rect">
+              <a:avLst/>
+            </a:prstGeom>
+            <a:ln w="9525">
+              <a:solidFill>
+                <a:schemeClr val="tx1"/>
+              </a:solidFill>
+            </a:ln>
+          </p:spPr>
+          <p:style>
+            <a:lnRef idx="2">
+              <a:schemeClr val="accent6"/>
+            </a:lnRef>
+            <a:fillRef idx="1">
+              <a:schemeClr val="lt1"/>
+            </a:fillRef>
+            <a:effectRef idx="0">
+              <a:schemeClr val="accent6"/>
+            </a:effectRef>
+            <a:fontRef idx="minor">
+              <a:schemeClr val="dk1"/>
+            </a:fontRef>
+          </p:style>
+          <p:txBody>
+            <a:bodyPr rot="0" spcFirstLastPara="0" vertOverflow="overflow" horzOverflow="overflow" vert="horz" wrap="square" lIns="9577" tIns="4789" rIns="9577" bIns="4789" numCol="1" spcCol="0" rtlCol="0" fromWordArt="0" anchor="ctr" anchorCtr="0" forceAA="0" compatLnSpc="1">
+              <a:prstTxWarp prst="textNoShape">
+                <a:avLst/>
+              </a:prstTxWarp>
+              <a:noAutofit/>
+            </a:bodyPr>
+            <a:lstStyle/>
+            <a:p>
+              <a:pPr algn="ctr"/>
+              <a:endParaRPr lang="en-GB" sz="1000" dirty="0"/>
+            </a:p>
+          </p:txBody>
+        </p:sp>
+        <p:sp>
+          <p:nvSpPr>
+            <p:cNvPr id="60" name="Rectangle 59"/>
+            <p:cNvSpPr/>
+            <p:nvPr/>
+          </p:nvSpPr>
+          <p:spPr>
+            <a:xfrm>
+              <a:off x="797344" y="912006"/>
+              <a:ext cx="469028" cy="440886"/>
+            </a:xfrm>
+            <a:prstGeom prst="rect">
+              <a:avLst/>
+            </a:prstGeom>
+            <a:ln w="9525">
+              <a:solidFill>
+                <a:schemeClr val="tx1"/>
+              </a:solidFill>
+            </a:ln>
+          </p:spPr>
+          <p:style>
+            <a:lnRef idx="2">
+              <a:schemeClr val="accent6"/>
+            </a:lnRef>
+            <a:fillRef idx="1">
+              <a:schemeClr val="lt1"/>
+            </a:fillRef>
+            <a:effectRef idx="0">
+              <a:schemeClr val="accent6"/>
+            </a:effectRef>
+            <a:fontRef idx="minor">
+              <a:schemeClr val="dk1"/>
+            </a:fontRef>
+          </p:style>
+          <p:txBody>
+            <a:bodyPr rot="0" spcFirstLastPara="0" vertOverflow="overflow" horzOverflow="overflow" vert="horz" wrap="square" lIns="9577" tIns="4789" rIns="9577" bIns="4789" numCol="1" spcCol="0" rtlCol="0" fromWordArt="0" anchor="ctr" anchorCtr="0" forceAA="0" compatLnSpc="1">
+              <a:prstTxWarp prst="textNoShape">
+                <a:avLst/>
+              </a:prstTxWarp>
+              <a:noAutofit/>
+            </a:bodyPr>
+            <a:lstStyle/>
+            <a:p>
+              <a:pPr algn="ctr"/>
+              <a:endParaRPr lang="en-GB" sz="1000" dirty="0"/>
+            </a:p>
+          </p:txBody>
+        </p:sp>
+      </p:grpSp>
+      <p:grpSp>
+        <p:nvGrpSpPr>
+          <p:cNvPr id="62" name="Group 61"/>
+          <p:cNvGrpSpPr/>
+          <p:nvPr/>
+        </p:nvGrpSpPr>
+        <p:grpSpPr>
+          <a:xfrm>
+            <a:off x="735432" y="943582"/>
+            <a:ext cx="2321716" cy="443733"/>
+            <a:chOff x="797344" y="912006"/>
+            <a:chExt cx="2321716" cy="440886"/>
+          </a:xfrm>
+        </p:grpSpPr>
+        <p:sp>
+          <p:nvSpPr>
+            <p:cNvPr id="63" name="Rectangle 62"/>
+            <p:cNvSpPr/>
+            <p:nvPr/>
+          </p:nvSpPr>
+          <p:spPr>
+            <a:xfrm>
+              <a:off x="1264596" y="912006"/>
+              <a:ext cx="469028" cy="440886"/>
+            </a:xfrm>
+            <a:prstGeom prst="rect">
+              <a:avLst/>
+            </a:prstGeom>
+            <a:ln w="9525">
+              <a:solidFill>
+                <a:schemeClr val="tx1"/>
+              </a:solidFill>
+            </a:ln>
+          </p:spPr>
+          <p:style>
+            <a:lnRef idx="2">
+              <a:schemeClr val="accent6"/>
+            </a:lnRef>
+            <a:fillRef idx="1">
+              <a:schemeClr val="lt1"/>
+            </a:fillRef>
+            <a:effectRef idx="0">
+              <a:schemeClr val="accent6"/>
+            </a:effectRef>
+            <a:fontRef idx="minor">
+              <a:schemeClr val="dk1"/>
+            </a:fontRef>
+          </p:style>
+          <p:txBody>
+            <a:bodyPr rot="0" spcFirstLastPara="0" vertOverflow="overflow" horzOverflow="overflow" vert="horz" wrap="square" lIns="9577" tIns="4789" rIns="9577" bIns="4789" numCol="1" spcCol="0" rtlCol="0" fromWordArt="0" anchor="ctr" anchorCtr="0" forceAA="0" compatLnSpc="1">
+              <a:prstTxWarp prst="textNoShape">
+                <a:avLst/>
+              </a:prstTxWarp>
+              <a:noAutofit/>
+            </a:bodyPr>
+            <a:lstStyle/>
+            <a:p>
+              <a:pPr algn="ctr"/>
+              <a:endParaRPr lang="en-GB" sz="1000" dirty="0"/>
+            </a:p>
+          </p:txBody>
+        </p:sp>
+        <p:sp>
+          <p:nvSpPr>
+            <p:cNvPr id="64" name="Rectangle 63"/>
+            <p:cNvSpPr/>
+            <p:nvPr/>
+          </p:nvSpPr>
+          <p:spPr>
+            <a:xfrm>
+              <a:off x="1715528" y="912006"/>
+              <a:ext cx="469028" cy="440886"/>
+            </a:xfrm>
+            <a:prstGeom prst="rect">
+              <a:avLst/>
+            </a:prstGeom>
+            <a:ln w="9525">
+              <a:solidFill>
+                <a:schemeClr val="tx1"/>
+              </a:solidFill>
+            </a:ln>
+          </p:spPr>
+          <p:style>
+            <a:lnRef idx="2">
+              <a:schemeClr val="accent6"/>
+            </a:lnRef>
+            <a:fillRef idx="1">
+              <a:schemeClr val="lt1"/>
+            </a:fillRef>
+            <a:effectRef idx="0">
+              <a:schemeClr val="accent6"/>
+            </a:effectRef>
+            <a:fontRef idx="minor">
+              <a:schemeClr val="dk1"/>
+            </a:fontRef>
+          </p:style>
+          <p:txBody>
+            <a:bodyPr rot="0" spcFirstLastPara="0" vertOverflow="overflow" horzOverflow="overflow" vert="horz" wrap="square" lIns="9577" tIns="4789" rIns="9577" bIns="4789" numCol="1" spcCol="0" rtlCol="0" fromWordArt="0" anchor="ctr" anchorCtr="0" forceAA="0" compatLnSpc="1">
+              <a:prstTxWarp prst="textNoShape">
+                <a:avLst/>
+              </a:prstTxWarp>
+              <a:noAutofit/>
+            </a:bodyPr>
+            <a:lstStyle/>
+            <a:p>
+              <a:pPr algn="ctr"/>
+              <a:endParaRPr lang="en-GB" sz="1000" dirty="0"/>
+            </a:p>
+          </p:txBody>
+        </p:sp>
+        <p:sp>
+          <p:nvSpPr>
+            <p:cNvPr id="65" name="Rectangle 64"/>
+            <p:cNvSpPr/>
+            <p:nvPr/>
+          </p:nvSpPr>
+          <p:spPr>
+            <a:xfrm>
+              <a:off x="2184556" y="912006"/>
+              <a:ext cx="469028" cy="440886"/>
+            </a:xfrm>
+            <a:prstGeom prst="rect">
+              <a:avLst/>
+            </a:prstGeom>
+            <a:ln w="9525">
+              <a:solidFill>
+                <a:schemeClr val="tx1"/>
+              </a:solidFill>
+            </a:ln>
+          </p:spPr>
+          <p:style>
+            <a:lnRef idx="2">
+              <a:schemeClr val="accent6"/>
+            </a:lnRef>
+            <a:fillRef idx="1">
+              <a:schemeClr val="lt1"/>
+            </a:fillRef>
+            <a:effectRef idx="0">
+              <a:schemeClr val="accent6"/>
+            </a:effectRef>
+            <a:fontRef idx="minor">
+              <a:schemeClr val="dk1"/>
+            </a:fontRef>
+          </p:style>
+          <p:txBody>
+            <a:bodyPr rot="0" spcFirstLastPara="0" vertOverflow="overflow" horzOverflow="overflow" vert="horz" wrap="square" lIns="9577" tIns="4789" rIns="9577" bIns="4789" numCol="1" spcCol="0" rtlCol="0" fromWordArt="0" anchor="ctr" anchorCtr="0" forceAA="0" compatLnSpc="1">
+              <a:prstTxWarp prst="textNoShape">
+                <a:avLst/>
+              </a:prstTxWarp>
+              <a:noAutofit/>
+            </a:bodyPr>
+            <a:lstStyle/>
+            <a:p>
+              <a:pPr algn="ctr"/>
+              <a:endParaRPr lang="en-GB" sz="1000" dirty="0"/>
+            </a:p>
+          </p:txBody>
+        </p:sp>
+        <p:sp>
+          <p:nvSpPr>
+            <p:cNvPr id="66" name="Rectangle 65"/>
+            <p:cNvSpPr/>
+            <p:nvPr/>
+          </p:nvSpPr>
+          <p:spPr>
+            <a:xfrm>
+              <a:off x="2650032" y="912006"/>
+              <a:ext cx="469028" cy="440886"/>
+            </a:xfrm>
+            <a:prstGeom prst="rect">
+              <a:avLst/>
+            </a:prstGeom>
+            <a:ln w="9525">
+              <a:solidFill>
+                <a:schemeClr val="tx1"/>
+              </a:solidFill>
+            </a:ln>
+          </p:spPr>
+          <p:style>
+            <a:lnRef idx="2">
+              <a:schemeClr val="accent6"/>
+            </a:lnRef>
+            <a:fillRef idx="1">
+              <a:schemeClr val="lt1"/>
+            </a:fillRef>
+            <a:effectRef idx="0">
+              <a:schemeClr val="accent6"/>
+            </a:effectRef>
+            <a:fontRef idx="minor">
+              <a:schemeClr val="dk1"/>
+            </a:fontRef>
+          </p:style>
+          <p:txBody>
+            <a:bodyPr rot="0" spcFirstLastPara="0" vertOverflow="overflow" horzOverflow="overflow" vert="horz" wrap="square" lIns="9577" tIns="4789" rIns="9577" bIns="4789" numCol="1" spcCol="0" rtlCol="0" fromWordArt="0" anchor="ctr" anchorCtr="0" forceAA="0" compatLnSpc="1">
+              <a:prstTxWarp prst="textNoShape">
+                <a:avLst/>
+              </a:prstTxWarp>
+              <a:noAutofit/>
+            </a:bodyPr>
+            <a:lstStyle/>
+            <a:p>
+              <a:pPr algn="ctr"/>
+              <a:endParaRPr lang="en-GB" sz="1000" dirty="0"/>
+            </a:p>
+          </p:txBody>
+        </p:sp>
+        <p:sp>
+          <p:nvSpPr>
+            <p:cNvPr id="67" name="Rectangle 66"/>
+            <p:cNvSpPr/>
+            <p:nvPr/>
+          </p:nvSpPr>
+          <p:spPr>
+            <a:xfrm>
+              <a:off x="797344" y="912006"/>
+              <a:ext cx="469028" cy="440886"/>
+            </a:xfrm>
+            <a:prstGeom prst="rect">
+              <a:avLst/>
+            </a:prstGeom>
+            <a:ln w="9525">
+              <a:solidFill>
+                <a:schemeClr val="tx1"/>
+              </a:solidFill>
+            </a:ln>
+          </p:spPr>
+          <p:style>
+            <a:lnRef idx="2">
+              <a:schemeClr val="accent6"/>
+            </a:lnRef>
+            <a:fillRef idx="1">
+              <a:schemeClr val="lt1"/>
+            </a:fillRef>
+            <a:effectRef idx="0">
+              <a:schemeClr val="accent6"/>
+            </a:effectRef>
+            <a:fontRef idx="minor">
+              <a:schemeClr val="dk1"/>
+            </a:fontRef>
+          </p:style>
+          <p:txBody>
+            <a:bodyPr rot="0" spcFirstLastPara="0" vertOverflow="overflow" horzOverflow="overflow" vert="horz" wrap="square" lIns="9577" tIns="4789" rIns="9577" bIns="4789" numCol="1" spcCol="0" rtlCol="0" fromWordArt="0" anchor="ctr" anchorCtr="0" forceAA="0" compatLnSpc="1">
+              <a:prstTxWarp prst="textNoShape">
+                <a:avLst/>
+              </a:prstTxWarp>
+              <a:noAutofit/>
+            </a:bodyPr>
+            <a:lstStyle/>
+            <a:p>
+              <a:pPr algn="ctr"/>
+              <a:endParaRPr lang="en-GB" sz="1000" dirty="0"/>
+            </a:p>
+          </p:txBody>
+        </p:sp>
+      </p:grpSp>
+      <p:grpSp>
+        <p:nvGrpSpPr>
+          <p:cNvPr id="68" name="Group 67"/>
+          <p:cNvGrpSpPr/>
+          <p:nvPr/>
+        </p:nvGrpSpPr>
+        <p:grpSpPr>
+          <a:xfrm>
+            <a:off x="735432" y="527407"/>
+            <a:ext cx="2321716" cy="443733"/>
+            <a:chOff x="797344" y="912006"/>
+            <a:chExt cx="2321716" cy="440886"/>
+          </a:xfrm>
+        </p:grpSpPr>
+        <p:sp>
+          <p:nvSpPr>
+            <p:cNvPr id="69" name="Rectangle 68"/>
+            <p:cNvSpPr/>
+            <p:nvPr/>
+          </p:nvSpPr>
+          <p:spPr>
+            <a:xfrm>
+              <a:off x="1264596" y="912006"/>
+              <a:ext cx="469028" cy="440886"/>
+            </a:xfrm>
+            <a:prstGeom prst="rect">
+              <a:avLst/>
+            </a:prstGeom>
+            <a:ln w="9525">
+              <a:solidFill>
+                <a:schemeClr val="tx1"/>
+              </a:solidFill>
+            </a:ln>
+          </p:spPr>
+          <p:style>
+            <a:lnRef idx="2">
+              <a:schemeClr val="accent6"/>
+            </a:lnRef>
+            <a:fillRef idx="1">
+              <a:schemeClr val="lt1"/>
+            </a:fillRef>
+            <a:effectRef idx="0">
+              <a:schemeClr val="accent6"/>
+            </a:effectRef>
+            <a:fontRef idx="minor">
+              <a:schemeClr val="dk1"/>
+            </a:fontRef>
+          </p:style>
+          <p:txBody>
+            <a:bodyPr rot="0" spcFirstLastPara="0" vertOverflow="overflow" horzOverflow="overflow" vert="horz" wrap="square" lIns="9577" tIns="4789" rIns="9577" bIns="4789" numCol="1" spcCol="0" rtlCol="0" fromWordArt="0" anchor="ctr" anchorCtr="0" forceAA="0" compatLnSpc="1">
+              <a:prstTxWarp prst="textNoShape">
+                <a:avLst/>
+              </a:prstTxWarp>
+              <a:noAutofit/>
+            </a:bodyPr>
+            <a:lstStyle/>
+            <a:p>
+              <a:pPr algn="ctr"/>
+              <a:endParaRPr lang="en-GB" sz="1000" dirty="0"/>
+            </a:p>
+          </p:txBody>
+        </p:sp>
+        <p:sp>
+          <p:nvSpPr>
+            <p:cNvPr id="70" name="Rectangle 69"/>
+            <p:cNvSpPr/>
+            <p:nvPr/>
+          </p:nvSpPr>
+          <p:spPr>
+            <a:xfrm>
+              <a:off x="1715528" y="912006"/>
+              <a:ext cx="469028" cy="440886"/>
+            </a:xfrm>
+            <a:prstGeom prst="rect">
+              <a:avLst/>
+            </a:prstGeom>
+            <a:ln w="9525">
+              <a:solidFill>
+                <a:schemeClr val="tx1"/>
+              </a:solidFill>
+            </a:ln>
+          </p:spPr>
+          <p:style>
+            <a:lnRef idx="2">
+              <a:schemeClr val="accent6"/>
+            </a:lnRef>
+            <a:fillRef idx="1">
+              <a:schemeClr val="lt1"/>
+            </a:fillRef>
+            <a:effectRef idx="0">
+              <a:schemeClr val="accent6"/>
+            </a:effectRef>
+            <a:fontRef idx="minor">
+              <a:schemeClr val="dk1"/>
+            </a:fontRef>
+          </p:style>
+          <p:txBody>
+            <a:bodyPr rot="0" spcFirstLastPara="0" vertOverflow="overflow" horzOverflow="overflow" vert="horz" wrap="square" lIns="9577" tIns="4789" rIns="9577" bIns="4789" numCol="1" spcCol="0" rtlCol="0" fromWordArt="0" anchor="ctr" anchorCtr="0" forceAA="0" compatLnSpc="1">
+              <a:prstTxWarp prst="textNoShape">
+                <a:avLst/>
+              </a:prstTxWarp>
+              <a:noAutofit/>
+            </a:bodyPr>
+            <a:lstStyle/>
+            <a:p>
+              <a:pPr algn="ctr"/>
+              <a:endParaRPr lang="en-GB" sz="1000" dirty="0"/>
+            </a:p>
+          </p:txBody>
+        </p:sp>
+        <p:sp>
+          <p:nvSpPr>
+            <p:cNvPr id="71" name="Rectangle 70"/>
+            <p:cNvSpPr/>
+            <p:nvPr/>
+          </p:nvSpPr>
+          <p:spPr>
+            <a:xfrm>
+              <a:off x="2184556" y="912006"/>
+              <a:ext cx="469028" cy="440886"/>
+            </a:xfrm>
+            <a:prstGeom prst="rect">
+              <a:avLst/>
+            </a:prstGeom>
+            <a:ln w="9525">
+              <a:solidFill>
+                <a:schemeClr val="tx1"/>
+              </a:solidFill>
+            </a:ln>
+          </p:spPr>
+          <p:style>
+            <a:lnRef idx="2">
+              <a:schemeClr val="accent6"/>
+            </a:lnRef>
+            <a:fillRef idx="1">
+              <a:schemeClr val="lt1"/>
+            </a:fillRef>
+            <a:effectRef idx="0">
+              <a:schemeClr val="accent6"/>
+            </a:effectRef>
+            <a:fontRef idx="minor">
+              <a:schemeClr val="dk1"/>
+            </a:fontRef>
+          </p:style>
+          <p:txBody>
+            <a:bodyPr rot="0" spcFirstLastPara="0" vertOverflow="overflow" horzOverflow="overflow" vert="horz" wrap="square" lIns="9577" tIns="4789" rIns="9577" bIns="4789" numCol="1" spcCol="0" rtlCol="0" fromWordArt="0" anchor="ctr" anchorCtr="0" forceAA="0" compatLnSpc="1">
+              <a:prstTxWarp prst="textNoShape">
+                <a:avLst/>
+              </a:prstTxWarp>
+              <a:noAutofit/>
+            </a:bodyPr>
+            <a:lstStyle/>
+            <a:p>
+              <a:pPr algn="ctr"/>
+              <a:endParaRPr lang="en-GB" sz="1000" dirty="0"/>
+            </a:p>
+          </p:txBody>
+        </p:sp>
+        <p:sp>
+          <p:nvSpPr>
+            <p:cNvPr id="72" name="Rectangle 71"/>
+            <p:cNvSpPr/>
+            <p:nvPr/>
+          </p:nvSpPr>
+          <p:spPr>
+            <a:xfrm>
+              <a:off x="2650032" y="912006"/>
+              <a:ext cx="469028" cy="440886"/>
+            </a:xfrm>
+            <a:prstGeom prst="rect">
+              <a:avLst/>
+            </a:prstGeom>
+            <a:ln w="9525">
+              <a:solidFill>
+                <a:schemeClr val="tx1"/>
+              </a:solidFill>
+            </a:ln>
+          </p:spPr>
+          <p:style>
+            <a:lnRef idx="2">
+              <a:schemeClr val="accent6"/>
+            </a:lnRef>
+            <a:fillRef idx="1">
+              <a:schemeClr val="lt1"/>
+            </a:fillRef>
+            <a:effectRef idx="0">
+              <a:schemeClr val="accent6"/>
+            </a:effectRef>
+            <a:fontRef idx="minor">
+              <a:schemeClr val="dk1"/>
+            </a:fontRef>
+          </p:style>
+          <p:txBody>
+            <a:bodyPr rot="0" spcFirstLastPara="0" vertOverflow="overflow" horzOverflow="overflow" vert="horz" wrap="square" lIns="9577" tIns="4789" rIns="9577" bIns="4789" numCol="1" spcCol="0" rtlCol="0" fromWordArt="0" anchor="ctr" anchorCtr="0" forceAA="0" compatLnSpc="1">
+              <a:prstTxWarp prst="textNoShape">
+                <a:avLst/>
+              </a:prstTxWarp>
+              <a:noAutofit/>
+            </a:bodyPr>
+            <a:lstStyle/>
+            <a:p>
+              <a:pPr algn="ctr"/>
+              <a:endParaRPr lang="en-GB" sz="1000" dirty="0"/>
+            </a:p>
+          </p:txBody>
+        </p:sp>
+        <p:sp>
+          <p:nvSpPr>
+            <p:cNvPr id="73" name="Rectangle 72"/>
+            <p:cNvSpPr/>
+            <p:nvPr/>
+          </p:nvSpPr>
+          <p:spPr>
+            <a:xfrm>
+              <a:off x="797344" y="912006"/>
+              <a:ext cx="469028" cy="440886"/>
+            </a:xfrm>
+            <a:prstGeom prst="rect">
+              <a:avLst/>
+            </a:prstGeom>
+            <a:ln w="9525">
+              <a:solidFill>
+                <a:schemeClr val="tx1"/>
+              </a:solidFill>
+            </a:ln>
+          </p:spPr>
+          <p:style>
+            <a:lnRef idx="2">
+              <a:schemeClr val="accent6"/>
+            </a:lnRef>
+            <a:fillRef idx="1">
+              <a:schemeClr val="lt1"/>
+            </a:fillRef>
+            <a:effectRef idx="0">
+              <a:schemeClr val="accent6"/>
+            </a:effectRef>
+            <a:fontRef idx="minor">
+              <a:schemeClr val="dk1"/>
+            </a:fontRef>
+          </p:style>
+          <p:txBody>
+            <a:bodyPr rot="0" spcFirstLastPara="0" vertOverflow="overflow" horzOverflow="overflow" vert="horz" wrap="square" lIns="9577" tIns="4789" rIns="9577" bIns="4789" numCol="1" spcCol="0" rtlCol="0" fromWordArt="0" anchor="ctr" anchorCtr="0" forceAA="0" compatLnSpc="1">
+              <a:prstTxWarp prst="textNoShape">
+                <a:avLst/>
+              </a:prstTxWarp>
+              <a:noAutofit/>
+            </a:bodyPr>
+            <a:lstStyle/>
+            <a:p>
+              <a:pPr algn="ctr"/>
+              <a:endParaRPr lang="en-GB" sz="1000" dirty="0"/>
+            </a:p>
+          </p:txBody>
+        </p:sp>
+      </p:grpSp>
+    </p:spTree>
+    <p:extLst>
+      <p:ext uri="{BB962C8B-B14F-4D97-AF65-F5344CB8AC3E}">
+        <p14:creationId xmlns:p14="http://schemas.microsoft.com/office/powerpoint/2010/main" val="3748759864"/>
       </p:ext>
     </p:extLst>
   </p:cSld>
@@ -8734,8 +11689,8 @@
           </a:p>
         </p:txBody>
       </p:sp>
-      <mc:AlternateContent xmlns:mc="http://schemas.openxmlformats.org/markup-compatibility/2006">
-        <mc:Choice xmlns:a14="http://schemas.microsoft.com/office/drawing/2010/main" Requires="a14">
+      <mc:AlternateContent xmlns:mc="http://schemas.openxmlformats.org/markup-compatibility/2006" xmlns:a14="http://schemas.microsoft.com/office/drawing/2010/main">
+        <mc:Choice Requires="a14">
           <p:sp>
             <p:nvSpPr>
               <p:cNvPr id="37" name="TextBox 36"/>
@@ -8798,7 +11753,7 @@
             </p:txBody>
           </p:sp>
         </mc:Choice>
-        <mc:Fallback>
+        <mc:Fallback xmlns="">
           <p:sp>
             <p:nvSpPr>
               <p:cNvPr id="37" name="TextBox 36"/>
@@ -8837,8 +11792,8 @@
           </p:sp>
         </mc:Fallback>
       </mc:AlternateContent>
-      <mc:AlternateContent xmlns:mc="http://schemas.openxmlformats.org/markup-compatibility/2006">
-        <mc:Choice xmlns:a14="http://schemas.microsoft.com/office/drawing/2010/main" Requires="a14">
+      <mc:AlternateContent xmlns:mc="http://schemas.openxmlformats.org/markup-compatibility/2006" xmlns:a14="http://schemas.microsoft.com/office/drawing/2010/main">
+        <mc:Choice Requires="a14">
           <p:sp>
             <p:nvSpPr>
               <p:cNvPr id="48" name="TextBox 47"/>
@@ -8901,7 +11856,7 @@
             </p:txBody>
           </p:sp>
         </mc:Choice>
-        <mc:Fallback>
+        <mc:Fallback xmlns="">
           <p:sp>
             <p:nvSpPr>
               <p:cNvPr id="48" name="TextBox 47"/>
@@ -9370,6 +12325,649 @@
     <p:extLst>
       <p:ext uri="{BB962C8B-B14F-4D97-AF65-F5344CB8AC3E}">
         <p14:creationId xmlns:p14="http://schemas.microsoft.com/office/powerpoint/2010/main" val="3458346852"/>
+      </p:ext>
+    </p:extLst>
+  </p:cSld>
+  <p:clrMapOvr>
+    <a:masterClrMapping/>
+  </p:clrMapOvr>
+</p:sld>
+</file>
+
+<file path=ppt/slides/slide20.xml><?xml version="1.0" encoding="utf-8"?>
+<p:sld xmlns:a="http://schemas.openxmlformats.org/drawingml/2006/main" xmlns:r="http://schemas.openxmlformats.org/officeDocument/2006/relationships" xmlns:p="http://schemas.openxmlformats.org/presentationml/2006/main">
+  <p:cSld>
+    <p:spTree>
+      <p:nvGrpSpPr>
+        <p:cNvPr id="1" name=""/>
+        <p:cNvGrpSpPr/>
+        <p:nvPr/>
+      </p:nvGrpSpPr>
+      <p:grpSpPr>
+        <a:xfrm>
+          <a:off x="0" y="0"/>
+          <a:ext cx="0" cy="0"/>
+          <a:chOff x="0" y="0"/>
+          <a:chExt cx="0" cy="0"/>
+        </a:xfrm>
+      </p:grpSpPr>
+      <p:sp>
+        <p:nvSpPr>
+          <p:cNvPr id="2" name="Title 1"/>
+          <p:cNvSpPr>
+            <a:spLocks noGrp="1"/>
+          </p:cNvSpPr>
+          <p:nvPr>
+            <p:ph type="title"/>
+          </p:nvPr>
+        </p:nvSpPr>
+        <p:spPr/>
+        <p:txBody>
+          <a:bodyPr/>
+          <a:lstStyle/>
+          <a:p>
+            <a:r>
+              <a:rPr lang="en-US" dirty="0" smtClean="0"/>
+              <a:t>wing2d</a:t>
+            </a:r>
+            <a:endParaRPr lang="en-GB" dirty="0"/>
+          </a:p>
+        </p:txBody>
+      </p:sp>
+      <p:pic>
+        <p:nvPicPr>
+          <p:cNvPr id="3" name="Content Placeholder 3"/>
+          <p:cNvPicPr>
+            <a:picLocks noGrp="1" noChangeAspect="1"/>
+          </p:cNvPicPr>
+          <p:nvPr>
+            <p:ph idx="1"/>
+          </p:nvPr>
+        </p:nvPicPr>
+        <p:blipFill>
+          <a:blip r:embed="rId2">
+            <a:extLst>
+              <a:ext uri="{28A0092B-C50C-407E-A947-70E740481C1C}">
+                <a14:useLocalDpi xmlns:a14="http://schemas.microsoft.com/office/drawing/2010/main" val="0"/>
+              </a:ext>
+            </a:extLst>
+          </a:blip>
+          <a:stretch>
+            <a:fillRect/>
+          </a:stretch>
+        </p:blipFill>
+        <p:spPr>
+          <a:xfrm>
+            <a:off x="865188" y="622300"/>
+            <a:ext cx="2228850" cy="1485900"/>
+          </a:xfrm>
+        </p:spPr>
+      </p:pic>
+      <p:cxnSp>
+        <p:nvCxnSpPr>
+          <p:cNvPr id="5" name="Straight Arrow Connector 4"/>
+          <p:cNvCxnSpPr/>
+          <p:nvPr/>
+        </p:nvCxnSpPr>
+        <p:spPr>
+          <a:xfrm flipV="1">
+            <a:off x="1000017" y="1506877"/>
+            <a:ext cx="359596" cy="171237"/>
+          </a:xfrm>
+          <a:prstGeom prst="straightConnector1">
+            <a:avLst/>
+          </a:prstGeom>
+          <a:ln>
+            <a:tailEnd type="triangle" w="sm" len="sm"/>
+          </a:ln>
+        </p:spPr>
+        <p:style>
+          <a:lnRef idx="1">
+            <a:schemeClr val="dk1"/>
+          </a:lnRef>
+          <a:fillRef idx="0">
+            <a:schemeClr val="dk1"/>
+          </a:fillRef>
+          <a:effectRef idx="0">
+            <a:schemeClr val="dk1"/>
+          </a:effectRef>
+          <a:fontRef idx="minor">
+            <a:schemeClr val="tx1"/>
+          </a:fontRef>
+        </p:style>
+      </p:cxnSp>
+      <p:cxnSp>
+        <p:nvCxnSpPr>
+          <p:cNvPr id="8" name="Straight Arrow Connector 7"/>
+          <p:cNvCxnSpPr/>
+          <p:nvPr/>
+        </p:nvCxnSpPr>
+        <p:spPr>
+          <a:xfrm flipV="1">
+            <a:off x="1000017" y="1678114"/>
+            <a:ext cx="359596" cy="0"/>
+          </a:xfrm>
+          <a:prstGeom prst="straightConnector1">
+            <a:avLst/>
+          </a:prstGeom>
+          <a:ln>
+            <a:tailEnd type="triangle" w="sm" len="sm"/>
+          </a:ln>
+        </p:spPr>
+        <p:style>
+          <a:lnRef idx="1">
+            <a:schemeClr val="dk1"/>
+          </a:lnRef>
+          <a:fillRef idx="0">
+            <a:schemeClr val="dk1"/>
+          </a:fillRef>
+          <a:effectRef idx="0">
+            <a:schemeClr val="dk1"/>
+          </a:effectRef>
+          <a:fontRef idx="minor">
+            <a:schemeClr val="tx1"/>
+          </a:fontRef>
+        </p:style>
+      </p:cxnSp>
+      <p:cxnSp>
+        <p:nvCxnSpPr>
+          <p:cNvPr id="9" name="Straight Arrow Connector 8"/>
+          <p:cNvCxnSpPr/>
+          <p:nvPr/>
+        </p:nvCxnSpPr>
+        <p:spPr>
+          <a:xfrm flipV="1">
+            <a:off x="1002290" y="1498114"/>
+            <a:ext cx="0" cy="180000"/>
+          </a:xfrm>
+          <a:prstGeom prst="straightConnector1">
+            <a:avLst/>
+          </a:prstGeom>
+          <a:ln>
+            <a:tailEnd type="triangle" w="sm" len="sm"/>
+          </a:ln>
+        </p:spPr>
+        <p:style>
+          <a:lnRef idx="1">
+            <a:schemeClr val="dk1"/>
+          </a:lnRef>
+          <a:fillRef idx="0">
+            <a:schemeClr val="dk1"/>
+          </a:fillRef>
+          <a:effectRef idx="0">
+            <a:schemeClr val="dk1"/>
+          </a:effectRef>
+          <a:fontRef idx="minor">
+            <a:schemeClr val="tx1"/>
+          </a:fontRef>
+        </p:style>
+      </p:cxnSp>
+      <mc:AlternateContent xmlns:mc="http://schemas.openxmlformats.org/markup-compatibility/2006" xmlns:a14="http://schemas.microsoft.com/office/drawing/2010/main">
+        <mc:Choice Requires="a14">
+          <p:sp>
+            <p:nvSpPr>
+              <p:cNvPr id="11" name="TextBox 10"/>
+              <p:cNvSpPr txBox="1"/>
+              <p:nvPr/>
+            </p:nvSpPr>
+            <p:spPr>
+              <a:xfrm>
+                <a:off x="1179815" y="1407218"/>
+                <a:ext cx="112210" cy="153888"/>
+              </a:xfrm>
+              <a:prstGeom prst="rect">
+                <a:avLst/>
+              </a:prstGeom>
+              <a:noFill/>
+            </p:spPr>
+            <p:txBody>
+              <a:bodyPr wrap="none" lIns="0" tIns="0" rIns="0" bIns="0" rtlCol="0">
+                <a:spAutoFit/>
+              </a:bodyPr>
+              <a:lstStyle/>
+              <a:p>
+                <a:pPr/>
+                <a14:m>
+                  <m:oMathPara xmlns:m="http://schemas.openxmlformats.org/officeDocument/2006/math">
+                    <m:oMathParaPr>
+                      <m:jc m:val="centerGroup"/>
+                    </m:oMathParaPr>
+                    <m:oMath xmlns:m="http://schemas.openxmlformats.org/officeDocument/2006/math">
+                      <m:r>
+                        <a:rPr lang="en-US" sz="1000" b="1" i="1" smtClean="0">
+                          <a:latin typeface="Cambria Math" panose="02040503050406030204" pitchFamily="18" charset="0"/>
+                        </a:rPr>
+                        <m:t>𝒖</m:t>
+                      </m:r>
+                    </m:oMath>
+                  </m:oMathPara>
+                </a14:m>
+                <a:endParaRPr lang="en-GB" sz="1000" b="1" dirty="0"/>
+              </a:p>
+            </p:txBody>
+          </p:sp>
+        </mc:Choice>
+        <mc:Fallback xmlns="">
+          <p:sp>
+            <p:nvSpPr>
+              <p:cNvPr id="11" name="TextBox 10"/>
+              <p:cNvSpPr txBox="1">
+                <a:spLocks noRot="1" noChangeAspect="1" noMove="1" noResize="1" noEditPoints="1" noAdjustHandles="1" noChangeArrowheads="1" noChangeShapeType="1" noTextEdit="1"/>
+              </p:cNvSpPr>
+              <p:nvPr/>
+            </p:nvSpPr>
+            <p:spPr>
+              <a:xfrm>
+                <a:off x="1179815" y="1407218"/>
+                <a:ext cx="112210" cy="153888"/>
+              </a:xfrm>
+              <a:prstGeom prst="rect">
+                <a:avLst/>
+              </a:prstGeom>
+              <a:blipFill>
+                <a:blip r:embed="rId3"/>
+                <a:stretch>
+                  <a:fillRect l="-22222" r="-16667"/>
+                </a:stretch>
+              </a:blipFill>
+            </p:spPr>
+            <p:txBody>
+              <a:bodyPr/>
+              <a:lstStyle/>
+              <a:p>
+                <a:r>
+                  <a:rPr lang="en-GB">
+                    <a:noFill/>
+                  </a:rPr>
+                  <a:t> </a:t>
+                </a:r>
+              </a:p>
+            </p:txBody>
+          </p:sp>
+        </mc:Fallback>
+      </mc:AlternateContent>
+      <mc:AlternateContent xmlns:mc="http://schemas.openxmlformats.org/markup-compatibility/2006" xmlns:a14="http://schemas.microsoft.com/office/drawing/2010/main">
+        <mc:Choice Requires="a14">
+          <p:sp>
+            <p:nvSpPr>
+              <p:cNvPr id="12" name="TextBox 11"/>
+              <p:cNvSpPr txBox="1"/>
+              <p:nvPr/>
+            </p:nvSpPr>
+            <p:spPr>
+              <a:xfrm>
+                <a:off x="838259" y="1489327"/>
+                <a:ext cx="169534" cy="166071"/>
+              </a:xfrm>
+              <a:prstGeom prst="rect">
+                <a:avLst/>
+              </a:prstGeom>
+              <a:noFill/>
+            </p:spPr>
+            <p:txBody>
+              <a:bodyPr wrap="none" lIns="0" tIns="0" rIns="0" bIns="0" rtlCol="0">
+                <a:spAutoFit/>
+              </a:bodyPr>
+              <a:lstStyle/>
+              <a:p>
+                <a:pPr/>
+                <a14:m>
+                  <m:oMathPara xmlns:m="http://schemas.openxmlformats.org/officeDocument/2006/math">
+                    <m:oMathParaPr>
+                      <m:jc m:val="centerGroup"/>
+                    </m:oMathParaPr>
+                    <m:oMath xmlns:m="http://schemas.openxmlformats.org/officeDocument/2006/math">
+                      <m:sSub>
+                        <m:sSubPr>
+                          <m:ctrlPr>
+                            <a:rPr lang="en-US" sz="1000" i="1" smtClean="0">
+                              <a:latin typeface="Cambria Math" panose="02040503050406030204" pitchFamily="18" charset="0"/>
+                            </a:rPr>
+                          </m:ctrlPr>
+                        </m:sSubPr>
+                        <m:e>
+                          <m:r>
+                            <a:rPr lang="en-US" sz="1000" i="1">
+                              <a:latin typeface="Cambria Math" panose="02040503050406030204" pitchFamily="18" charset="0"/>
+                            </a:rPr>
+                            <m:t>𝑢</m:t>
+                          </m:r>
+                        </m:e>
+                        <m:sub>
+                          <m:r>
+                            <a:rPr lang="en-US" sz="1000" b="0" i="1" smtClean="0">
+                              <a:latin typeface="Cambria Math" panose="02040503050406030204" pitchFamily="18" charset="0"/>
+                            </a:rPr>
+                            <m:t>𝑦</m:t>
+                          </m:r>
+                        </m:sub>
+                      </m:sSub>
+                    </m:oMath>
+                  </m:oMathPara>
+                </a14:m>
+                <a:endParaRPr lang="en-GB" sz="1000" dirty="0"/>
+              </a:p>
+            </p:txBody>
+          </p:sp>
+        </mc:Choice>
+        <mc:Fallback xmlns="">
+          <p:sp>
+            <p:nvSpPr>
+              <p:cNvPr id="12" name="TextBox 11"/>
+              <p:cNvSpPr txBox="1">
+                <a:spLocks noRot="1" noChangeAspect="1" noMove="1" noResize="1" noEditPoints="1" noAdjustHandles="1" noChangeArrowheads="1" noChangeShapeType="1" noTextEdit="1"/>
+              </p:cNvSpPr>
+              <p:nvPr/>
+            </p:nvSpPr>
+            <p:spPr>
+              <a:xfrm>
+                <a:off x="838259" y="1489327"/>
+                <a:ext cx="169534" cy="166071"/>
+              </a:xfrm>
+              <a:prstGeom prst="rect">
+                <a:avLst/>
+              </a:prstGeom>
+              <a:blipFill>
+                <a:blip r:embed="rId4"/>
+                <a:stretch>
+                  <a:fillRect l="-14815" r="-7407" b="-17857"/>
+                </a:stretch>
+              </a:blipFill>
+            </p:spPr>
+            <p:txBody>
+              <a:bodyPr/>
+              <a:lstStyle/>
+              <a:p>
+                <a:r>
+                  <a:rPr lang="en-GB">
+                    <a:noFill/>
+                  </a:rPr>
+                  <a:t> </a:t>
+                </a:r>
+              </a:p>
+            </p:txBody>
+          </p:sp>
+        </mc:Fallback>
+      </mc:AlternateContent>
+      <mc:AlternateContent xmlns:mc="http://schemas.openxmlformats.org/markup-compatibility/2006" xmlns:a14="http://schemas.microsoft.com/office/drawing/2010/main">
+        <mc:Choice Requires="a14">
+          <p:sp>
+            <p:nvSpPr>
+              <p:cNvPr id="14" name="TextBox 13"/>
+              <p:cNvSpPr txBox="1"/>
+              <p:nvPr/>
+            </p:nvSpPr>
+            <p:spPr>
+              <a:xfrm>
+                <a:off x="1096555" y="1662324"/>
+                <a:ext cx="166519" cy="153888"/>
+              </a:xfrm>
+              <a:prstGeom prst="rect">
+                <a:avLst/>
+              </a:prstGeom>
+              <a:noFill/>
+            </p:spPr>
+            <p:txBody>
+              <a:bodyPr wrap="none" lIns="0" tIns="0" rIns="0" bIns="0" rtlCol="0">
+                <a:spAutoFit/>
+              </a:bodyPr>
+              <a:lstStyle/>
+              <a:p>
+                <a:pPr/>
+                <a14:m>
+                  <m:oMathPara xmlns:m="http://schemas.openxmlformats.org/officeDocument/2006/math">
+                    <m:oMathParaPr>
+                      <m:jc m:val="centerGroup"/>
+                    </m:oMathParaPr>
+                    <m:oMath xmlns:m="http://schemas.openxmlformats.org/officeDocument/2006/math">
+                      <m:sSub>
+                        <m:sSubPr>
+                          <m:ctrlPr>
+                            <a:rPr lang="en-US" sz="1000" i="1">
+                              <a:latin typeface="Cambria Math" panose="02040503050406030204" pitchFamily="18" charset="0"/>
+                            </a:rPr>
+                          </m:ctrlPr>
+                        </m:sSubPr>
+                        <m:e>
+                          <m:r>
+                            <a:rPr lang="en-US" sz="1000" i="1">
+                              <a:latin typeface="Cambria Math" panose="02040503050406030204" pitchFamily="18" charset="0"/>
+                            </a:rPr>
+                            <m:t>𝑢</m:t>
+                          </m:r>
+                        </m:e>
+                        <m:sub>
+                          <m:r>
+                            <a:rPr lang="en-US" sz="1000" i="1">
+                              <a:latin typeface="Cambria Math" panose="02040503050406030204" pitchFamily="18" charset="0"/>
+                            </a:rPr>
+                            <m:t>𝑥</m:t>
+                          </m:r>
+                        </m:sub>
+                      </m:sSub>
+                    </m:oMath>
+                  </m:oMathPara>
+                </a14:m>
+                <a:endParaRPr lang="en-GB" sz="1000" dirty="0"/>
+              </a:p>
+            </p:txBody>
+          </p:sp>
+        </mc:Choice>
+        <mc:Fallback xmlns="">
+          <p:sp>
+            <p:nvSpPr>
+              <p:cNvPr id="14" name="TextBox 13"/>
+              <p:cNvSpPr txBox="1">
+                <a:spLocks noRot="1" noChangeAspect="1" noMove="1" noResize="1" noEditPoints="1" noAdjustHandles="1" noChangeArrowheads="1" noChangeShapeType="1" noTextEdit="1"/>
+              </p:cNvSpPr>
+              <p:nvPr/>
+            </p:nvSpPr>
+            <p:spPr>
+              <a:xfrm>
+                <a:off x="1096555" y="1662324"/>
+                <a:ext cx="166519" cy="153888"/>
+              </a:xfrm>
+              <a:prstGeom prst="rect">
+                <a:avLst/>
+              </a:prstGeom>
+              <a:blipFill>
+                <a:blip r:embed="rId5"/>
+                <a:stretch>
+                  <a:fillRect l="-14815" b="-12000"/>
+                </a:stretch>
+              </a:blipFill>
+            </p:spPr>
+            <p:txBody>
+              <a:bodyPr/>
+              <a:lstStyle/>
+              <a:p>
+                <a:r>
+                  <a:rPr lang="en-GB">
+                    <a:noFill/>
+                  </a:rPr>
+                  <a:t> </a:t>
+                </a:r>
+              </a:p>
+            </p:txBody>
+          </p:sp>
+        </mc:Fallback>
+      </mc:AlternateContent>
+      <mc:AlternateContent xmlns:mc="http://schemas.openxmlformats.org/markup-compatibility/2006" xmlns:a14="http://schemas.microsoft.com/office/drawing/2010/main">
+        <mc:Choice Requires="a14">
+          <p:sp>
+            <p:nvSpPr>
+              <p:cNvPr id="15" name="TextBox 14"/>
+              <p:cNvSpPr txBox="1"/>
+              <p:nvPr/>
+            </p:nvSpPr>
+            <p:spPr>
+              <a:xfrm>
+                <a:off x="1169993" y="1538852"/>
+                <a:ext cx="197682" cy="153888"/>
+              </a:xfrm>
+              <a:prstGeom prst="rect">
+                <a:avLst/>
+              </a:prstGeom>
+              <a:noFill/>
+            </p:spPr>
+            <p:txBody>
+              <a:bodyPr wrap="none" lIns="0" tIns="0" rIns="0" bIns="0" rtlCol="0">
+                <a:spAutoFit/>
+              </a:bodyPr>
+              <a:lstStyle/>
+              <a:p>
+                <a:pPr/>
+                <a14:m>
+                  <m:oMathPara xmlns:m="http://schemas.openxmlformats.org/officeDocument/2006/math">
+                    <m:oMathParaPr>
+                      <m:jc m:val="centerGroup"/>
+                    </m:oMathParaPr>
+                    <m:oMath xmlns:m="http://schemas.openxmlformats.org/officeDocument/2006/math">
+                      <m:sSub>
+                        <m:sSubPr>
+                          <m:ctrlPr>
+                            <a:rPr lang="en-US" sz="1000" i="1" smtClean="0">
+                              <a:latin typeface="Cambria Math" panose="02040503050406030204" pitchFamily="18" charset="0"/>
+                            </a:rPr>
+                          </m:ctrlPr>
+                        </m:sSubPr>
+                        <m:e>
+                          <m:r>
+                            <a:rPr lang="en-US" sz="1000" b="0" i="1" smtClean="0">
+                              <a:latin typeface="Cambria Math" panose="02040503050406030204" pitchFamily="18" charset="0"/>
+                            </a:rPr>
+                            <m:t>𝛼</m:t>
+                          </m:r>
+                        </m:e>
+                        <m:sub/>
+                      </m:sSub>
+                    </m:oMath>
+                  </m:oMathPara>
+                </a14:m>
+                <a:endParaRPr lang="en-GB" sz="1000" dirty="0"/>
+              </a:p>
+            </p:txBody>
+          </p:sp>
+        </mc:Choice>
+        <mc:Fallback xmlns="">
+          <p:sp>
+            <p:nvSpPr>
+              <p:cNvPr id="15" name="TextBox 14"/>
+              <p:cNvSpPr txBox="1">
+                <a:spLocks noRot="1" noChangeAspect="1" noMove="1" noResize="1" noEditPoints="1" noAdjustHandles="1" noChangeArrowheads="1" noChangeShapeType="1" noTextEdit="1"/>
+              </p:cNvSpPr>
+              <p:nvPr/>
+            </p:nvSpPr>
+            <p:spPr>
+              <a:xfrm>
+                <a:off x="1169993" y="1538852"/>
+                <a:ext cx="197682" cy="153888"/>
+              </a:xfrm>
+              <a:prstGeom prst="rect">
+                <a:avLst/>
+              </a:prstGeom>
+              <a:blipFill>
+                <a:blip r:embed="rId6"/>
+                <a:stretch>
+                  <a:fillRect l="-12500"/>
+                </a:stretch>
+              </a:blipFill>
+            </p:spPr>
+            <p:txBody>
+              <a:bodyPr/>
+              <a:lstStyle/>
+              <a:p>
+                <a:r>
+                  <a:rPr lang="en-GB">
+                    <a:noFill/>
+                  </a:rPr>
+                  <a:t> </a:t>
+                </a:r>
+              </a:p>
+            </p:txBody>
+          </p:sp>
+        </mc:Fallback>
+      </mc:AlternateContent>
+      <p:sp>
+        <p:nvSpPr>
+          <p:cNvPr id="16" name="Freeform 15"/>
+          <p:cNvSpPr/>
+          <p:nvPr/>
+        </p:nvSpPr>
+        <p:spPr>
+          <a:xfrm>
+            <a:off x="1059656" y="1607344"/>
+            <a:ext cx="33936" cy="109537"/>
+          </a:xfrm>
+          <a:custGeom>
+            <a:avLst/>
+            <a:gdLst>
+              <a:gd name="connsiteX0" fmla="*/ 0 w 33936"/>
+              <a:gd name="connsiteY0" fmla="*/ 0 h 109537"/>
+              <a:gd name="connsiteX1" fmla="*/ 30957 w 33936"/>
+              <a:gd name="connsiteY1" fmla="*/ 52387 h 109537"/>
+              <a:gd name="connsiteX2" fmla="*/ 30957 w 33936"/>
+              <a:gd name="connsiteY2" fmla="*/ 109537 h 109537"/>
+            </a:gdLst>
+            <a:ahLst/>
+            <a:cxnLst>
+              <a:cxn ang="0">
+                <a:pos x="connsiteX0" y="connsiteY0"/>
+              </a:cxn>
+              <a:cxn ang="0">
+                <a:pos x="connsiteX1" y="connsiteY1"/>
+              </a:cxn>
+              <a:cxn ang="0">
+                <a:pos x="connsiteX2" y="connsiteY2"/>
+              </a:cxn>
+            </a:cxnLst>
+            <a:rect l="l" t="t" r="r" b="b"/>
+            <a:pathLst>
+              <a:path w="33936" h="109537">
+                <a:moveTo>
+                  <a:pt x="0" y="0"/>
+                </a:moveTo>
+                <a:cubicBezTo>
+                  <a:pt x="12899" y="17065"/>
+                  <a:pt x="25798" y="34131"/>
+                  <a:pt x="30957" y="52387"/>
+                </a:cubicBezTo>
+                <a:cubicBezTo>
+                  <a:pt x="36117" y="70643"/>
+                  <a:pt x="33537" y="90090"/>
+                  <a:pt x="30957" y="109537"/>
+                </a:cubicBezTo>
+              </a:path>
+            </a:pathLst>
+          </a:custGeom>
+        </p:spPr>
+        <p:style>
+          <a:lnRef idx="1">
+            <a:schemeClr val="dk1"/>
+          </a:lnRef>
+          <a:fillRef idx="0">
+            <a:schemeClr val="dk1"/>
+          </a:fillRef>
+          <a:effectRef idx="0">
+            <a:schemeClr val="dk1"/>
+          </a:effectRef>
+          <a:fontRef idx="minor">
+            <a:schemeClr val="tx1"/>
+          </a:fontRef>
+        </p:style>
+        <p:txBody>
+          <a:bodyPr rtlCol="0" anchor="ctr"/>
+          <a:lstStyle/>
+          <a:p>
+            <a:pPr algn="ctr"/>
+            <a:endParaRPr lang="en-GB"/>
+          </a:p>
+        </p:txBody>
+      </p:sp>
+    </p:spTree>
+    <p:extLst>
+      <p:ext uri="{BB962C8B-B14F-4D97-AF65-F5344CB8AC3E}">
+        <p14:creationId xmlns:p14="http://schemas.microsoft.com/office/powerpoint/2010/main" val="3488095981"/>
       </p:ext>
     </p:extLst>
   </p:cSld>
@@ -10428,8 +14026,8 @@
             </a:fontRef>
           </p:style>
         </p:cxnSp>
-        <mc:AlternateContent xmlns:mc="http://schemas.openxmlformats.org/markup-compatibility/2006">
-          <mc:Choice xmlns:a14="http://schemas.microsoft.com/office/drawing/2010/main" Requires="a14">
+        <mc:AlternateContent xmlns:mc="http://schemas.openxmlformats.org/markup-compatibility/2006" xmlns:a14="http://schemas.microsoft.com/office/drawing/2010/main">
+          <mc:Choice Requires="a14">
             <p:sp>
               <p:nvSpPr>
                 <p:cNvPr id="49" name="TextBox 48"/>
@@ -10482,7 +14080,7 @@
               </p:txBody>
             </p:sp>
           </mc:Choice>
-          <mc:Fallback>
+          <mc:Fallback xmlns="">
             <p:sp>
               <p:nvSpPr>
                 <p:cNvPr id="49" name="TextBox 48"/>
@@ -11127,8 +14725,8 @@
           </p:sp>
         </p:grpSp>
       </p:grpSp>
-      <mc:AlternateContent xmlns:mc="http://schemas.openxmlformats.org/markup-compatibility/2006">
-        <mc:Choice xmlns:a14="http://schemas.microsoft.com/office/drawing/2010/main" Requires="a14">
+      <mc:AlternateContent xmlns:mc="http://schemas.openxmlformats.org/markup-compatibility/2006" xmlns:a14="http://schemas.microsoft.com/office/drawing/2010/main">
+        <mc:Choice Requires="a14">
           <p:sp>
             <p:nvSpPr>
               <p:cNvPr id="66" name="TextBox 65"/>
@@ -11191,7 +14789,7 @@
             </p:txBody>
           </p:sp>
         </mc:Choice>
-        <mc:Fallback>
+        <mc:Fallback xmlns="">
           <p:sp>
             <p:nvSpPr>
               <p:cNvPr id="66" name="TextBox 65"/>
@@ -11230,8 +14828,8 @@
           </p:sp>
         </mc:Fallback>
       </mc:AlternateContent>
-      <mc:AlternateContent xmlns:mc="http://schemas.openxmlformats.org/markup-compatibility/2006">
-        <mc:Choice xmlns:a14="http://schemas.microsoft.com/office/drawing/2010/main" Requires="a14">
+      <mc:AlternateContent xmlns:mc="http://schemas.openxmlformats.org/markup-compatibility/2006" xmlns:a14="http://schemas.microsoft.com/office/drawing/2010/main">
+        <mc:Choice Requires="a14">
           <p:sp>
             <p:nvSpPr>
               <p:cNvPr id="67" name="TextBox 66"/>
@@ -11294,7 +14892,7 @@
             </p:txBody>
           </p:sp>
         </mc:Choice>
-        <mc:Fallback>
+        <mc:Fallback xmlns="">
           <p:sp>
             <p:nvSpPr>
               <p:cNvPr id="67" name="TextBox 66"/>
@@ -11537,8 +15135,8 @@
             </a:fontRef>
           </p:style>
         </p:cxnSp>
-        <mc:AlternateContent xmlns:mc="http://schemas.openxmlformats.org/markup-compatibility/2006">
-          <mc:Choice xmlns:a14="http://schemas.microsoft.com/office/drawing/2010/main" Requires="a14">
+        <mc:AlternateContent xmlns:mc="http://schemas.openxmlformats.org/markup-compatibility/2006" xmlns:a14="http://schemas.microsoft.com/office/drawing/2010/main">
+          <mc:Choice Requires="a14">
             <p:sp>
               <p:nvSpPr>
                 <p:cNvPr id="86" name="TextBox 85"/>
@@ -11591,7 +15189,7 @@
               </p:txBody>
             </p:sp>
           </mc:Choice>
-          <mc:Fallback>
+          <mc:Fallback xmlns="">
             <p:sp>
               <p:nvSpPr>
                 <p:cNvPr id="86" name="TextBox 85"/>
@@ -11698,8 +15296,8 @@
           </a:fontRef>
         </p:style>
       </p:cxnSp>
-      <mc:AlternateContent xmlns:mc="http://schemas.openxmlformats.org/markup-compatibility/2006">
-        <mc:Choice xmlns:a14="http://schemas.microsoft.com/office/drawing/2010/main" Requires="a14">
+      <mc:AlternateContent xmlns:mc="http://schemas.openxmlformats.org/markup-compatibility/2006" xmlns:a14="http://schemas.microsoft.com/office/drawing/2010/main">
+        <mc:Choice Requires="a14">
           <p:sp>
             <p:nvSpPr>
               <p:cNvPr id="90" name="TextBox 89"/>
@@ -11771,7 +15369,7 @@
             </p:txBody>
           </p:sp>
         </mc:Choice>
-        <mc:Fallback>
+        <mc:Fallback xmlns="">
           <p:sp>
             <p:nvSpPr>
               <p:cNvPr id="90" name="TextBox 89"/>

</xml_diff>